<commit_message>
Api companyId fix and prod database updated
</commit_message>
<xml_diff>
--- a/IqHealth/Marketing/HealthIQ-3.pptx
+++ b/IqHealth/Marketing/HealthIQ-3.pptx
@@ -5,10 +5,10 @@
     <p:sldMasterId id="2147483648" r:id="rId4"/>
   </p:sldMasterIdLst>
   <p:notesMasterIdLst>
-    <p:notesMasterId r:id="rId20"/>
+    <p:notesMasterId r:id="rId22"/>
   </p:notesMasterIdLst>
   <p:handoutMasterIdLst>
-    <p:handoutMasterId r:id="rId21"/>
+    <p:handoutMasterId r:id="rId23"/>
   </p:handoutMasterIdLst>
   <p:sldIdLst>
     <p:sldId id="282" r:id="rId5"/>
@@ -20,12 +20,14 @@
     <p:sldId id="297" r:id="rId11"/>
     <p:sldId id="299" r:id="rId12"/>
     <p:sldId id="300" r:id="rId13"/>
-    <p:sldId id="284" r:id="rId14"/>
-    <p:sldId id="294" r:id="rId15"/>
-    <p:sldId id="295" r:id="rId16"/>
-    <p:sldId id="285" r:id="rId17"/>
-    <p:sldId id="296" r:id="rId18"/>
-    <p:sldId id="256" r:id="rId19"/>
+    <p:sldId id="301" r:id="rId14"/>
+    <p:sldId id="302" r:id="rId15"/>
+    <p:sldId id="284" r:id="rId16"/>
+    <p:sldId id="294" r:id="rId17"/>
+    <p:sldId id="295" r:id="rId18"/>
+    <p:sldId id="285" r:id="rId19"/>
+    <p:sldId id="296" r:id="rId20"/>
+    <p:sldId id="256" r:id="rId21"/>
   </p:sldIdLst>
   <p:sldSz cx="12192000" cy="6858000"/>
   <p:notesSz cx="6858000" cy="9144000"/>
@@ -362,11 +364,11 @@
           <c:showBubbleSize val="0"/>
         </c:dLbls>
         <c:gapWidth val="25"/>
-        <c:axId val="-1053442256"/>
-        <c:axId val="-1053581152"/>
+        <c:axId val="-2138458672"/>
+        <c:axId val="-2138459216"/>
       </c:barChart>
       <c:catAx>
-        <c:axId val="-1053442256"/>
+        <c:axId val="-2138458672"/>
         <c:scaling>
           <c:orientation val="minMax"/>
         </c:scaling>
@@ -409,7 +411,7 @@
             <a:endParaRPr lang="en-US"/>
           </a:p>
         </c:txPr>
-        <c:crossAx val="-1053581152"/>
+        <c:crossAx val="-2138459216"/>
         <c:crosses val="autoZero"/>
         <c:auto val="1"/>
         <c:lblAlgn val="ctr"/>
@@ -417,7 +419,7 @@
         <c:noMultiLvlLbl val="0"/>
       </c:catAx>
       <c:valAx>
-        <c:axId val="-1053581152"/>
+        <c:axId val="-2138459216"/>
         <c:scaling>
           <c:orientation val="minMax"/>
         </c:scaling>
@@ -468,7 +470,7 @@
             <a:endParaRPr lang="en-US"/>
           </a:p>
         </c:txPr>
-        <c:crossAx val="-1053442256"/>
+        <c:crossAx val="-2138458672"/>
         <c:crosses val="autoZero"/>
         <c:crossBetween val="between"/>
       </c:valAx>
@@ -1235,11 +1237,11 @@
         </c:dLbls>
         <c:marker val="1"/>
         <c:smooth val="0"/>
-        <c:axId val="-814968416"/>
-        <c:axId val="-814961344"/>
+        <c:axId val="-2077024512"/>
+        <c:axId val="-2077026144"/>
       </c:lineChart>
       <c:catAx>
-        <c:axId val="-814968416"/>
+        <c:axId val="-2077024512"/>
         <c:scaling>
           <c:orientation val="minMax"/>
         </c:scaling>
@@ -1282,7 +1284,7 @@
             <a:endParaRPr lang="en-US"/>
           </a:p>
         </c:txPr>
-        <c:crossAx val="-814961344"/>
+        <c:crossAx val="-2077026144"/>
         <c:crosses val="autoZero"/>
         <c:auto val="1"/>
         <c:lblAlgn val="ctr"/>
@@ -1290,7 +1292,7 @@
         <c:noMultiLvlLbl val="0"/>
       </c:catAx>
       <c:valAx>
-        <c:axId val="-814961344"/>
+        <c:axId val="-2077026144"/>
         <c:scaling>
           <c:orientation val="minMax"/>
         </c:scaling>
@@ -1341,7 +1343,7 @@
             <a:endParaRPr lang="en-US"/>
           </a:p>
         </c:txPr>
-        <c:crossAx val="-814968416"/>
+        <c:crossAx val="-2077024512"/>
         <c:crosses val="autoZero"/>
         <c:crossBetween val="between"/>
       </c:valAx>
@@ -3110,7 +3112,7 @@
           <a:p>
             <a:fld id="{EF1077DB-935E-4A0A-947A-D283B9F9F452}" type="datetimeFigureOut">
               <a:rPr lang="en-US" smtClean="0"/>
-              <a:t>10-Apr-20</a:t>
+              <a:t>14-Apr-20</a:t>
             </a:fld>
             <a:endParaRPr lang="en-US"/>
           </a:p>
@@ -3287,7 +3289,7 @@
           <a:p>
             <a:fld id="{2D9EC30E-1A71-4188-9BE7-E2A64929A436}" type="datetimeFigureOut">
               <a:rPr lang="en-US" noProof="0" smtClean="0"/>
-              <a:t>10-Apr-20</a:t>
+              <a:t>14-Apr-20</a:t>
             </a:fld>
             <a:endParaRPr lang="en-US" noProof="0"/>
           </a:p>
@@ -26106,6 +26108,440 @@
 <file path=ppt/slides/slide10.xml><?xml version="1.0" encoding="utf-8"?>
 <p:sld xmlns:a="http://schemas.openxmlformats.org/drawingml/2006/main" xmlns:r="http://schemas.openxmlformats.org/officeDocument/2006/relationships" xmlns:p="http://schemas.openxmlformats.org/presentationml/2006/main">
   <p:cSld>
+    <p:bg>
+      <p:bgPr>
+        <a:blipFill dpi="0" rotWithShape="1">
+          <a:blip r:embed="rId2">
+            <a:alphaModFix amt="83000"/>
+            <a:lum/>
+          </a:blip>
+          <a:srcRect/>
+          <a:stretch>
+            <a:fillRect l="1000"/>
+          </a:stretch>
+        </a:blipFill>
+        <a:effectLst/>
+      </p:bgPr>
+    </p:bg>
+    <p:spTree>
+      <p:nvGrpSpPr>
+        <p:cNvPr id="1" name=""/>
+        <p:cNvGrpSpPr/>
+        <p:nvPr/>
+      </p:nvGrpSpPr>
+      <p:grpSpPr>
+        <a:xfrm>
+          <a:off x="0" y="0"/>
+          <a:ext cx="0" cy="0"/>
+          <a:chOff x="0" y="0"/>
+          <a:chExt cx="0" cy="0"/>
+        </a:xfrm>
+      </p:grpSpPr>
+      <p:pic>
+        <p:nvPicPr>
+          <p:cNvPr id="2" name="Picture 1"/>
+          <p:cNvPicPr>
+            <a:picLocks noChangeAspect="1"/>
+          </p:cNvPicPr>
+          <p:nvPr/>
+        </p:nvPicPr>
+        <p:blipFill>
+          <a:blip r:embed="rId2">
+            <a:extLst>
+              <a:ext uri="{28A0092B-C50C-407E-A947-70E740481C1C}">
+                <a14:useLocalDpi xmlns:a14="http://schemas.microsoft.com/office/drawing/2010/main" val="0"/>
+              </a:ext>
+            </a:extLst>
+          </a:blip>
+          <a:stretch>
+            <a:fillRect/>
+          </a:stretch>
+        </p:blipFill>
+        <p:spPr>
+          <a:xfrm>
+            <a:off x="-1" y="0"/>
+            <a:ext cx="12338231" cy="6858000"/>
+          </a:xfrm>
+          <a:prstGeom prst="rect">
+            <a:avLst/>
+          </a:prstGeom>
+        </p:spPr>
+      </p:pic>
+      <p:pic>
+        <p:nvPicPr>
+          <p:cNvPr id="17" name="Picture Placeholder 16">
+            <a:extLst>
+              <a:ext uri="{FF2B5EF4-FFF2-40B4-BE49-F238E27FC236}">
+                <a16:creationId xmlns:a16="http://schemas.microsoft.com/office/drawing/2014/main" xmlns="" id="{893F9275-F9D8-C846-B8BE-3571B6BA9792}"/>
+              </a:ext>
+            </a:extLst>
+          </p:cNvPr>
+          <p:cNvPicPr preferRelativeResize="0">
+            <a:picLocks noGrp="1"/>
+          </p:cNvPicPr>
+          <p:nvPr>
+            <p:ph type="pic" sz="quarter" idx="34"/>
+          </p:nvPr>
+        </p:nvPicPr>
+        <p:blipFill rotWithShape="1">
+          <a:blip r:embed="rId3">
+            <a:extLst>
+              <a:ext uri="{28A0092B-C50C-407E-A947-70E740481C1C}">
+                <a14:useLocalDpi xmlns:a14="http://schemas.microsoft.com/office/drawing/2010/main" val="0"/>
+              </a:ext>
+            </a:extLst>
+          </a:blip>
+          <a:srcRect l="-247" t="3192" r="247" b="3192"/>
+          <a:stretch/>
+        </p:blipFill>
+        <p:spPr>
+          <a:xfrm>
+            <a:off x="5475642" y="1269403"/>
+            <a:ext cx="6626709" cy="4970032"/>
+          </a:xfrm>
+          <a:prstGeom prst="roundRect">
+            <a:avLst>
+              <a:gd name="adj" fmla="val 21963"/>
+            </a:avLst>
+          </a:prstGeom>
+          <a:solidFill>
+            <a:srgbClr val="FFFFFF">
+              <a:shade val="85000"/>
+            </a:srgbClr>
+          </a:solidFill>
+          <a:ln>
+            <a:noFill/>
+          </a:ln>
+          <a:effectLst>
+            <a:outerShdw blurRad="44450" dist="27940" dir="5400000" algn="ctr">
+              <a:srgbClr val="000000">
+                <a:alpha val="32000"/>
+              </a:srgbClr>
+            </a:outerShdw>
+            <a:reflection blurRad="12700" stA="38000" endPos="28000" dist="5000" dir="5400000" sy="-100000" algn="bl" rotWithShape="0"/>
+          </a:effectLst>
+          <a:scene3d>
+            <a:camera prst="orthographicFront">
+              <a:rot lat="0" lon="0" rev="0"/>
+            </a:camera>
+            <a:lightRig rig="balanced" dir="t">
+              <a:rot lat="0" lon="0" rev="8700000"/>
+            </a:lightRig>
+          </a:scene3d>
+          <a:sp3d>
+            <a:bevelT w="190500" h="38100"/>
+          </a:sp3d>
+        </p:spPr>
+      </p:pic>
+      <p:sp>
+        <p:nvSpPr>
+          <p:cNvPr id="4" name="AutoShape 2" descr="World Health Day 2018: Inspiring Quotes, Theme, Slogans, Messages ..."/>
+          <p:cNvSpPr>
+            <a:spLocks noChangeAspect="1" noChangeArrowheads="1"/>
+          </p:cNvSpPr>
+          <p:nvPr/>
+        </p:nvSpPr>
+        <p:spPr bwMode="auto">
+          <a:xfrm>
+            <a:off x="156299" y="-152401"/>
+            <a:ext cx="304800" cy="304801"/>
+          </a:xfrm>
+          <a:prstGeom prst="rect">
+            <a:avLst/>
+          </a:prstGeom>
+          <a:noFill/>
+          <a:extLst>
+            <a:ext uri="{909E8E84-426E-40DD-AFC4-6F175D3DCCD1}">
+              <a14:hiddenFill xmlns:a14="http://schemas.microsoft.com/office/drawing/2010/main">
+                <a:solidFill>
+                  <a:srgbClr val="FFFFFF"/>
+                </a:solidFill>
+              </a14:hiddenFill>
+            </a:ext>
+          </a:extLst>
+        </p:spPr>
+        <p:txBody>
+          <a:bodyPr vert="horz" wrap="square" lIns="91440" tIns="45720" rIns="91440" bIns="45720" numCol="1" anchor="t" anchorCtr="0" compatLnSpc="1">
+            <a:prstTxWarp prst="textNoShape">
+              <a:avLst/>
+            </a:prstTxWarp>
+          </a:bodyPr>
+          <a:lstStyle/>
+          <a:p>
+            <a:endParaRPr lang="en-US"/>
+          </a:p>
+        </p:txBody>
+      </p:sp>
+      <p:pic>
+        <p:nvPicPr>
+          <p:cNvPr id="12" name="Picture 11"/>
+          <p:cNvPicPr>
+            <a:picLocks noChangeAspect="1"/>
+          </p:cNvPicPr>
+          <p:nvPr/>
+        </p:nvPicPr>
+        <p:blipFill>
+          <a:blip r:embed="rId4">
+            <a:extLst>
+              <a:ext uri="{28A0092B-C50C-407E-A947-70E740481C1C}">
+                <a14:useLocalDpi xmlns:a14="http://schemas.microsoft.com/office/drawing/2010/main" val="0"/>
+              </a:ext>
+            </a:extLst>
+          </a:blip>
+          <a:stretch>
+            <a:fillRect/>
+          </a:stretch>
+        </p:blipFill>
+        <p:spPr>
+          <a:xfrm>
+            <a:off x="9723299" y="124208"/>
+            <a:ext cx="2295679" cy="752107"/>
+          </a:xfrm>
+          <a:prstGeom prst="rect">
+            <a:avLst/>
+          </a:prstGeom>
+        </p:spPr>
+      </p:pic>
+    </p:spTree>
+    <p:extLst>
+      <p:ext uri="{BB962C8B-B14F-4D97-AF65-F5344CB8AC3E}">
+        <p14:creationId xmlns:p14="http://schemas.microsoft.com/office/powerpoint/2010/main" val="349472818"/>
+      </p:ext>
+    </p:extLst>
+  </p:cSld>
+  <p:clrMapOvr>
+    <a:masterClrMapping/>
+  </p:clrMapOvr>
+  <p:timing>
+    <p:tnLst>
+      <p:par>
+        <p:cTn id="1" dur="indefinite" restart="never" nodeType="tmRoot"/>
+      </p:par>
+    </p:tnLst>
+  </p:timing>
+</p:sld>
+</file>
+
+<file path=ppt/slides/slide11.xml><?xml version="1.0" encoding="utf-8"?>
+<p:sld xmlns:a="http://schemas.openxmlformats.org/drawingml/2006/main" xmlns:r="http://schemas.openxmlformats.org/officeDocument/2006/relationships" xmlns:p="http://schemas.openxmlformats.org/presentationml/2006/main">
+  <p:cSld>
+    <p:bg>
+      <p:bgPr>
+        <a:blipFill dpi="0" rotWithShape="1">
+          <a:blip r:embed="rId2">
+            <a:alphaModFix amt="83000"/>
+            <a:lum/>
+          </a:blip>
+          <a:srcRect/>
+          <a:stretch>
+            <a:fillRect l="1000"/>
+          </a:stretch>
+        </a:blipFill>
+        <a:effectLst/>
+      </p:bgPr>
+    </p:bg>
+    <p:spTree>
+      <p:nvGrpSpPr>
+        <p:cNvPr id="1" name=""/>
+        <p:cNvGrpSpPr/>
+        <p:nvPr/>
+      </p:nvGrpSpPr>
+      <p:grpSpPr>
+        <a:xfrm>
+          <a:off x="0" y="0"/>
+          <a:ext cx="0" cy="0"/>
+          <a:chOff x="0" y="0"/>
+          <a:chExt cx="0" cy="0"/>
+        </a:xfrm>
+      </p:grpSpPr>
+      <p:pic>
+        <p:nvPicPr>
+          <p:cNvPr id="2" name="Picture 1"/>
+          <p:cNvPicPr>
+            <a:picLocks noChangeAspect="1"/>
+          </p:cNvPicPr>
+          <p:nvPr/>
+        </p:nvPicPr>
+        <p:blipFill>
+          <a:blip r:embed="rId2">
+            <a:extLst>
+              <a:ext uri="{28A0092B-C50C-407E-A947-70E740481C1C}">
+                <a14:useLocalDpi xmlns:a14="http://schemas.microsoft.com/office/drawing/2010/main" val="0"/>
+              </a:ext>
+            </a:extLst>
+          </a:blip>
+          <a:stretch>
+            <a:fillRect/>
+          </a:stretch>
+        </p:blipFill>
+        <p:spPr>
+          <a:xfrm>
+            <a:off x="-1" y="0"/>
+            <a:ext cx="12338231" cy="6858000"/>
+          </a:xfrm>
+          <a:prstGeom prst="rect">
+            <a:avLst/>
+          </a:prstGeom>
+        </p:spPr>
+      </p:pic>
+      <p:pic>
+        <p:nvPicPr>
+          <p:cNvPr id="17" name="Picture Placeholder 16">
+            <a:extLst>
+              <a:ext uri="{FF2B5EF4-FFF2-40B4-BE49-F238E27FC236}">
+                <a16:creationId xmlns:a16="http://schemas.microsoft.com/office/drawing/2014/main" xmlns="" id="{893F9275-F9D8-C846-B8BE-3571B6BA9792}"/>
+              </a:ext>
+            </a:extLst>
+          </p:cNvPr>
+          <p:cNvPicPr preferRelativeResize="0">
+            <a:picLocks noGrp="1"/>
+          </p:cNvPicPr>
+          <p:nvPr>
+            <p:ph type="pic" sz="quarter" idx="34"/>
+          </p:nvPr>
+        </p:nvPicPr>
+        <p:blipFill rotWithShape="1">
+          <a:blip r:embed="rId3">
+            <a:extLst>
+              <a:ext uri="{28A0092B-C50C-407E-A947-70E740481C1C}">
+                <a14:useLocalDpi xmlns:a14="http://schemas.microsoft.com/office/drawing/2010/main" val="0"/>
+              </a:ext>
+            </a:extLst>
+          </a:blip>
+          <a:srcRect l="-247" t="3192" r="247" b="3192"/>
+          <a:stretch/>
+        </p:blipFill>
+        <p:spPr>
+          <a:xfrm>
+            <a:off x="5507914" y="1570617"/>
+            <a:ext cx="6522719" cy="4690335"/>
+          </a:xfrm>
+          <a:prstGeom prst="roundRect">
+            <a:avLst>
+              <a:gd name="adj" fmla="val 21963"/>
+            </a:avLst>
+          </a:prstGeom>
+          <a:solidFill>
+            <a:srgbClr val="FFFFFF">
+              <a:shade val="85000"/>
+            </a:srgbClr>
+          </a:solidFill>
+          <a:ln>
+            <a:noFill/>
+          </a:ln>
+          <a:effectLst>
+            <a:outerShdw blurRad="44450" dist="27940" dir="5400000" algn="ctr">
+              <a:srgbClr val="000000">
+                <a:alpha val="32000"/>
+              </a:srgbClr>
+            </a:outerShdw>
+            <a:reflection blurRad="12700" stA="38000" endPos="28000" dist="5000" dir="5400000" sy="-100000" algn="bl" rotWithShape="0"/>
+          </a:effectLst>
+          <a:scene3d>
+            <a:camera prst="orthographicFront">
+              <a:rot lat="0" lon="0" rev="0"/>
+            </a:camera>
+            <a:lightRig rig="balanced" dir="t">
+              <a:rot lat="0" lon="0" rev="8700000"/>
+            </a:lightRig>
+          </a:scene3d>
+          <a:sp3d>
+            <a:bevelT w="190500" h="38100"/>
+          </a:sp3d>
+        </p:spPr>
+      </p:pic>
+      <p:sp>
+        <p:nvSpPr>
+          <p:cNvPr id="4" name="AutoShape 2" descr="World Health Day 2018: Inspiring Quotes, Theme, Slogans, Messages ..."/>
+          <p:cNvSpPr>
+            <a:spLocks noChangeAspect="1" noChangeArrowheads="1"/>
+          </p:cNvSpPr>
+          <p:nvPr/>
+        </p:nvSpPr>
+        <p:spPr bwMode="auto">
+          <a:xfrm>
+            <a:off x="156299" y="-152401"/>
+            <a:ext cx="304800" cy="304801"/>
+          </a:xfrm>
+          <a:prstGeom prst="rect">
+            <a:avLst/>
+          </a:prstGeom>
+          <a:noFill/>
+          <a:extLst>
+            <a:ext uri="{909E8E84-426E-40DD-AFC4-6F175D3DCCD1}">
+              <a14:hiddenFill xmlns:a14="http://schemas.microsoft.com/office/drawing/2010/main">
+                <a:solidFill>
+                  <a:srgbClr val="FFFFFF"/>
+                </a:solidFill>
+              </a14:hiddenFill>
+            </a:ext>
+          </a:extLst>
+        </p:spPr>
+        <p:txBody>
+          <a:bodyPr vert="horz" wrap="square" lIns="91440" tIns="45720" rIns="91440" bIns="45720" numCol="1" anchor="t" anchorCtr="0" compatLnSpc="1">
+            <a:prstTxWarp prst="textNoShape">
+              <a:avLst/>
+            </a:prstTxWarp>
+          </a:bodyPr>
+          <a:lstStyle/>
+          <a:p>
+            <a:endParaRPr lang="en-US"/>
+          </a:p>
+        </p:txBody>
+      </p:sp>
+      <p:pic>
+        <p:nvPicPr>
+          <p:cNvPr id="7" name="Picture 6"/>
+          <p:cNvPicPr>
+            <a:picLocks noChangeAspect="1"/>
+          </p:cNvPicPr>
+          <p:nvPr/>
+        </p:nvPicPr>
+        <p:blipFill>
+          <a:blip r:embed="rId4">
+            <a:extLst>
+              <a:ext uri="{28A0092B-C50C-407E-A947-70E740481C1C}">
+                <a14:useLocalDpi xmlns:a14="http://schemas.microsoft.com/office/drawing/2010/main" val="0"/>
+              </a:ext>
+            </a:extLst>
+          </a:blip>
+          <a:stretch>
+            <a:fillRect/>
+          </a:stretch>
+        </p:blipFill>
+        <p:spPr>
+          <a:xfrm>
+            <a:off x="10561848" y="125505"/>
+            <a:ext cx="1379141" cy="1039457"/>
+          </a:xfrm>
+          <a:prstGeom prst="rect">
+            <a:avLst/>
+          </a:prstGeom>
+        </p:spPr>
+      </p:pic>
+    </p:spTree>
+    <p:extLst>
+      <p:ext uri="{BB962C8B-B14F-4D97-AF65-F5344CB8AC3E}">
+        <p14:creationId xmlns:p14="http://schemas.microsoft.com/office/powerpoint/2010/main" val="1456638035"/>
+      </p:ext>
+    </p:extLst>
+  </p:cSld>
+  <p:clrMapOvr>
+    <a:masterClrMapping/>
+  </p:clrMapOvr>
+  <p:timing>
+    <p:tnLst>
+      <p:par>
+        <p:cTn id="1" dur="indefinite" restart="never" nodeType="tmRoot"/>
+      </p:par>
+    </p:tnLst>
+  </p:timing>
+</p:sld>
+</file>
+
+<file path=ppt/slides/slide12.xml><?xml version="1.0" encoding="utf-8"?>
+<p:sld xmlns:a="http://schemas.openxmlformats.org/drawingml/2006/main" xmlns:r="http://schemas.openxmlformats.org/officeDocument/2006/relationships" xmlns:p="http://schemas.openxmlformats.org/presentationml/2006/main">
+  <p:cSld>
     <p:spTree>
       <p:nvGrpSpPr>
         <p:cNvPr id="1" name=""/>
@@ -26360,7 +26796,7 @@
             <a:fld id="{19B51A1E-902D-48AF-9020-955120F399B6}" type="slidenum">
               <a:rPr lang="en-US" smtClean="0"/>
               <a:pPr/>
-              <a:t>10</a:t>
+              <a:t>12</a:t>
             </a:fld>
             <a:endParaRPr lang="en-US" dirty="0"/>
           </a:p>
@@ -26386,7 +26822,7 @@
 </p:sld>
 </file>
 
-<file path=ppt/slides/slide11.xml><?xml version="1.0" encoding="utf-8"?>
+<file path=ppt/slides/slide13.xml><?xml version="1.0" encoding="utf-8"?>
 <p:sld xmlns:a="http://schemas.openxmlformats.org/drawingml/2006/main" xmlns:r="http://schemas.openxmlformats.org/officeDocument/2006/relationships" xmlns:p="http://schemas.openxmlformats.org/presentationml/2006/main">
   <p:cSld>
     <p:spTree>
@@ -26483,7 +26919,7 @@
             <a:fld id="{19B51A1E-902D-48AF-9020-955120F399B6}" type="slidenum">
               <a:rPr lang="en-US" smtClean="0"/>
               <a:pPr/>
-              <a:t>11</a:t>
+              <a:t>13</a:t>
             </a:fld>
             <a:endParaRPr lang="en-US" dirty="0"/>
           </a:p>
@@ -26602,7 +27038,7 @@
 </p:sld>
 </file>
 
-<file path=ppt/slides/slide12.xml><?xml version="1.0" encoding="utf-8"?>
+<file path=ppt/slides/slide14.xml><?xml version="1.0" encoding="utf-8"?>
 <p:sld xmlns:a="http://schemas.openxmlformats.org/drawingml/2006/main" xmlns:r="http://schemas.openxmlformats.org/officeDocument/2006/relationships" xmlns:p="http://schemas.openxmlformats.org/presentationml/2006/main">
   <p:cSld>
     <p:spTree>
@@ -29884,7 +30320,7 @@
             <a:fld id="{19B51A1E-902D-48AF-9020-955120F399B6}" type="slidenum">
               <a:rPr lang="en-US" smtClean="0"/>
               <a:pPr/>
-              <a:t>12</a:t>
+              <a:t>14</a:t>
             </a:fld>
             <a:endParaRPr lang="en-US" dirty="0"/>
           </a:p>
@@ -29900,10 +30336,17 @@
   <p:clrMapOvr>
     <a:masterClrMapping/>
   </p:clrMapOvr>
+  <p:timing>
+    <p:tnLst>
+      <p:par>
+        <p:cTn id="1" dur="indefinite" restart="never" nodeType="tmRoot"/>
+      </p:par>
+    </p:tnLst>
+  </p:timing>
 </p:sld>
 </file>
 
-<file path=ppt/slides/slide13.xml><?xml version="1.0" encoding="utf-8"?>
+<file path=ppt/slides/slide15.xml><?xml version="1.0" encoding="utf-8"?>
 <p:sld xmlns:a="http://schemas.openxmlformats.org/drawingml/2006/main" xmlns:r="http://schemas.openxmlformats.org/officeDocument/2006/relationships" xmlns:p="http://schemas.openxmlformats.org/presentationml/2006/main">
   <p:cSld>
     <p:spTree>
@@ -30273,7 +30716,7 @@
             <a:fld id="{19B51A1E-902D-48AF-9020-955120F399B6}" type="slidenum">
               <a:rPr lang="en-US" smtClean="0"/>
               <a:pPr/>
-              <a:t>13</a:t>
+              <a:t>15</a:t>
             </a:fld>
             <a:endParaRPr lang="en-US" dirty="0"/>
           </a:p>
@@ -30292,7 +30735,7 @@
 </p:sld>
 </file>
 
-<file path=ppt/slides/slide14.xml><?xml version="1.0" encoding="utf-8"?>
+<file path=ppt/slides/slide16.xml><?xml version="1.0" encoding="utf-8"?>
 <p:sld xmlns:a="http://schemas.openxmlformats.org/drawingml/2006/main" xmlns:r="http://schemas.openxmlformats.org/officeDocument/2006/relationships" xmlns:p="http://schemas.openxmlformats.org/presentationml/2006/main">
   <p:cSld>
     <p:spTree>
@@ -31238,7 +31681,7 @@
 </p:sld>
 </file>
 
-<file path=ppt/slides/slide15.xml><?xml version="1.0" encoding="utf-8"?>
+<file path=ppt/slides/slide17.xml><?xml version="1.0" encoding="utf-8"?>
 <p:sld xmlns:a="http://schemas.openxmlformats.org/drawingml/2006/main" xmlns:r="http://schemas.openxmlformats.org/officeDocument/2006/relationships" xmlns:p="http://schemas.openxmlformats.org/presentationml/2006/main">
   <p:cSld>
     <p:spTree>
@@ -31356,7 +31799,7 @@
             <a:fld id="{19B51A1E-902D-48AF-9020-955120F399B6}" type="slidenum">
               <a:rPr lang="en-US" smtClean="0"/>
               <a:pPr/>
-              <a:t>15</a:t>
+              <a:t>17</a:t>
             </a:fld>
             <a:endParaRPr lang="en-US" dirty="0"/>
           </a:p>
@@ -36979,6 +37422,15 @@
 </file>
 
 <file path=customXml/item1.xml><?xml version="1.0" encoding="utf-8"?>
+<?mso-contentType ?>
+<FormTemplates xmlns="http://schemas.microsoft.com/sharepoint/v3/contenttype/forms">
+  <Display>DocumentLibraryForm</Display>
+  <Edit>DocumentLibraryForm</Edit>
+  <New>DocumentLibraryForm</New>
+</FormTemplates>
+</file>
+
+<file path=customXml/item2.xml><?xml version="1.0" encoding="utf-8"?>
 <ct:contentTypeSchema xmlns:ct="http://schemas.microsoft.com/office/2006/metadata/contentType" xmlns:ma="http://schemas.microsoft.com/office/2006/metadata/properties/metaAttributes" ct:_="" ma:_="" ma:contentTypeName="Document" ma:contentTypeID="0x01010079F111ED35F8CC479449609E8A0923A6" ma:contentTypeVersion="11" ma:contentTypeDescription="Create a new document." ma:contentTypeScope="" ma:versionID="96291512c1ee715ab617f4c07df79fc1">
   <xsd:schema xmlns:xsd="http://www.w3.org/2001/XMLSchema" xmlns:xs="http://www.w3.org/2001/XMLSchema" xmlns:p="http://schemas.microsoft.com/office/2006/metadata/properties" xmlns:ns2="71af3243-3dd4-4a8d-8c0d-dd76da1f02a5" xmlns:ns3="16c05727-aa75-4e4a-9b5f-8a80a1165891" targetNamespace="http://schemas.microsoft.com/office/2006/metadata/properties" ma:root="true" ma:fieldsID="8256c27c40ca5c40ce1cf6c44f0205df" ns2:_="" ns3:_="">
     <xsd:import namespace="71af3243-3dd4-4a8d-8c0d-dd76da1f02a5"/>
@@ -37189,7 +37641,7 @@
 </ct:contentTypeSchema>
 </file>
 
-<file path=customXml/item2.xml><?xml version="1.0" encoding="utf-8"?>
+<file path=customXml/item3.xml><?xml version="1.0" encoding="utf-8"?>
 <p:properties xmlns:p="http://schemas.microsoft.com/office/2006/metadata/properties" xmlns:xsi="http://www.w3.org/2001/XMLSchema-instance" xmlns:pc="http://schemas.microsoft.com/office/infopath/2007/PartnerControls">
   <documentManagement>
     <MediaServiceKeyPoints xmlns="71af3243-3dd4-4a8d-8c0d-dd76da1f02a5" xsi:nil="true"/>
@@ -37197,16 +37649,15 @@
 </p:properties>
 </file>
 
-<file path=customXml/item3.xml><?xml version="1.0" encoding="utf-8"?>
-<?mso-contentType ?>
-<FormTemplates xmlns="http://schemas.microsoft.com/sharepoint/v3/contenttype/forms">
-  <Display>DocumentLibraryForm</Display>
-  <Edit>DocumentLibraryForm</Edit>
-  <New>DocumentLibraryForm</New>
-</FormTemplates>
+<file path=customXml/itemProps1.xml><?xml version="1.0" encoding="utf-8"?>
+<ds:datastoreItem xmlns:ds="http://schemas.openxmlformats.org/officeDocument/2006/customXml" ds:itemID="{8A930687-51F2-44C8-9CE6-D1B3D6E17522}">
+  <ds:schemaRefs>
+    <ds:schemaRef ds:uri="http://schemas.microsoft.com/sharepoint/v3/contenttype/forms"/>
+  </ds:schemaRefs>
+</ds:datastoreItem>
 </file>
 
-<file path=customXml/itemProps1.xml><?xml version="1.0" encoding="utf-8"?>
+<file path=customXml/itemProps2.xml><?xml version="1.0" encoding="utf-8"?>
 <ds:datastoreItem xmlns:ds="http://schemas.openxmlformats.org/officeDocument/2006/customXml" ds:itemID="{29AE7CBC-C35C-4FA9-B339-59E31F30C6AC}">
   <ds:schemaRefs>
     <ds:schemaRef ds:uri="http://schemas.microsoft.com/office/2006/metadata/contentType"/>
@@ -37225,7 +37676,7 @@
 </ds:datastoreItem>
 </file>
 
-<file path=customXml/itemProps2.xml><?xml version="1.0" encoding="utf-8"?>
+<file path=customXml/itemProps3.xml><?xml version="1.0" encoding="utf-8"?>
 <ds:datastoreItem xmlns:ds="http://schemas.openxmlformats.org/officeDocument/2006/customXml" ds:itemID="{A861FE8A-8F15-409F-AF62-619C69C0D537}">
   <ds:schemaRefs>
     <ds:schemaRef ds:uri="http://schemas.microsoft.com/office/2006/metadata/properties"/>
@@ -37233,12 +37684,4 @@
     <ds:schemaRef ds:uri="71af3243-3dd4-4a8d-8c0d-dd76da1f02a5"/>
   </ds:schemaRefs>
 </ds:datastoreItem>
-</file>
-
-<file path=customXml/itemProps3.xml><?xml version="1.0" encoding="utf-8"?>
-<ds:datastoreItem xmlns:ds="http://schemas.openxmlformats.org/officeDocument/2006/customXml" ds:itemID="{8A930687-51F2-44C8-9CE6-D1B3D6E17522}">
-  <ds:schemaRefs>
-    <ds:schemaRef ds:uri="http://schemas.microsoft.com/sharepoint/v3/contenttype/forms"/>
-  </ds:schemaRefs>
-</ds:datastoreItem>
 </file>
</xml_diff>

<commit_message>
Final changes  before deployment
</commit_message>
<xml_diff>
--- a/IqHealth/Marketing/HealthIQ-3.pptx
+++ b/IqHealth/Marketing/HealthIQ-3.pptx
@@ -5,10 +5,10 @@
     <p:sldMasterId id="2147483648" r:id="rId4"/>
   </p:sldMasterIdLst>
   <p:notesMasterIdLst>
-    <p:notesMasterId r:id="rId22"/>
+    <p:notesMasterId r:id="rId26"/>
   </p:notesMasterIdLst>
   <p:handoutMasterIdLst>
-    <p:handoutMasterId r:id="rId23"/>
+    <p:handoutMasterId r:id="rId27"/>
   </p:handoutMasterIdLst>
   <p:sldIdLst>
     <p:sldId id="282" r:id="rId5"/>
@@ -23,11 +23,15 @@
     <p:sldId id="301" r:id="rId14"/>
     <p:sldId id="302" r:id="rId15"/>
     <p:sldId id="284" r:id="rId16"/>
-    <p:sldId id="294" r:id="rId17"/>
-    <p:sldId id="295" r:id="rId18"/>
-    <p:sldId id="285" r:id="rId19"/>
-    <p:sldId id="296" r:id="rId20"/>
-    <p:sldId id="256" r:id="rId21"/>
+    <p:sldId id="303" r:id="rId17"/>
+    <p:sldId id="305" r:id="rId18"/>
+    <p:sldId id="306" r:id="rId19"/>
+    <p:sldId id="304" r:id="rId20"/>
+    <p:sldId id="294" r:id="rId21"/>
+    <p:sldId id="295" r:id="rId22"/>
+    <p:sldId id="285" r:id="rId23"/>
+    <p:sldId id="296" r:id="rId24"/>
+    <p:sldId id="256" r:id="rId25"/>
   </p:sldIdLst>
   <p:sldSz cx="12192000" cy="6858000"/>
   <p:notesSz cx="6858000" cy="9144000"/>
@@ -364,11 +368,11 @@
           <c:showBubbleSize val="0"/>
         </c:dLbls>
         <c:gapWidth val="25"/>
-        <c:axId val="-2138458672"/>
-        <c:axId val="-2138459216"/>
+        <c:axId val="-1210630512"/>
+        <c:axId val="-1210625616"/>
       </c:barChart>
       <c:catAx>
-        <c:axId val="-2138458672"/>
+        <c:axId val="-1210630512"/>
         <c:scaling>
           <c:orientation val="minMax"/>
         </c:scaling>
@@ -411,7 +415,7 @@
             <a:endParaRPr lang="en-US"/>
           </a:p>
         </c:txPr>
-        <c:crossAx val="-2138459216"/>
+        <c:crossAx val="-1210625616"/>
         <c:crosses val="autoZero"/>
         <c:auto val="1"/>
         <c:lblAlgn val="ctr"/>
@@ -419,7 +423,7 @@
         <c:noMultiLvlLbl val="0"/>
       </c:catAx>
       <c:valAx>
-        <c:axId val="-2138459216"/>
+        <c:axId val="-1210625616"/>
         <c:scaling>
           <c:orientation val="minMax"/>
         </c:scaling>
@@ -470,7 +474,7 @@
             <a:endParaRPr lang="en-US"/>
           </a:p>
         </c:txPr>
-        <c:crossAx val="-2138458672"/>
+        <c:crossAx val="-1210630512"/>
         <c:crosses val="autoZero"/>
         <c:crossBetween val="between"/>
       </c:valAx>
@@ -1237,11 +1241,11 @@
         </c:dLbls>
         <c:marker val="1"/>
         <c:smooth val="0"/>
-        <c:axId val="-2077024512"/>
-        <c:axId val="-2077026144"/>
+        <c:axId val="-1210629424"/>
+        <c:axId val="-1210623440"/>
       </c:lineChart>
       <c:catAx>
-        <c:axId val="-2077024512"/>
+        <c:axId val="-1210629424"/>
         <c:scaling>
           <c:orientation val="minMax"/>
         </c:scaling>
@@ -1284,7 +1288,7 @@
             <a:endParaRPr lang="en-US"/>
           </a:p>
         </c:txPr>
-        <c:crossAx val="-2077026144"/>
+        <c:crossAx val="-1210623440"/>
         <c:crosses val="autoZero"/>
         <c:auto val="1"/>
         <c:lblAlgn val="ctr"/>
@@ -1292,7 +1296,7 @@
         <c:noMultiLvlLbl val="0"/>
       </c:catAx>
       <c:valAx>
-        <c:axId val="-2077026144"/>
+        <c:axId val="-1210623440"/>
         <c:scaling>
           <c:orientation val="minMax"/>
         </c:scaling>
@@ -1343,7 +1347,7 @@
             <a:endParaRPr lang="en-US"/>
           </a:p>
         </c:txPr>
-        <c:crossAx val="-2077024512"/>
+        <c:crossAx val="-1210629424"/>
         <c:crosses val="autoZero"/>
         <c:crossBetween val="between"/>
       </c:valAx>
@@ -3112,7 +3116,7 @@
           <a:p>
             <a:fld id="{EF1077DB-935E-4A0A-947A-D283B9F9F452}" type="datetimeFigureOut">
               <a:rPr lang="en-US" smtClean="0"/>
-              <a:t>14-Apr-20</a:t>
+              <a:t>21-Apr-20</a:t>
             </a:fld>
             <a:endParaRPr lang="en-US"/>
           </a:p>
@@ -3289,7 +3293,7 @@
           <a:p>
             <a:fld id="{2D9EC30E-1A71-4188-9BE7-E2A64929A436}" type="datetimeFigureOut">
               <a:rPr lang="en-US" noProof="0" smtClean="0"/>
-              <a:t>14-Apr-20</a:t>
+              <a:t>21-Apr-20</a:t>
             </a:fld>
             <a:endParaRPr lang="en-US" noProof="0"/>
           </a:p>
@@ -26647,53 +26651,6 @@
       </p:sp>
       <p:sp>
         <p:nvSpPr>
-          <p:cNvPr id="5" name="Content Placeholder 4">
-            <a:extLst>
-              <a:ext uri="{FF2B5EF4-FFF2-40B4-BE49-F238E27FC236}">
-                <a16:creationId xmlns:a16="http://schemas.microsoft.com/office/drawing/2014/main" xmlns="" id="{CEEB3BAE-C0B2-447C-B8BE-96C6BD84D658}"/>
-              </a:ext>
-            </a:extLst>
-          </p:cNvPr>
-          <p:cNvSpPr>
-            <a:spLocks noGrp="1"/>
-          </p:cNvSpPr>
-          <p:nvPr>
-            <p:ph sz="half" idx="2"/>
-          </p:nvPr>
-        </p:nvSpPr>
-        <p:spPr>
-          <a:xfrm>
-            <a:off x="432000" y="2967097"/>
-            <a:ext cx="5472000" cy="1882828"/>
-          </a:xfrm>
-        </p:spPr>
-        <p:txBody>
-          <a:bodyPr/>
-          <a:lstStyle/>
-          <a:p>
-            <a:r>
-              <a:rPr lang="en-US" dirty="0"/>
-              <a:t>Nulla a erat eget nunc hendrerit ultrices eu nec nulla. Donec viverra leo aliquet, auctor quam id, convallis orci. </a:t>
-            </a:r>
-          </a:p>
-          <a:p>
-            <a:pPr lvl="1"/>
-            <a:r>
-              <a:rPr lang="en-US" dirty="0"/>
-              <a:t>Sed in molestie est. Cras ornare turpis at ligula posuere, sit amet accumsan neque lobortis.</a:t>
-            </a:r>
-          </a:p>
-          <a:p>
-            <a:pPr lvl="1"/>
-            <a:r>
-              <a:rPr lang="en-US" dirty="0"/>
-              <a:t>Maecenas mattis risus ligula, sed ullamcorper nunc efficitur sed. </a:t>
-            </a:r>
-          </a:p>
-        </p:txBody>
-      </p:sp>
-      <p:sp>
-        <p:nvSpPr>
           <p:cNvPr id="6" name="Text Placeholder 5">
             <a:extLst>
               <a:ext uri="{FF2B5EF4-FFF2-40B4-BE49-F238E27FC236}">
@@ -26799,6 +26756,166 @@
               <a:t>12</a:t>
             </a:fld>
             <a:endParaRPr lang="en-US" dirty="0"/>
+          </a:p>
+        </p:txBody>
+      </p:sp>
+      <p:pic>
+        <p:nvPicPr>
+          <p:cNvPr id="1026" name="Picture 2" descr="corona Archives - Save the Children Action Network"/>
+          <p:cNvPicPr>
+            <a:picLocks noChangeAspect="1" noChangeArrowheads="1"/>
+          </p:cNvPicPr>
+          <p:nvPr/>
+        </p:nvPicPr>
+        <p:blipFill>
+          <a:blip r:embed="rId2">
+            <a:extLst>
+              <a:ext uri="{28A0092B-C50C-407E-A947-70E740481C1C}">
+                <a14:useLocalDpi xmlns:a14="http://schemas.microsoft.com/office/drawing/2010/main" val="0"/>
+              </a:ext>
+            </a:extLst>
+          </a:blip>
+          <a:srcRect/>
+          <a:stretch>
+            <a:fillRect/>
+          </a:stretch>
+        </p:blipFill>
+        <p:spPr bwMode="auto">
+          <a:xfrm>
+            <a:off x="0" y="-41349"/>
+            <a:ext cx="13120790" cy="6899349"/>
+          </a:xfrm>
+          <a:prstGeom prst="rect">
+            <a:avLst/>
+          </a:prstGeom>
+          <a:noFill/>
+          <a:extLst>
+            <a:ext uri="{909E8E84-426E-40DD-AFC4-6F175D3DCCD1}">
+              <a14:hiddenFill xmlns:a14="http://schemas.microsoft.com/office/drawing/2010/main">
+                <a:solidFill>
+                  <a:srgbClr val="FFFFFF"/>
+                </a:solidFill>
+              </a14:hiddenFill>
+            </a:ext>
+          </a:extLst>
+        </p:spPr>
+      </p:pic>
+      <p:sp>
+        <p:nvSpPr>
+          <p:cNvPr id="11" name="Rectangle 10"/>
+          <p:cNvSpPr/>
+          <p:nvPr/>
+        </p:nvSpPr>
+        <p:spPr>
+          <a:xfrm>
+            <a:off x="3802464" y="844228"/>
+            <a:ext cx="7968849" cy="1938992"/>
+          </a:xfrm>
+          <a:prstGeom prst="rect">
+            <a:avLst/>
+          </a:prstGeom>
+          <a:noFill/>
+        </p:spPr>
+        <p:txBody>
+          <a:bodyPr wrap="none" lIns="91440" tIns="45720" rIns="91440" bIns="45720">
+            <a:spAutoFit/>
+          </a:bodyPr>
+          <a:lstStyle/>
+          <a:p>
+            <a:pPr algn="ctr"/>
+            <a:r>
+              <a:rPr lang="en-US" sz="6000" b="1" dirty="0" smtClean="0">
+                <a:ln w="0"/>
+                <a:gradFill>
+                  <a:gsLst>
+                    <a:gs pos="0">
+                      <a:schemeClr val="accent5">
+                        <a:lumMod val="50000"/>
+                      </a:schemeClr>
+                    </a:gs>
+                    <a:gs pos="50000">
+                      <a:schemeClr val="accent5"/>
+                    </a:gs>
+                    <a:gs pos="100000">
+                      <a:schemeClr val="accent5">
+                        <a:lumMod val="60000"/>
+                        <a:lumOff val="40000"/>
+                      </a:schemeClr>
+                    </a:gs>
+                  </a:gsLst>
+                  <a:lin ang="5400000"/>
+                </a:gradFill>
+                <a:effectLst>
+                  <a:reflection blurRad="6350" stA="53000" endA="300" endPos="35500" dir="5400000" sy="-90000" algn="bl" rotWithShape="0"/>
+                </a:effectLst>
+                <a:latin typeface="Verdana" panose="020B0604030504040204" pitchFamily="34" charset="0"/>
+                <a:ea typeface="Verdana" panose="020B0604030504040204" pitchFamily="34" charset="0"/>
+                <a:cs typeface="Verdana" panose="020B0604030504040204" pitchFamily="34" charset="0"/>
+              </a:rPr>
+              <a:t>KEEP YOUR BABY </a:t>
+            </a:r>
+          </a:p>
+          <a:p>
+            <a:pPr algn="ctr"/>
+            <a:r>
+              <a:rPr lang="en-US" sz="6000" b="1" dirty="0" smtClean="0">
+                <a:ln w="0"/>
+                <a:gradFill>
+                  <a:gsLst>
+                    <a:gs pos="0">
+                      <a:schemeClr val="accent5">
+                        <a:lumMod val="50000"/>
+                      </a:schemeClr>
+                    </a:gs>
+                    <a:gs pos="50000">
+                      <a:schemeClr val="accent5"/>
+                    </a:gs>
+                    <a:gs pos="100000">
+                      <a:schemeClr val="accent5">
+                        <a:lumMod val="60000"/>
+                        <a:lumOff val="40000"/>
+                      </a:schemeClr>
+                    </a:gs>
+                  </a:gsLst>
+                  <a:lin ang="5400000"/>
+                </a:gradFill>
+                <a:effectLst>
+                  <a:reflection blurRad="6350" stA="53000" endA="300" endPos="35500" dir="5400000" sy="-90000" algn="bl" rotWithShape="0"/>
+                </a:effectLst>
+                <a:latin typeface="Verdana" panose="020B0604030504040204" pitchFamily="34" charset="0"/>
+                <a:ea typeface="Verdana" panose="020B0604030504040204" pitchFamily="34" charset="0"/>
+                <a:cs typeface="Verdana" panose="020B0604030504040204" pitchFamily="34" charset="0"/>
+              </a:rPr>
+              <a:t>SAFE</a:t>
+            </a:r>
+            <a:endParaRPr lang="en-US" sz="6000" b="1" dirty="0">
+              <a:ln w="0"/>
+              <a:gradFill>
+                <a:gsLst>
+                  <a:gs pos="0">
+                    <a:schemeClr val="accent5">
+                      <a:lumMod val="50000"/>
+                    </a:schemeClr>
+                  </a:gs>
+                  <a:gs pos="50000">
+                    <a:schemeClr val="accent5"/>
+                  </a:gs>
+                  <a:gs pos="100000">
+                    <a:schemeClr val="accent5">
+                      <a:lumMod val="60000"/>
+                      <a:lumOff val="40000"/>
+                    </a:schemeClr>
+                  </a:gs>
+                </a:gsLst>
+                <a:lin ang="5400000"/>
+              </a:gradFill>
+              <a:effectLst>
+                <a:reflection blurRad="6350" stA="53000" endA="300" endPos="35500" dir="5400000" sy="-90000" algn="bl" rotWithShape="0"/>
+              </a:effectLst>
+              <a:latin typeface="Verdana" panose="020B0604030504040204" pitchFamily="34" charset="0"/>
+              <a:ea typeface="Verdana" panose="020B0604030504040204" pitchFamily="34" charset="0"/>
+              <a:cs typeface="Verdana" panose="020B0604030504040204" pitchFamily="34" charset="0"/>
+            </a:endParaRPr>
           </a:p>
         </p:txBody>
       </p:sp>
@@ -26844,6 +26961,1414 @@
           <p:cNvPr id="2" name="Title 1">
             <a:extLst>
               <a:ext uri="{FF2B5EF4-FFF2-40B4-BE49-F238E27FC236}">
+                <a16:creationId xmlns:a16="http://schemas.microsoft.com/office/drawing/2014/main" xmlns="" id="{19304E83-A4F0-49C5-BB01-F5773509A2B3}"/>
+              </a:ext>
+            </a:extLst>
+          </p:cNvPr>
+          <p:cNvSpPr>
+            <a:spLocks noGrp="1"/>
+          </p:cNvSpPr>
+          <p:nvPr>
+            <p:ph type="title"/>
+          </p:nvPr>
+        </p:nvSpPr>
+        <p:spPr/>
+        <p:txBody>
+          <a:bodyPr/>
+          <a:lstStyle/>
+          <a:p>
+            <a:r>
+              <a:rPr lang="en-US" dirty="0"/>
+              <a:t>Comparison</a:t>
+            </a:r>
+          </a:p>
+        </p:txBody>
+      </p:sp>
+      <p:sp>
+        <p:nvSpPr>
+          <p:cNvPr id="3" name="Text Placeholder 2">
+            <a:extLst>
+              <a:ext uri="{FF2B5EF4-FFF2-40B4-BE49-F238E27FC236}">
+                <a16:creationId xmlns:a16="http://schemas.microsoft.com/office/drawing/2014/main" xmlns="" id="{7CA42D59-EAD6-4F95-84F1-32A30F057856}"/>
+              </a:ext>
+            </a:extLst>
+          </p:cNvPr>
+          <p:cNvSpPr>
+            <a:spLocks noGrp="1"/>
+          </p:cNvSpPr>
+          <p:nvPr>
+            <p:ph type="body" sz="quarter" idx="32"/>
+          </p:nvPr>
+        </p:nvSpPr>
+        <p:spPr/>
+        <p:txBody>
+          <a:bodyPr/>
+          <a:lstStyle/>
+          <a:p>
+            <a:r>
+              <a:rPr lang="en-US" dirty="0"/>
+              <a:t>Lorem ipsum dolor sit amet, consectetur adipiscing elit. </a:t>
+            </a:r>
+          </a:p>
+        </p:txBody>
+      </p:sp>
+      <p:sp>
+        <p:nvSpPr>
+          <p:cNvPr id="4" name="Text Placeholder 3">
+            <a:extLst>
+              <a:ext uri="{FF2B5EF4-FFF2-40B4-BE49-F238E27FC236}">
+                <a16:creationId xmlns:a16="http://schemas.microsoft.com/office/drawing/2014/main" xmlns="" id="{6AB259A0-0017-492F-A0DC-4B70C7052AE0}"/>
+              </a:ext>
+            </a:extLst>
+          </p:cNvPr>
+          <p:cNvSpPr>
+            <a:spLocks noGrp="1"/>
+          </p:cNvSpPr>
+          <p:nvPr>
+            <p:ph type="body" idx="1"/>
+          </p:nvPr>
+        </p:nvSpPr>
+        <p:spPr>
+          <a:xfrm>
+            <a:off x="432000" y="2459263"/>
+            <a:ext cx="5472000" cy="360000"/>
+          </a:xfrm>
+        </p:spPr>
+        <p:txBody>
+          <a:bodyPr/>
+          <a:lstStyle/>
+          <a:p>
+            <a:r>
+              <a:rPr lang="en-US" dirty="0"/>
+              <a:t>Proseware</a:t>
+            </a:r>
+          </a:p>
+        </p:txBody>
+      </p:sp>
+      <p:sp>
+        <p:nvSpPr>
+          <p:cNvPr id="6" name="Text Placeholder 5">
+            <a:extLst>
+              <a:ext uri="{FF2B5EF4-FFF2-40B4-BE49-F238E27FC236}">
+                <a16:creationId xmlns:a16="http://schemas.microsoft.com/office/drawing/2014/main" xmlns="" id="{B237D1CA-B91A-410E-A968-D017BBE99F99}"/>
+              </a:ext>
+            </a:extLst>
+          </p:cNvPr>
+          <p:cNvSpPr>
+            <a:spLocks noGrp="1"/>
+          </p:cNvSpPr>
+          <p:nvPr>
+            <p:ph type="body" sz="quarter" idx="13"/>
+          </p:nvPr>
+        </p:nvSpPr>
+        <p:spPr>
+          <a:xfrm>
+            <a:off x="6300000" y="2459788"/>
+            <a:ext cx="5472000" cy="358775"/>
+          </a:xfrm>
+        </p:spPr>
+        <p:txBody>
+          <a:bodyPr/>
+          <a:lstStyle/>
+          <a:p>
+            <a:r>
+              <a:rPr lang="en-US" dirty="0"/>
+              <a:t>Competitive Service</a:t>
+            </a:r>
+          </a:p>
+        </p:txBody>
+      </p:sp>
+      <p:sp>
+        <p:nvSpPr>
+          <p:cNvPr id="7" name="Text Placeholder 6">
+            <a:extLst>
+              <a:ext uri="{FF2B5EF4-FFF2-40B4-BE49-F238E27FC236}">
+                <a16:creationId xmlns:a16="http://schemas.microsoft.com/office/drawing/2014/main" xmlns="" id="{26A87885-D672-4CF9-A78D-CFE98385B03A}"/>
+              </a:ext>
+            </a:extLst>
+          </p:cNvPr>
+          <p:cNvSpPr>
+            <a:spLocks noGrp="1"/>
+          </p:cNvSpPr>
+          <p:nvPr>
+            <p:ph type="body" sz="quarter" idx="12"/>
+          </p:nvPr>
+        </p:nvSpPr>
+        <p:spPr>
+          <a:xfrm>
+            <a:off x="6299887" y="2963789"/>
+            <a:ext cx="5472113" cy="1883984"/>
+          </a:xfrm>
+        </p:spPr>
+        <p:txBody>
+          <a:bodyPr/>
+          <a:lstStyle/>
+          <a:p>
+            <a:r>
+              <a:rPr lang="en-US" dirty="0"/>
+              <a:t>Praesent venenatis quam tortor, viverra nunc rutrum. </a:t>
+            </a:r>
+          </a:p>
+          <a:p>
+            <a:pPr lvl="1"/>
+            <a:r>
+              <a:rPr lang="en-US" dirty="0"/>
+              <a:t>Maecenas malesuada ultricies sapien sit amet pharetra. </a:t>
+            </a:r>
+          </a:p>
+          <a:p>
+            <a:pPr lvl="1"/>
+            <a:r>
+              <a:rPr lang="en-US" dirty="0"/>
+              <a:t>Nunc tempus, risus sodales hendrerit, arcu dolor commodo libero, a sollicitudin quam nulla quis lectus. In at porta mauris. </a:t>
+            </a:r>
+          </a:p>
+        </p:txBody>
+      </p:sp>
+      <p:sp>
+        <p:nvSpPr>
+          <p:cNvPr id="8" name="Slide Number Placeholder 7">
+            <a:extLst>
+              <a:ext uri="{FF2B5EF4-FFF2-40B4-BE49-F238E27FC236}">
+                <a16:creationId xmlns:a16="http://schemas.microsoft.com/office/drawing/2014/main" xmlns="" id="{E6AC9832-FB01-464A-9824-61887B77997E}"/>
+              </a:ext>
+            </a:extLst>
+          </p:cNvPr>
+          <p:cNvSpPr>
+            <a:spLocks noGrp="1"/>
+          </p:cNvSpPr>
+          <p:nvPr>
+            <p:ph type="sldNum" sz="quarter" idx="33"/>
+          </p:nvPr>
+        </p:nvSpPr>
+        <p:spPr/>
+        <p:txBody>
+          <a:bodyPr/>
+          <a:lstStyle/>
+          <a:p>
+            <a:fld id="{19B51A1E-902D-48AF-9020-955120F399B6}" type="slidenum">
+              <a:rPr lang="en-US" smtClean="0"/>
+              <a:pPr/>
+              <a:t>13</a:t>
+            </a:fld>
+            <a:endParaRPr lang="en-US" dirty="0"/>
+          </a:p>
+        </p:txBody>
+      </p:sp>
+      <p:pic>
+        <p:nvPicPr>
+          <p:cNvPr id="2050" name="Picture 2" descr="Pregnant women with COVID-19 could be separated from babies at birth"/>
+          <p:cNvPicPr>
+            <a:picLocks noChangeAspect="1" noChangeArrowheads="1"/>
+          </p:cNvPicPr>
+          <p:nvPr/>
+        </p:nvPicPr>
+        <p:blipFill>
+          <a:blip r:embed="rId2">
+            <a:extLst>
+              <a:ext uri="{28A0092B-C50C-407E-A947-70E740481C1C}">
+                <a14:useLocalDpi xmlns:a14="http://schemas.microsoft.com/office/drawing/2010/main" val="0"/>
+              </a:ext>
+            </a:extLst>
+          </a:blip>
+          <a:srcRect/>
+          <a:stretch>
+            <a:fillRect/>
+          </a:stretch>
+        </p:blipFill>
+        <p:spPr bwMode="auto">
+          <a:xfrm>
+            <a:off x="0" y="0"/>
+            <a:ext cx="12184659" cy="6858000"/>
+          </a:xfrm>
+          <a:prstGeom prst="rect">
+            <a:avLst/>
+          </a:prstGeom>
+          <a:noFill/>
+          <a:extLst>
+            <a:ext uri="{909E8E84-426E-40DD-AFC4-6F175D3DCCD1}">
+              <a14:hiddenFill xmlns:a14="http://schemas.microsoft.com/office/drawing/2010/main">
+                <a:solidFill>
+                  <a:srgbClr val="FFFFFF"/>
+                </a:solidFill>
+              </a14:hiddenFill>
+            </a:ext>
+          </a:extLst>
+        </p:spPr>
+      </p:pic>
+      <p:sp>
+        <p:nvSpPr>
+          <p:cNvPr id="11" name="Rectangle 10"/>
+          <p:cNvSpPr/>
+          <p:nvPr/>
+        </p:nvSpPr>
+        <p:spPr>
+          <a:xfrm>
+            <a:off x="18454" y="449036"/>
+            <a:ext cx="6531684" cy="1323439"/>
+          </a:xfrm>
+          <a:prstGeom prst="rect">
+            <a:avLst/>
+          </a:prstGeom>
+          <a:noFill/>
+        </p:spPr>
+        <p:txBody>
+          <a:bodyPr wrap="square" lIns="91440" tIns="45720" rIns="91440" bIns="45720">
+            <a:spAutoFit/>
+          </a:bodyPr>
+          <a:lstStyle/>
+          <a:p>
+            <a:pPr algn="ctr"/>
+            <a:r>
+              <a:rPr lang="en-US" sz="4000" b="1" dirty="0" smtClean="0">
+                <a:ln w="6600">
+                  <a:solidFill>
+                    <a:schemeClr val="accent2"/>
+                  </a:solidFill>
+                  <a:prstDash val="solid"/>
+                </a:ln>
+                <a:solidFill>
+                  <a:schemeClr val="accent4">
+                    <a:lumMod val="60000"/>
+                    <a:lumOff val="40000"/>
+                  </a:schemeClr>
+                </a:solidFill>
+                <a:effectLst>
+                  <a:outerShdw dist="38100" dir="2700000" algn="tl" rotWithShape="0">
+                    <a:schemeClr val="accent2"/>
+                  </a:outerShdw>
+                </a:effectLst>
+                <a:latin typeface="Verdana" panose="020B0604030504040204" pitchFamily="34" charset="0"/>
+                <a:ea typeface="Verdana" panose="020B0604030504040204" pitchFamily="34" charset="0"/>
+                <a:cs typeface="Verdana" panose="020B0604030504040204" pitchFamily="34" charset="0"/>
+              </a:rPr>
+              <a:t>KEEP YOUR BABY </a:t>
+            </a:r>
+          </a:p>
+          <a:p>
+            <a:pPr algn="ctr"/>
+            <a:r>
+              <a:rPr lang="en-US" sz="4000" b="1" dirty="0" smtClean="0">
+                <a:ln w="6600">
+                  <a:solidFill>
+                    <a:schemeClr val="accent2"/>
+                  </a:solidFill>
+                  <a:prstDash val="solid"/>
+                </a:ln>
+                <a:solidFill>
+                  <a:schemeClr val="accent4">
+                    <a:lumMod val="60000"/>
+                    <a:lumOff val="40000"/>
+                  </a:schemeClr>
+                </a:solidFill>
+                <a:effectLst>
+                  <a:outerShdw dist="38100" dir="2700000" algn="tl" rotWithShape="0">
+                    <a:schemeClr val="accent2"/>
+                  </a:outerShdw>
+                </a:effectLst>
+                <a:latin typeface="Verdana" panose="020B0604030504040204" pitchFamily="34" charset="0"/>
+                <a:ea typeface="Verdana" panose="020B0604030504040204" pitchFamily="34" charset="0"/>
+                <a:cs typeface="Verdana" panose="020B0604030504040204" pitchFamily="34" charset="0"/>
+              </a:rPr>
+              <a:t>SAFE FROM CORONA</a:t>
+            </a:r>
+            <a:endParaRPr lang="en-US" sz="4000" b="1" dirty="0">
+              <a:ln w="6600">
+                <a:solidFill>
+                  <a:schemeClr val="accent2"/>
+                </a:solidFill>
+                <a:prstDash val="solid"/>
+              </a:ln>
+              <a:solidFill>
+                <a:schemeClr val="accent4">
+                  <a:lumMod val="60000"/>
+                  <a:lumOff val="40000"/>
+                </a:schemeClr>
+              </a:solidFill>
+              <a:effectLst>
+                <a:outerShdw dist="38100" dir="2700000" algn="tl" rotWithShape="0">
+                  <a:schemeClr val="accent2"/>
+                </a:outerShdw>
+              </a:effectLst>
+              <a:latin typeface="Verdana" panose="020B0604030504040204" pitchFamily="34" charset="0"/>
+              <a:ea typeface="Verdana" panose="020B0604030504040204" pitchFamily="34" charset="0"/>
+              <a:cs typeface="Verdana" panose="020B0604030504040204" pitchFamily="34" charset="0"/>
+            </a:endParaRPr>
+          </a:p>
+        </p:txBody>
+      </p:sp>
+      <p:pic>
+        <p:nvPicPr>
+          <p:cNvPr id="12" name="Picture 11"/>
+          <p:cNvPicPr>
+            <a:picLocks noChangeAspect="1"/>
+          </p:cNvPicPr>
+          <p:nvPr/>
+        </p:nvPicPr>
+        <p:blipFill>
+          <a:blip r:embed="rId3">
+            <a:extLst>
+              <a:ext uri="{28A0092B-C50C-407E-A947-70E740481C1C}">
+                <a14:useLocalDpi xmlns:a14="http://schemas.microsoft.com/office/drawing/2010/main" val="0"/>
+              </a:ext>
+            </a:extLst>
+          </a:blip>
+          <a:stretch>
+            <a:fillRect/>
+          </a:stretch>
+        </p:blipFill>
+        <p:spPr>
+          <a:xfrm>
+            <a:off x="189334" y="5925324"/>
+            <a:ext cx="2295679" cy="752107"/>
+          </a:xfrm>
+          <a:prstGeom prst="rect">
+            <a:avLst/>
+          </a:prstGeom>
+        </p:spPr>
+      </p:pic>
+    </p:spTree>
+    <p:extLst>
+      <p:ext uri="{BB962C8B-B14F-4D97-AF65-F5344CB8AC3E}">
+        <p14:creationId xmlns:p14="http://schemas.microsoft.com/office/powerpoint/2010/main" val="1826184119"/>
+      </p:ext>
+    </p:extLst>
+  </p:cSld>
+  <p:clrMapOvr>
+    <a:masterClrMapping/>
+  </p:clrMapOvr>
+  <p:timing>
+    <p:tnLst>
+      <p:par>
+        <p:cTn id="1" dur="indefinite" restart="never" nodeType="tmRoot"/>
+      </p:par>
+    </p:tnLst>
+  </p:timing>
+</p:sld>
+</file>
+
+<file path=ppt/slides/slide14.xml><?xml version="1.0" encoding="utf-8"?>
+<p:sld xmlns:a="http://schemas.openxmlformats.org/drawingml/2006/main" xmlns:r="http://schemas.openxmlformats.org/officeDocument/2006/relationships" xmlns:p="http://schemas.openxmlformats.org/presentationml/2006/main">
+  <p:cSld>
+    <p:spTree>
+      <p:nvGrpSpPr>
+        <p:cNvPr id="1" name=""/>
+        <p:cNvGrpSpPr/>
+        <p:nvPr/>
+      </p:nvGrpSpPr>
+      <p:grpSpPr>
+        <a:xfrm>
+          <a:off x="0" y="0"/>
+          <a:ext cx="0" cy="0"/>
+          <a:chOff x="0" y="0"/>
+          <a:chExt cx="0" cy="0"/>
+        </a:xfrm>
+      </p:grpSpPr>
+      <p:sp>
+        <p:nvSpPr>
+          <p:cNvPr id="2" name="Title 1">
+            <a:extLst>
+              <a:ext uri="{FF2B5EF4-FFF2-40B4-BE49-F238E27FC236}">
+                <a16:creationId xmlns:a16="http://schemas.microsoft.com/office/drawing/2014/main" xmlns="" id="{19304E83-A4F0-49C5-BB01-F5773509A2B3}"/>
+              </a:ext>
+            </a:extLst>
+          </p:cNvPr>
+          <p:cNvSpPr>
+            <a:spLocks noGrp="1"/>
+          </p:cNvSpPr>
+          <p:nvPr>
+            <p:ph type="title"/>
+          </p:nvPr>
+        </p:nvSpPr>
+        <p:spPr/>
+        <p:txBody>
+          <a:bodyPr/>
+          <a:lstStyle/>
+          <a:p>
+            <a:r>
+              <a:rPr lang="en-US" dirty="0"/>
+              <a:t>Comparison</a:t>
+            </a:r>
+          </a:p>
+        </p:txBody>
+      </p:sp>
+      <p:sp>
+        <p:nvSpPr>
+          <p:cNvPr id="3" name="Text Placeholder 2">
+            <a:extLst>
+              <a:ext uri="{FF2B5EF4-FFF2-40B4-BE49-F238E27FC236}">
+                <a16:creationId xmlns:a16="http://schemas.microsoft.com/office/drawing/2014/main" xmlns="" id="{7CA42D59-EAD6-4F95-84F1-32A30F057856}"/>
+              </a:ext>
+            </a:extLst>
+          </p:cNvPr>
+          <p:cNvSpPr>
+            <a:spLocks noGrp="1"/>
+          </p:cNvSpPr>
+          <p:nvPr>
+            <p:ph type="body" sz="quarter" idx="32"/>
+          </p:nvPr>
+        </p:nvSpPr>
+        <p:spPr/>
+        <p:txBody>
+          <a:bodyPr/>
+          <a:lstStyle/>
+          <a:p>
+            <a:r>
+              <a:rPr lang="en-US" dirty="0"/>
+              <a:t>Lorem ipsum dolor sit amet, consectetur adipiscing elit. </a:t>
+            </a:r>
+          </a:p>
+        </p:txBody>
+      </p:sp>
+      <p:sp>
+        <p:nvSpPr>
+          <p:cNvPr id="4" name="Text Placeholder 3">
+            <a:extLst>
+              <a:ext uri="{FF2B5EF4-FFF2-40B4-BE49-F238E27FC236}">
+                <a16:creationId xmlns:a16="http://schemas.microsoft.com/office/drawing/2014/main" xmlns="" id="{6AB259A0-0017-492F-A0DC-4B70C7052AE0}"/>
+              </a:ext>
+            </a:extLst>
+          </p:cNvPr>
+          <p:cNvSpPr>
+            <a:spLocks noGrp="1"/>
+          </p:cNvSpPr>
+          <p:nvPr>
+            <p:ph type="body" idx="1"/>
+          </p:nvPr>
+        </p:nvSpPr>
+        <p:spPr>
+          <a:xfrm>
+            <a:off x="432000" y="2459263"/>
+            <a:ext cx="5472000" cy="360000"/>
+          </a:xfrm>
+        </p:spPr>
+        <p:txBody>
+          <a:bodyPr/>
+          <a:lstStyle/>
+          <a:p>
+            <a:r>
+              <a:rPr lang="en-US" dirty="0"/>
+              <a:t>Proseware</a:t>
+            </a:r>
+          </a:p>
+        </p:txBody>
+      </p:sp>
+      <p:sp>
+        <p:nvSpPr>
+          <p:cNvPr id="6" name="Text Placeholder 5">
+            <a:extLst>
+              <a:ext uri="{FF2B5EF4-FFF2-40B4-BE49-F238E27FC236}">
+                <a16:creationId xmlns:a16="http://schemas.microsoft.com/office/drawing/2014/main" xmlns="" id="{B237D1CA-B91A-410E-A968-D017BBE99F99}"/>
+              </a:ext>
+            </a:extLst>
+          </p:cNvPr>
+          <p:cNvSpPr>
+            <a:spLocks noGrp="1"/>
+          </p:cNvSpPr>
+          <p:nvPr>
+            <p:ph type="body" sz="quarter" idx="13"/>
+          </p:nvPr>
+        </p:nvSpPr>
+        <p:spPr>
+          <a:xfrm>
+            <a:off x="6300000" y="2459788"/>
+            <a:ext cx="5472000" cy="358775"/>
+          </a:xfrm>
+        </p:spPr>
+        <p:txBody>
+          <a:bodyPr/>
+          <a:lstStyle/>
+          <a:p>
+            <a:r>
+              <a:rPr lang="en-US" dirty="0"/>
+              <a:t>Competitive Service</a:t>
+            </a:r>
+          </a:p>
+        </p:txBody>
+      </p:sp>
+      <p:sp>
+        <p:nvSpPr>
+          <p:cNvPr id="7" name="Text Placeholder 6">
+            <a:extLst>
+              <a:ext uri="{FF2B5EF4-FFF2-40B4-BE49-F238E27FC236}">
+                <a16:creationId xmlns:a16="http://schemas.microsoft.com/office/drawing/2014/main" xmlns="" id="{26A87885-D672-4CF9-A78D-CFE98385B03A}"/>
+              </a:ext>
+            </a:extLst>
+          </p:cNvPr>
+          <p:cNvSpPr>
+            <a:spLocks noGrp="1"/>
+          </p:cNvSpPr>
+          <p:nvPr>
+            <p:ph type="body" sz="quarter" idx="12"/>
+          </p:nvPr>
+        </p:nvSpPr>
+        <p:spPr>
+          <a:xfrm>
+            <a:off x="6299887" y="2963789"/>
+            <a:ext cx="5472113" cy="1883984"/>
+          </a:xfrm>
+        </p:spPr>
+        <p:txBody>
+          <a:bodyPr/>
+          <a:lstStyle/>
+          <a:p>
+            <a:r>
+              <a:rPr lang="en-US" dirty="0"/>
+              <a:t>Praesent venenatis quam tortor, viverra nunc rutrum. </a:t>
+            </a:r>
+          </a:p>
+          <a:p>
+            <a:pPr lvl="1"/>
+            <a:r>
+              <a:rPr lang="en-US" dirty="0"/>
+              <a:t>Maecenas malesuada ultricies sapien sit amet pharetra. </a:t>
+            </a:r>
+          </a:p>
+          <a:p>
+            <a:pPr lvl="1"/>
+            <a:r>
+              <a:rPr lang="en-US" dirty="0"/>
+              <a:t>Nunc tempus, risus sodales hendrerit, arcu dolor commodo libero, a sollicitudin quam nulla quis lectus. In at porta mauris. </a:t>
+            </a:r>
+          </a:p>
+        </p:txBody>
+      </p:sp>
+      <p:sp>
+        <p:nvSpPr>
+          <p:cNvPr id="8" name="Slide Number Placeholder 7">
+            <a:extLst>
+              <a:ext uri="{FF2B5EF4-FFF2-40B4-BE49-F238E27FC236}">
+                <a16:creationId xmlns:a16="http://schemas.microsoft.com/office/drawing/2014/main" xmlns="" id="{E6AC9832-FB01-464A-9824-61887B77997E}"/>
+              </a:ext>
+            </a:extLst>
+          </p:cNvPr>
+          <p:cNvSpPr>
+            <a:spLocks noGrp="1"/>
+          </p:cNvSpPr>
+          <p:nvPr>
+            <p:ph type="sldNum" sz="quarter" idx="33"/>
+          </p:nvPr>
+        </p:nvSpPr>
+        <p:spPr/>
+        <p:txBody>
+          <a:bodyPr/>
+          <a:lstStyle/>
+          <a:p>
+            <a:fld id="{19B51A1E-902D-48AF-9020-955120F399B6}" type="slidenum">
+              <a:rPr lang="en-US" smtClean="0"/>
+              <a:pPr/>
+              <a:t>14</a:t>
+            </a:fld>
+            <a:endParaRPr lang="en-US" dirty="0"/>
+          </a:p>
+        </p:txBody>
+      </p:sp>
+      <p:pic>
+        <p:nvPicPr>
+          <p:cNvPr id="5" name="Picture 4"/>
+          <p:cNvPicPr>
+            <a:picLocks noChangeAspect="1"/>
+          </p:cNvPicPr>
+          <p:nvPr/>
+        </p:nvPicPr>
+        <p:blipFill>
+          <a:blip r:embed="rId2">
+            <a:extLst>
+              <a:ext uri="{28A0092B-C50C-407E-A947-70E740481C1C}">
+                <a14:useLocalDpi xmlns:a14="http://schemas.microsoft.com/office/drawing/2010/main" val="0"/>
+              </a:ext>
+            </a:extLst>
+          </a:blip>
+          <a:stretch>
+            <a:fillRect/>
+          </a:stretch>
+        </p:blipFill>
+        <p:spPr>
+          <a:xfrm>
+            <a:off x="0" y="-1"/>
+            <a:ext cx="11756674" cy="5454127"/>
+          </a:xfrm>
+          <a:prstGeom prst="rect">
+            <a:avLst/>
+          </a:prstGeom>
+        </p:spPr>
+      </p:pic>
+      <p:pic>
+        <p:nvPicPr>
+          <p:cNvPr id="12" name="Picture 11"/>
+          <p:cNvPicPr>
+            <a:picLocks noChangeAspect="1"/>
+          </p:cNvPicPr>
+          <p:nvPr/>
+        </p:nvPicPr>
+        <p:blipFill>
+          <a:blip r:embed="rId3">
+            <a:extLst>
+              <a:ext uri="{28A0092B-C50C-407E-A947-70E740481C1C}">
+                <a14:useLocalDpi xmlns:a14="http://schemas.microsoft.com/office/drawing/2010/main" val="0"/>
+              </a:ext>
+            </a:extLst>
+          </a:blip>
+          <a:stretch>
+            <a:fillRect/>
+          </a:stretch>
+        </p:blipFill>
+        <p:spPr>
+          <a:xfrm>
+            <a:off x="146304" y="129397"/>
+            <a:ext cx="2295679" cy="752107"/>
+          </a:xfrm>
+          <a:prstGeom prst="rect">
+            <a:avLst/>
+          </a:prstGeom>
+        </p:spPr>
+      </p:pic>
+    </p:spTree>
+    <p:extLst>
+      <p:ext uri="{BB962C8B-B14F-4D97-AF65-F5344CB8AC3E}">
+        <p14:creationId xmlns:p14="http://schemas.microsoft.com/office/powerpoint/2010/main" val="3856585129"/>
+      </p:ext>
+    </p:extLst>
+  </p:cSld>
+  <p:clrMapOvr>
+    <a:masterClrMapping/>
+  </p:clrMapOvr>
+  <p:timing>
+    <p:tnLst>
+      <p:par>
+        <p:cTn id="1" dur="indefinite" restart="never" nodeType="tmRoot"/>
+      </p:par>
+    </p:tnLst>
+  </p:timing>
+</p:sld>
+</file>
+
+<file path=ppt/slides/slide15.xml><?xml version="1.0" encoding="utf-8"?>
+<p:sld xmlns:a="http://schemas.openxmlformats.org/drawingml/2006/main" xmlns:r="http://schemas.openxmlformats.org/officeDocument/2006/relationships" xmlns:p="http://schemas.openxmlformats.org/presentationml/2006/main">
+  <p:cSld>
+    <p:spTree>
+      <p:nvGrpSpPr>
+        <p:cNvPr id="1" name=""/>
+        <p:cNvGrpSpPr/>
+        <p:nvPr/>
+      </p:nvGrpSpPr>
+      <p:grpSpPr>
+        <a:xfrm>
+          <a:off x="0" y="0"/>
+          <a:ext cx="0" cy="0"/>
+          <a:chOff x="0" y="0"/>
+          <a:chExt cx="0" cy="0"/>
+        </a:xfrm>
+      </p:grpSpPr>
+      <p:sp>
+        <p:nvSpPr>
+          <p:cNvPr id="2" name="Title 1">
+            <a:extLst>
+              <a:ext uri="{FF2B5EF4-FFF2-40B4-BE49-F238E27FC236}">
+                <a16:creationId xmlns:a16="http://schemas.microsoft.com/office/drawing/2014/main" xmlns="" id="{19304E83-A4F0-49C5-BB01-F5773509A2B3}"/>
+              </a:ext>
+            </a:extLst>
+          </p:cNvPr>
+          <p:cNvSpPr>
+            <a:spLocks noGrp="1"/>
+          </p:cNvSpPr>
+          <p:nvPr>
+            <p:ph type="title"/>
+          </p:nvPr>
+        </p:nvSpPr>
+        <p:spPr/>
+        <p:txBody>
+          <a:bodyPr/>
+          <a:lstStyle/>
+          <a:p>
+            <a:r>
+              <a:rPr lang="en-US" dirty="0"/>
+              <a:t>Comparison</a:t>
+            </a:r>
+          </a:p>
+        </p:txBody>
+      </p:sp>
+      <p:sp>
+        <p:nvSpPr>
+          <p:cNvPr id="3" name="Text Placeholder 2">
+            <a:extLst>
+              <a:ext uri="{FF2B5EF4-FFF2-40B4-BE49-F238E27FC236}">
+                <a16:creationId xmlns:a16="http://schemas.microsoft.com/office/drawing/2014/main" xmlns="" id="{7CA42D59-EAD6-4F95-84F1-32A30F057856}"/>
+              </a:ext>
+            </a:extLst>
+          </p:cNvPr>
+          <p:cNvSpPr>
+            <a:spLocks noGrp="1"/>
+          </p:cNvSpPr>
+          <p:nvPr>
+            <p:ph type="body" sz="quarter" idx="32"/>
+          </p:nvPr>
+        </p:nvSpPr>
+        <p:spPr/>
+        <p:txBody>
+          <a:bodyPr/>
+          <a:lstStyle/>
+          <a:p>
+            <a:r>
+              <a:rPr lang="en-US" dirty="0"/>
+              <a:t>Lorem ipsum dolor sit amet, consectetur adipiscing elit. </a:t>
+            </a:r>
+          </a:p>
+        </p:txBody>
+      </p:sp>
+      <p:sp>
+        <p:nvSpPr>
+          <p:cNvPr id="4" name="Text Placeholder 3">
+            <a:extLst>
+              <a:ext uri="{FF2B5EF4-FFF2-40B4-BE49-F238E27FC236}">
+                <a16:creationId xmlns:a16="http://schemas.microsoft.com/office/drawing/2014/main" xmlns="" id="{6AB259A0-0017-492F-A0DC-4B70C7052AE0}"/>
+              </a:ext>
+            </a:extLst>
+          </p:cNvPr>
+          <p:cNvSpPr>
+            <a:spLocks noGrp="1"/>
+          </p:cNvSpPr>
+          <p:nvPr>
+            <p:ph type="body" idx="1"/>
+          </p:nvPr>
+        </p:nvSpPr>
+        <p:spPr>
+          <a:xfrm>
+            <a:off x="432000" y="2459263"/>
+            <a:ext cx="5472000" cy="360000"/>
+          </a:xfrm>
+        </p:spPr>
+        <p:txBody>
+          <a:bodyPr/>
+          <a:lstStyle/>
+          <a:p>
+            <a:r>
+              <a:rPr lang="en-US" dirty="0"/>
+              <a:t>Proseware</a:t>
+            </a:r>
+          </a:p>
+        </p:txBody>
+      </p:sp>
+      <p:sp>
+        <p:nvSpPr>
+          <p:cNvPr id="6" name="Text Placeholder 5">
+            <a:extLst>
+              <a:ext uri="{FF2B5EF4-FFF2-40B4-BE49-F238E27FC236}">
+                <a16:creationId xmlns:a16="http://schemas.microsoft.com/office/drawing/2014/main" xmlns="" id="{B237D1CA-B91A-410E-A968-D017BBE99F99}"/>
+              </a:ext>
+            </a:extLst>
+          </p:cNvPr>
+          <p:cNvSpPr>
+            <a:spLocks noGrp="1"/>
+          </p:cNvSpPr>
+          <p:nvPr>
+            <p:ph type="body" sz="quarter" idx="13"/>
+          </p:nvPr>
+        </p:nvSpPr>
+        <p:spPr>
+          <a:xfrm>
+            <a:off x="6300000" y="2459788"/>
+            <a:ext cx="5472000" cy="358775"/>
+          </a:xfrm>
+        </p:spPr>
+        <p:txBody>
+          <a:bodyPr/>
+          <a:lstStyle/>
+          <a:p>
+            <a:r>
+              <a:rPr lang="en-US" dirty="0"/>
+              <a:t>Competitive Service</a:t>
+            </a:r>
+          </a:p>
+        </p:txBody>
+      </p:sp>
+      <p:sp>
+        <p:nvSpPr>
+          <p:cNvPr id="7" name="Text Placeholder 6">
+            <a:extLst>
+              <a:ext uri="{FF2B5EF4-FFF2-40B4-BE49-F238E27FC236}">
+                <a16:creationId xmlns:a16="http://schemas.microsoft.com/office/drawing/2014/main" xmlns="" id="{26A87885-D672-4CF9-A78D-CFE98385B03A}"/>
+              </a:ext>
+            </a:extLst>
+          </p:cNvPr>
+          <p:cNvSpPr>
+            <a:spLocks noGrp="1"/>
+          </p:cNvSpPr>
+          <p:nvPr>
+            <p:ph type="body" sz="quarter" idx="12"/>
+          </p:nvPr>
+        </p:nvSpPr>
+        <p:spPr>
+          <a:xfrm>
+            <a:off x="6299887" y="2963789"/>
+            <a:ext cx="5472113" cy="1883984"/>
+          </a:xfrm>
+        </p:spPr>
+        <p:txBody>
+          <a:bodyPr/>
+          <a:lstStyle/>
+          <a:p>
+            <a:r>
+              <a:rPr lang="en-US" dirty="0"/>
+              <a:t>Praesent venenatis quam tortor, viverra nunc rutrum. </a:t>
+            </a:r>
+          </a:p>
+          <a:p>
+            <a:pPr lvl="1"/>
+            <a:r>
+              <a:rPr lang="en-US" dirty="0"/>
+              <a:t>Maecenas malesuada ultricies sapien sit amet pharetra. </a:t>
+            </a:r>
+          </a:p>
+          <a:p>
+            <a:pPr lvl="1"/>
+            <a:r>
+              <a:rPr lang="en-US" dirty="0"/>
+              <a:t>Nunc tempus, risus sodales hendrerit, arcu dolor commodo libero, a sollicitudin quam nulla quis lectus. In at porta mauris. </a:t>
+            </a:r>
+          </a:p>
+        </p:txBody>
+      </p:sp>
+      <p:sp>
+        <p:nvSpPr>
+          <p:cNvPr id="8" name="Slide Number Placeholder 7">
+            <a:extLst>
+              <a:ext uri="{FF2B5EF4-FFF2-40B4-BE49-F238E27FC236}">
+                <a16:creationId xmlns:a16="http://schemas.microsoft.com/office/drawing/2014/main" xmlns="" id="{E6AC9832-FB01-464A-9824-61887B77997E}"/>
+              </a:ext>
+            </a:extLst>
+          </p:cNvPr>
+          <p:cNvSpPr>
+            <a:spLocks noGrp="1"/>
+          </p:cNvSpPr>
+          <p:nvPr>
+            <p:ph type="sldNum" sz="quarter" idx="33"/>
+          </p:nvPr>
+        </p:nvSpPr>
+        <p:spPr/>
+        <p:txBody>
+          <a:bodyPr/>
+          <a:lstStyle/>
+          <a:p>
+            <a:fld id="{19B51A1E-902D-48AF-9020-955120F399B6}" type="slidenum">
+              <a:rPr lang="en-US" smtClean="0"/>
+              <a:pPr/>
+              <a:t>15</a:t>
+            </a:fld>
+            <a:endParaRPr lang="en-US" dirty="0"/>
+          </a:p>
+        </p:txBody>
+      </p:sp>
+      <p:pic>
+        <p:nvPicPr>
+          <p:cNvPr id="9" name="Picture 8"/>
+          <p:cNvPicPr>
+            <a:picLocks noChangeAspect="1"/>
+          </p:cNvPicPr>
+          <p:nvPr/>
+        </p:nvPicPr>
+        <p:blipFill>
+          <a:blip r:embed="rId2">
+            <a:extLst>
+              <a:ext uri="{28A0092B-C50C-407E-A947-70E740481C1C}">
+                <a14:useLocalDpi xmlns:a14="http://schemas.microsoft.com/office/drawing/2010/main" val="0"/>
+              </a:ext>
+            </a:extLst>
+          </a:blip>
+          <a:stretch>
+            <a:fillRect/>
+          </a:stretch>
+        </p:blipFill>
+        <p:spPr>
+          <a:xfrm>
+            <a:off x="0" y="0"/>
+            <a:ext cx="10434918" cy="6826582"/>
+          </a:xfrm>
+          <a:prstGeom prst="rect">
+            <a:avLst/>
+          </a:prstGeom>
+        </p:spPr>
+      </p:pic>
+      <p:pic>
+        <p:nvPicPr>
+          <p:cNvPr id="12" name="Picture 11"/>
+          <p:cNvPicPr>
+            <a:picLocks noChangeAspect="1"/>
+          </p:cNvPicPr>
+          <p:nvPr/>
+        </p:nvPicPr>
+        <p:blipFill>
+          <a:blip r:embed="rId3">
+            <a:extLst>
+              <a:ext uri="{28A0092B-C50C-407E-A947-70E740481C1C}">
+                <a14:useLocalDpi xmlns:a14="http://schemas.microsoft.com/office/drawing/2010/main" val="0"/>
+              </a:ext>
+            </a:extLst>
+          </a:blip>
+          <a:stretch>
+            <a:fillRect/>
+          </a:stretch>
+        </p:blipFill>
+        <p:spPr>
+          <a:xfrm>
+            <a:off x="146304" y="129397"/>
+            <a:ext cx="2069771" cy="678095"/>
+          </a:xfrm>
+          <a:prstGeom prst="rect">
+            <a:avLst/>
+          </a:prstGeom>
+        </p:spPr>
+      </p:pic>
+    </p:spTree>
+    <p:extLst>
+      <p:ext uri="{BB962C8B-B14F-4D97-AF65-F5344CB8AC3E}">
+        <p14:creationId xmlns:p14="http://schemas.microsoft.com/office/powerpoint/2010/main" val="3135274450"/>
+      </p:ext>
+    </p:extLst>
+  </p:cSld>
+  <p:clrMapOvr>
+    <a:masterClrMapping/>
+  </p:clrMapOvr>
+  <p:timing>
+    <p:tnLst>
+      <p:par>
+        <p:cTn id="1" dur="indefinite" restart="never" nodeType="tmRoot"/>
+      </p:par>
+    </p:tnLst>
+  </p:timing>
+</p:sld>
+</file>
+
+<file path=ppt/slides/slide16.xml><?xml version="1.0" encoding="utf-8"?>
+<p:sld xmlns:a="http://schemas.openxmlformats.org/drawingml/2006/main" xmlns:r="http://schemas.openxmlformats.org/officeDocument/2006/relationships" xmlns:p="http://schemas.openxmlformats.org/presentationml/2006/main">
+  <p:cSld>
+    <p:spTree>
+      <p:nvGrpSpPr>
+        <p:cNvPr id="1" name=""/>
+        <p:cNvGrpSpPr/>
+        <p:nvPr/>
+      </p:nvGrpSpPr>
+      <p:grpSpPr>
+        <a:xfrm>
+          <a:off x="0" y="0"/>
+          <a:ext cx="0" cy="0"/>
+          <a:chOff x="0" y="0"/>
+          <a:chExt cx="0" cy="0"/>
+        </a:xfrm>
+      </p:grpSpPr>
+      <p:sp>
+        <p:nvSpPr>
+          <p:cNvPr id="2" name="Title 1">
+            <a:extLst>
+              <a:ext uri="{FF2B5EF4-FFF2-40B4-BE49-F238E27FC236}">
+                <a16:creationId xmlns:a16="http://schemas.microsoft.com/office/drawing/2014/main" xmlns="" id="{19304E83-A4F0-49C5-BB01-F5773509A2B3}"/>
+              </a:ext>
+            </a:extLst>
+          </p:cNvPr>
+          <p:cNvSpPr>
+            <a:spLocks noGrp="1"/>
+          </p:cNvSpPr>
+          <p:nvPr>
+            <p:ph type="title"/>
+          </p:nvPr>
+        </p:nvSpPr>
+        <p:spPr/>
+        <p:txBody>
+          <a:bodyPr/>
+          <a:lstStyle/>
+          <a:p>
+            <a:r>
+              <a:rPr lang="en-US" dirty="0"/>
+              <a:t>Comparison</a:t>
+            </a:r>
+          </a:p>
+        </p:txBody>
+      </p:sp>
+      <p:sp>
+        <p:nvSpPr>
+          <p:cNvPr id="3" name="Text Placeholder 2">
+            <a:extLst>
+              <a:ext uri="{FF2B5EF4-FFF2-40B4-BE49-F238E27FC236}">
+                <a16:creationId xmlns:a16="http://schemas.microsoft.com/office/drawing/2014/main" xmlns="" id="{7CA42D59-EAD6-4F95-84F1-32A30F057856}"/>
+              </a:ext>
+            </a:extLst>
+          </p:cNvPr>
+          <p:cNvSpPr>
+            <a:spLocks noGrp="1"/>
+          </p:cNvSpPr>
+          <p:nvPr>
+            <p:ph type="body" sz="quarter" idx="32"/>
+          </p:nvPr>
+        </p:nvSpPr>
+        <p:spPr/>
+        <p:txBody>
+          <a:bodyPr/>
+          <a:lstStyle/>
+          <a:p>
+            <a:r>
+              <a:rPr lang="en-US" dirty="0"/>
+              <a:t>Lorem ipsum dolor sit amet, consectetur adipiscing elit. </a:t>
+            </a:r>
+          </a:p>
+        </p:txBody>
+      </p:sp>
+      <p:sp>
+        <p:nvSpPr>
+          <p:cNvPr id="4" name="Text Placeholder 3">
+            <a:extLst>
+              <a:ext uri="{FF2B5EF4-FFF2-40B4-BE49-F238E27FC236}">
+                <a16:creationId xmlns:a16="http://schemas.microsoft.com/office/drawing/2014/main" xmlns="" id="{6AB259A0-0017-492F-A0DC-4B70C7052AE0}"/>
+              </a:ext>
+            </a:extLst>
+          </p:cNvPr>
+          <p:cNvSpPr>
+            <a:spLocks noGrp="1"/>
+          </p:cNvSpPr>
+          <p:nvPr>
+            <p:ph type="body" idx="1"/>
+          </p:nvPr>
+        </p:nvSpPr>
+        <p:spPr>
+          <a:xfrm>
+            <a:off x="432000" y="2459263"/>
+            <a:ext cx="5472000" cy="360000"/>
+          </a:xfrm>
+        </p:spPr>
+        <p:txBody>
+          <a:bodyPr/>
+          <a:lstStyle/>
+          <a:p>
+            <a:r>
+              <a:rPr lang="en-US" dirty="0"/>
+              <a:t>Proseware</a:t>
+            </a:r>
+          </a:p>
+        </p:txBody>
+      </p:sp>
+      <p:sp>
+        <p:nvSpPr>
+          <p:cNvPr id="6" name="Text Placeholder 5">
+            <a:extLst>
+              <a:ext uri="{FF2B5EF4-FFF2-40B4-BE49-F238E27FC236}">
+                <a16:creationId xmlns:a16="http://schemas.microsoft.com/office/drawing/2014/main" xmlns="" id="{B237D1CA-B91A-410E-A968-D017BBE99F99}"/>
+              </a:ext>
+            </a:extLst>
+          </p:cNvPr>
+          <p:cNvSpPr>
+            <a:spLocks noGrp="1"/>
+          </p:cNvSpPr>
+          <p:nvPr>
+            <p:ph type="body" sz="quarter" idx="13"/>
+          </p:nvPr>
+        </p:nvSpPr>
+        <p:spPr>
+          <a:xfrm>
+            <a:off x="6300000" y="2459788"/>
+            <a:ext cx="5472000" cy="358775"/>
+          </a:xfrm>
+        </p:spPr>
+        <p:txBody>
+          <a:bodyPr/>
+          <a:lstStyle/>
+          <a:p>
+            <a:r>
+              <a:rPr lang="en-US" dirty="0"/>
+              <a:t>Competitive Service</a:t>
+            </a:r>
+          </a:p>
+        </p:txBody>
+      </p:sp>
+      <p:sp>
+        <p:nvSpPr>
+          <p:cNvPr id="7" name="Text Placeholder 6">
+            <a:extLst>
+              <a:ext uri="{FF2B5EF4-FFF2-40B4-BE49-F238E27FC236}">
+                <a16:creationId xmlns:a16="http://schemas.microsoft.com/office/drawing/2014/main" xmlns="" id="{26A87885-D672-4CF9-A78D-CFE98385B03A}"/>
+              </a:ext>
+            </a:extLst>
+          </p:cNvPr>
+          <p:cNvSpPr>
+            <a:spLocks noGrp="1"/>
+          </p:cNvSpPr>
+          <p:nvPr>
+            <p:ph type="body" sz="quarter" idx="12"/>
+          </p:nvPr>
+        </p:nvSpPr>
+        <p:spPr>
+          <a:xfrm>
+            <a:off x="6299887" y="2963789"/>
+            <a:ext cx="5472113" cy="1883984"/>
+          </a:xfrm>
+        </p:spPr>
+        <p:txBody>
+          <a:bodyPr/>
+          <a:lstStyle/>
+          <a:p>
+            <a:r>
+              <a:rPr lang="en-US" dirty="0"/>
+              <a:t>Praesent venenatis quam tortor, viverra nunc rutrum. </a:t>
+            </a:r>
+          </a:p>
+          <a:p>
+            <a:pPr lvl="1"/>
+            <a:r>
+              <a:rPr lang="en-US" dirty="0"/>
+              <a:t>Maecenas malesuada ultricies sapien sit amet pharetra. </a:t>
+            </a:r>
+          </a:p>
+          <a:p>
+            <a:pPr lvl="1"/>
+            <a:r>
+              <a:rPr lang="en-US" dirty="0"/>
+              <a:t>Nunc tempus, risus sodales hendrerit, arcu dolor commodo libero, a sollicitudin quam nulla quis lectus. In at porta mauris. </a:t>
+            </a:r>
+          </a:p>
+        </p:txBody>
+      </p:sp>
+      <p:sp>
+        <p:nvSpPr>
+          <p:cNvPr id="8" name="Slide Number Placeholder 7">
+            <a:extLst>
+              <a:ext uri="{FF2B5EF4-FFF2-40B4-BE49-F238E27FC236}">
+                <a16:creationId xmlns:a16="http://schemas.microsoft.com/office/drawing/2014/main" xmlns="" id="{E6AC9832-FB01-464A-9824-61887B77997E}"/>
+              </a:ext>
+            </a:extLst>
+          </p:cNvPr>
+          <p:cNvSpPr>
+            <a:spLocks noGrp="1"/>
+          </p:cNvSpPr>
+          <p:nvPr>
+            <p:ph type="sldNum" sz="quarter" idx="33"/>
+          </p:nvPr>
+        </p:nvSpPr>
+        <p:spPr/>
+        <p:txBody>
+          <a:bodyPr/>
+          <a:lstStyle/>
+          <a:p>
+            <a:fld id="{19B51A1E-902D-48AF-9020-955120F399B6}" type="slidenum">
+              <a:rPr lang="en-US" smtClean="0"/>
+              <a:pPr/>
+              <a:t>16</a:t>
+            </a:fld>
+            <a:endParaRPr lang="en-US" dirty="0"/>
+          </a:p>
+        </p:txBody>
+      </p:sp>
+      <p:pic>
+        <p:nvPicPr>
+          <p:cNvPr id="2050" name="Picture 2" descr="Pregnant women with COVID-19 could be separated from babies at birth"/>
+          <p:cNvPicPr>
+            <a:picLocks noChangeAspect="1" noChangeArrowheads="1"/>
+          </p:cNvPicPr>
+          <p:nvPr/>
+        </p:nvPicPr>
+        <p:blipFill>
+          <a:blip r:embed="rId2">
+            <a:extLst>
+              <a:ext uri="{28A0092B-C50C-407E-A947-70E740481C1C}">
+                <a14:useLocalDpi xmlns:a14="http://schemas.microsoft.com/office/drawing/2010/main" val="0"/>
+              </a:ext>
+            </a:extLst>
+          </a:blip>
+          <a:srcRect/>
+          <a:stretch>
+            <a:fillRect/>
+          </a:stretch>
+        </p:blipFill>
+        <p:spPr bwMode="auto">
+          <a:xfrm>
+            <a:off x="0" y="0"/>
+            <a:ext cx="12184659" cy="6858000"/>
+          </a:xfrm>
+          <a:prstGeom prst="rect">
+            <a:avLst/>
+          </a:prstGeom>
+          <a:noFill/>
+          <a:extLst>
+            <a:ext uri="{909E8E84-426E-40DD-AFC4-6F175D3DCCD1}">
+              <a14:hiddenFill xmlns:a14="http://schemas.microsoft.com/office/drawing/2010/main">
+                <a:solidFill>
+                  <a:srgbClr val="FFFFFF"/>
+                </a:solidFill>
+              </a14:hiddenFill>
+            </a:ext>
+          </a:extLst>
+        </p:spPr>
+      </p:pic>
+      <p:sp>
+        <p:nvSpPr>
+          <p:cNvPr id="11" name="Rectangle 10"/>
+          <p:cNvSpPr/>
+          <p:nvPr/>
+        </p:nvSpPr>
+        <p:spPr>
+          <a:xfrm>
+            <a:off x="18454" y="449036"/>
+            <a:ext cx="6531684" cy="1323439"/>
+          </a:xfrm>
+          <a:prstGeom prst="rect">
+            <a:avLst/>
+          </a:prstGeom>
+          <a:noFill/>
+        </p:spPr>
+        <p:txBody>
+          <a:bodyPr wrap="square" lIns="91440" tIns="45720" rIns="91440" bIns="45720">
+            <a:spAutoFit/>
+          </a:bodyPr>
+          <a:lstStyle/>
+          <a:p>
+            <a:pPr algn="ctr"/>
+            <a:r>
+              <a:rPr lang="en-US" sz="4000" b="1" dirty="0" smtClean="0">
+                <a:ln w="6600">
+                  <a:solidFill>
+                    <a:schemeClr val="accent2"/>
+                  </a:solidFill>
+                  <a:prstDash val="solid"/>
+                </a:ln>
+                <a:solidFill>
+                  <a:schemeClr val="accent4">
+                    <a:lumMod val="60000"/>
+                    <a:lumOff val="40000"/>
+                  </a:schemeClr>
+                </a:solidFill>
+                <a:effectLst>
+                  <a:outerShdw dist="38100" dir="2700000" algn="tl" rotWithShape="0">
+                    <a:schemeClr val="accent2"/>
+                  </a:outerShdw>
+                </a:effectLst>
+                <a:latin typeface="Verdana" panose="020B0604030504040204" pitchFamily="34" charset="0"/>
+                <a:ea typeface="Verdana" panose="020B0604030504040204" pitchFamily="34" charset="0"/>
+                <a:cs typeface="Verdana" panose="020B0604030504040204" pitchFamily="34" charset="0"/>
+              </a:rPr>
+              <a:t>KEEP YOUR BABY </a:t>
+            </a:r>
+          </a:p>
+          <a:p>
+            <a:pPr algn="ctr"/>
+            <a:r>
+              <a:rPr lang="en-US" sz="4000" b="1" dirty="0" smtClean="0">
+                <a:ln w="6600">
+                  <a:solidFill>
+                    <a:schemeClr val="accent2"/>
+                  </a:solidFill>
+                  <a:prstDash val="solid"/>
+                </a:ln>
+                <a:solidFill>
+                  <a:schemeClr val="accent4">
+                    <a:lumMod val="60000"/>
+                    <a:lumOff val="40000"/>
+                  </a:schemeClr>
+                </a:solidFill>
+                <a:effectLst>
+                  <a:outerShdw dist="38100" dir="2700000" algn="tl" rotWithShape="0">
+                    <a:schemeClr val="accent2"/>
+                  </a:outerShdw>
+                </a:effectLst>
+                <a:latin typeface="Verdana" panose="020B0604030504040204" pitchFamily="34" charset="0"/>
+                <a:ea typeface="Verdana" panose="020B0604030504040204" pitchFamily="34" charset="0"/>
+                <a:cs typeface="Verdana" panose="020B0604030504040204" pitchFamily="34" charset="0"/>
+              </a:rPr>
+              <a:t>SAFE FROM CORONA</a:t>
+            </a:r>
+            <a:endParaRPr lang="en-US" sz="4000" b="1" dirty="0">
+              <a:ln w="6600">
+                <a:solidFill>
+                  <a:schemeClr val="accent2"/>
+                </a:solidFill>
+                <a:prstDash val="solid"/>
+              </a:ln>
+              <a:solidFill>
+                <a:schemeClr val="accent4">
+                  <a:lumMod val="60000"/>
+                  <a:lumOff val="40000"/>
+                </a:schemeClr>
+              </a:solidFill>
+              <a:effectLst>
+                <a:outerShdw dist="38100" dir="2700000" algn="tl" rotWithShape="0">
+                  <a:schemeClr val="accent2"/>
+                </a:outerShdw>
+              </a:effectLst>
+              <a:latin typeface="Verdana" panose="020B0604030504040204" pitchFamily="34" charset="0"/>
+              <a:ea typeface="Verdana" panose="020B0604030504040204" pitchFamily="34" charset="0"/>
+              <a:cs typeface="Verdana" panose="020B0604030504040204" pitchFamily="34" charset="0"/>
+            </a:endParaRPr>
+          </a:p>
+        </p:txBody>
+      </p:sp>
+      <p:pic>
+        <p:nvPicPr>
+          <p:cNvPr id="13" name="Picture 12"/>
+          <p:cNvPicPr>
+            <a:picLocks noChangeAspect="1"/>
+          </p:cNvPicPr>
+          <p:nvPr/>
+        </p:nvPicPr>
+        <p:blipFill>
+          <a:blip r:embed="rId3">
+            <a:extLst>
+              <a:ext uri="{28A0092B-C50C-407E-A947-70E740481C1C}">
+                <a14:useLocalDpi xmlns:a14="http://schemas.microsoft.com/office/drawing/2010/main" val="0"/>
+              </a:ext>
+            </a:extLst>
+          </a:blip>
+          <a:stretch>
+            <a:fillRect/>
+          </a:stretch>
+        </p:blipFill>
+        <p:spPr>
+          <a:xfrm>
+            <a:off x="328636" y="5637974"/>
+            <a:ext cx="1379141" cy="1039457"/>
+          </a:xfrm>
+          <a:prstGeom prst="rect">
+            <a:avLst/>
+          </a:prstGeom>
+        </p:spPr>
+      </p:pic>
+    </p:spTree>
+    <p:extLst>
+      <p:ext uri="{BB962C8B-B14F-4D97-AF65-F5344CB8AC3E}">
+        <p14:creationId xmlns:p14="http://schemas.microsoft.com/office/powerpoint/2010/main" val="1409284909"/>
+      </p:ext>
+    </p:extLst>
+  </p:cSld>
+  <p:clrMapOvr>
+    <a:masterClrMapping/>
+  </p:clrMapOvr>
+  <p:timing>
+    <p:tnLst>
+      <p:par>
+        <p:cTn id="1" dur="indefinite" restart="never" nodeType="tmRoot"/>
+      </p:par>
+    </p:tnLst>
+  </p:timing>
+</p:sld>
+</file>
+
+<file path=ppt/slides/slide17.xml><?xml version="1.0" encoding="utf-8"?>
+<p:sld xmlns:a="http://schemas.openxmlformats.org/drawingml/2006/main" xmlns:r="http://schemas.openxmlformats.org/officeDocument/2006/relationships" xmlns:p="http://schemas.openxmlformats.org/presentationml/2006/main">
+  <p:cSld>
+    <p:spTree>
+      <p:nvGrpSpPr>
+        <p:cNvPr id="1" name=""/>
+        <p:cNvGrpSpPr/>
+        <p:nvPr/>
+      </p:nvGrpSpPr>
+      <p:grpSpPr>
+        <a:xfrm>
+          <a:off x="0" y="0"/>
+          <a:ext cx="0" cy="0"/>
+          <a:chOff x="0" y="0"/>
+          <a:chExt cx="0" cy="0"/>
+        </a:xfrm>
+      </p:grpSpPr>
+      <p:sp>
+        <p:nvSpPr>
+          <p:cNvPr id="2" name="Title 1">
+            <a:extLst>
+              <a:ext uri="{FF2B5EF4-FFF2-40B4-BE49-F238E27FC236}">
                 <a16:creationId xmlns:a16="http://schemas.microsoft.com/office/drawing/2014/main" xmlns="" id="{623FB4D5-DA14-4F29-9320-2DE0A6B571B9}"/>
               </a:ext>
             </a:extLst>
@@ -26919,7 +28444,7 @@
             <a:fld id="{19B51A1E-902D-48AF-9020-955120F399B6}" type="slidenum">
               <a:rPr lang="en-US" smtClean="0"/>
               <a:pPr/>
-              <a:t>13</a:t>
+              <a:t>17</a:t>
             </a:fld>
             <a:endParaRPr lang="en-US" dirty="0"/>
           </a:p>
@@ -27038,7 +28563,7 @@
 </p:sld>
 </file>
 
-<file path=ppt/slides/slide14.xml><?xml version="1.0" encoding="utf-8"?>
+<file path=ppt/slides/slide18.xml><?xml version="1.0" encoding="utf-8"?>
 <p:sld xmlns:a="http://schemas.openxmlformats.org/drawingml/2006/main" xmlns:r="http://schemas.openxmlformats.org/officeDocument/2006/relationships" xmlns:p="http://schemas.openxmlformats.org/presentationml/2006/main">
   <p:cSld>
     <p:spTree>
@@ -30320,7 +31845,7 @@
             <a:fld id="{19B51A1E-902D-48AF-9020-955120F399B6}" type="slidenum">
               <a:rPr lang="en-US" smtClean="0"/>
               <a:pPr/>
-              <a:t>14</a:t>
+              <a:t>18</a:t>
             </a:fld>
             <a:endParaRPr lang="en-US" dirty="0"/>
           </a:p>
@@ -30346,7 +31871,7 @@
 </p:sld>
 </file>
 
-<file path=ppt/slides/slide15.xml><?xml version="1.0" encoding="utf-8"?>
+<file path=ppt/slides/slide19.xml><?xml version="1.0" encoding="utf-8"?>
 <p:sld xmlns:a="http://schemas.openxmlformats.org/drawingml/2006/main" xmlns:r="http://schemas.openxmlformats.org/officeDocument/2006/relationships" xmlns:p="http://schemas.openxmlformats.org/presentationml/2006/main">
   <p:cSld>
     <p:spTree>
@@ -30716,7 +32241,7 @@
             <a:fld id="{19B51A1E-902D-48AF-9020-955120F399B6}" type="slidenum">
               <a:rPr lang="en-US" smtClean="0"/>
               <a:pPr/>
-              <a:t>15</a:t>
+              <a:t>19</a:t>
             </a:fld>
             <a:endParaRPr lang="en-US" dirty="0"/>
           </a:p>
@@ -30726,1089 +32251,6 @@
     <p:extLst>
       <p:ext uri="{BB962C8B-B14F-4D97-AF65-F5344CB8AC3E}">
         <p14:creationId xmlns:p14="http://schemas.microsoft.com/office/powerpoint/2010/main" val="665219316"/>
-      </p:ext>
-    </p:extLst>
-  </p:cSld>
-  <p:clrMapOvr>
-    <a:masterClrMapping/>
-  </p:clrMapOvr>
-</p:sld>
-</file>
-
-<file path=ppt/slides/slide16.xml><?xml version="1.0" encoding="utf-8"?>
-<p:sld xmlns:a="http://schemas.openxmlformats.org/drawingml/2006/main" xmlns:r="http://schemas.openxmlformats.org/officeDocument/2006/relationships" xmlns:p="http://schemas.openxmlformats.org/presentationml/2006/main">
-  <p:cSld>
-    <p:spTree>
-      <p:nvGrpSpPr>
-        <p:cNvPr id="1" name=""/>
-        <p:cNvGrpSpPr/>
-        <p:nvPr/>
-      </p:nvGrpSpPr>
-      <p:grpSpPr>
-        <a:xfrm>
-          <a:off x="0" y="0"/>
-          <a:ext cx="0" cy="0"/>
-          <a:chOff x="0" y="0"/>
-          <a:chExt cx="0" cy="0"/>
-        </a:xfrm>
-      </p:grpSpPr>
-      <p:pic>
-        <p:nvPicPr>
-          <p:cNvPr id="12" name="Picture Placeholder 11" descr="Image placeholder">
-            <a:extLst>
-              <a:ext uri="{FF2B5EF4-FFF2-40B4-BE49-F238E27FC236}">
-                <a16:creationId xmlns:a16="http://schemas.microsoft.com/office/drawing/2014/main" xmlns="" id="{C4330FBA-FEA8-B941-8864-B3DEDDE80404}"/>
-              </a:ext>
-            </a:extLst>
-          </p:cNvPr>
-          <p:cNvPicPr>
-            <a:picLocks noGrp="1" noChangeAspect="1"/>
-          </p:cNvPicPr>
-          <p:nvPr>
-            <p:ph type="pic" sz="quarter" idx="10"/>
-          </p:nvPr>
-        </p:nvPicPr>
-        <p:blipFill>
-          <a:blip r:embed="rId2" cstate="screen">
-            <a:extLst>
-              <a:ext uri="{28A0092B-C50C-407E-A947-70E740481C1C}">
-                <a14:useLocalDpi xmlns:a14="http://schemas.microsoft.com/office/drawing/2010/main"/>
-              </a:ext>
-            </a:extLst>
-          </a:blip>
-          <a:srcRect/>
-          <a:stretch>
-            <a:fillRect/>
-          </a:stretch>
-        </p:blipFill>
-        <p:spPr/>
-      </p:pic>
-      <p:sp>
-        <p:nvSpPr>
-          <p:cNvPr id="38" name="TextBox 37">
-            <a:extLst>
-              <a:ext uri="{FF2B5EF4-FFF2-40B4-BE49-F238E27FC236}">
-                <a16:creationId xmlns:a16="http://schemas.microsoft.com/office/drawing/2014/main" xmlns="" id="{B231FB9C-F234-41D0-A4CE-8C29A5F2F553}"/>
-              </a:ext>
-              <a:ext uri="{C183D7F6-B498-43B3-948B-1728B52AA6E4}">
-                <adec:decorative xmlns:adec="http://schemas.microsoft.com/office/drawing/2017/decorative" xmlns="" val="1"/>
-              </a:ext>
-            </a:extLst>
-          </p:cNvPr>
-          <p:cNvSpPr txBox="1">
-            <a:spLocks/>
-          </p:cNvSpPr>
-          <p:nvPr/>
-        </p:nvSpPr>
-        <p:spPr>
-          <a:xfrm>
-            <a:off x="11354303" y="3842399"/>
-            <a:ext cx="846997" cy="2200275"/>
-          </a:xfrm>
-          <a:custGeom>
-            <a:avLst/>
-            <a:gdLst>
-              <a:gd name="connsiteX0" fmla="*/ 99480 w 846997"/>
-              <a:gd name="connsiteY0" fmla="*/ 0 h 2200275"/>
-              <a:gd name="connsiteX1" fmla="*/ 846997 w 846997"/>
-              <a:gd name="connsiteY1" fmla="*/ 0 h 2200275"/>
-              <a:gd name="connsiteX2" fmla="*/ 846997 w 846997"/>
-              <a:gd name="connsiteY2" fmla="*/ 2200275 h 2200275"/>
-              <a:gd name="connsiteX3" fmla="*/ 99480 w 846997"/>
-              <a:gd name="connsiteY3" fmla="*/ 2200275 h 2200275"/>
-              <a:gd name="connsiteX4" fmla="*/ 0 w 846997"/>
-              <a:gd name="connsiteY4" fmla="*/ 2099942 h 2200275"/>
-              <a:gd name="connsiteX5" fmla="*/ 0 w 846997"/>
-              <a:gd name="connsiteY5" fmla="*/ 100333 h 2200275"/>
-              <a:gd name="connsiteX6" fmla="*/ 99480 w 846997"/>
-              <a:gd name="connsiteY6" fmla="*/ 0 h 2200275"/>
-            </a:gdLst>
-            <a:ahLst/>
-            <a:cxnLst>
-              <a:cxn ang="0">
-                <a:pos x="connsiteX0" y="connsiteY0"/>
-              </a:cxn>
-              <a:cxn ang="0">
-                <a:pos x="connsiteX1" y="connsiteY1"/>
-              </a:cxn>
-              <a:cxn ang="0">
-                <a:pos x="connsiteX2" y="connsiteY2"/>
-              </a:cxn>
-              <a:cxn ang="0">
-                <a:pos x="connsiteX3" y="connsiteY3"/>
-              </a:cxn>
-              <a:cxn ang="0">
-                <a:pos x="connsiteX4" y="connsiteY4"/>
-              </a:cxn>
-              <a:cxn ang="0">
-                <a:pos x="connsiteX5" y="connsiteY5"/>
-              </a:cxn>
-              <a:cxn ang="0">
-                <a:pos x="connsiteX6" y="connsiteY6"/>
-              </a:cxn>
-            </a:cxnLst>
-            <a:rect l="l" t="t" r="r" b="b"/>
-            <a:pathLst>
-              <a:path w="846997" h="2200275">
-                <a:moveTo>
-                  <a:pt x="99480" y="0"/>
-                </a:moveTo>
-                <a:lnTo>
-                  <a:pt x="846997" y="0"/>
-                </a:lnTo>
-                <a:lnTo>
-                  <a:pt x="846997" y="2200275"/>
-                </a:lnTo>
-                <a:lnTo>
-                  <a:pt x="99480" y="2200275"/>
-                </a:lnTo>
-                <a:cubicBezTo>
-                  <a:pt x="44539" y="2200275"/>
-                  <a:pt x="0" y="2155354"/>
-                  <a:pt x="0" y="2099942"/>
-                </a:cubicBezTo>
-                <a:lnTo>
-                  <a:pt x="0" y="100333"/>
-                </a:lnTo>
-                <a:cubicBezTo>
-                  <a:pt x="0" y="44921"/>
-                  <a:pt x="44539" y="0"/>
-                  <a:pt x="99480" y="0"/>
-                </a:cubicBezTo>
-                <a:close/>
-              </a:path>
-            </a:pathLst>
-          </a:custGeom>
-          <a:gradFill>
-            <a:gsLst>
-              <a:gs pos="100000">
-                <a:schemeClr val="tx1">
-                  <a:lumMod val="75000"/>
-                  <a:lumOff val="25000"/>
-                </a:schemeClr>
-              </a:gs>
-              <a:gs pos="0">
-                <a:schemeClr val="tx1"/>
-              </a:gs>
-            </a:gsLst>
-            <a:lin ang="0" scaled="0"/>
-          </a:gradFill>
-          <a:ln w="3175">
-            <a:solidFill>
-              <a:schemeClr val="tx1">
-                <a:lumMod val="85000"/>
-                <a:lumOff val="15000"/>
-              </a:schemeClr>
-            </a:solidFill>
-          </a:ln>
-        </p:spPr>
-        <p:txBody>
-          <a:bodyPr vert="horz" wrap="square" lIns="180000" tIns="288000" rIns="180000" bIns="180000" rtlCol="0" anchor="t">
-            <a:noAutofit/>
-          </a:bodyPr>
-          <a:lstStyle>
-            <a:lvl1pPr algn="l" defTabSz="914400" rtl="0" eaLnBrk="1" latinLnBrk="0" hangingPunct="1">
-              <a:lnSpc>
-                <a:spcPts val="4000"/>
-              </a:lnSpc>
-              <a:spcBef>
-                <a:spcPct val="0"/>
-              </a:spcBef>
-              <a:buNone/>
-              <a:defRPr sz="5000" b="1" kern="1200" spc="-300">
-                <a:solidFill>
-                  <a:schemeClr val="bg1">
-                    <a:lumMod val="95000"/>
-                  </a:schemeClr>
-                </a:solidFill>
-                <a:latin typeface="+mj-lt"/>
-                <a:ea typeface="+mj-ea"/>
-                <a:cs typeface="+mj-cs"/>
-              </a:defRPr>
-            </a:lvl1pPr>
-          </a:lstStyle>
-          <a:p>
-            <a:endParaRPr lang="en-US" dirty="0"/>
-          </a:p>
-        </p:txBody>
-      </p:sp>
-      <p:sp>
-        <p:nvSpPr>
-          <p:cNvPr id="35" name="Isosceles Triangle 34">
-            <a:extLst>
-              <a:ext uri="{FF2B5EF4-FFF2-40B4-BE49-F238E27FC236}">
-                <a16:creationId xmlns:a16="http://schemas.microsoft.com/office/drawing/2014/main" xmlns="" id="{FE193317-B8BD-46CA-B0A6-8A7511B086D9}"/>
-              </a:ext>
-              <a:ext uri="{C183D7F6-B498-43B3-948B-1728B52AA6E4}">
-                <adec:decorative xmlns:adec="http://schemas.microsoft.com/office/drawing/2017/decorative" xmlns="" val="1"/>
-              </a:ext>
-            </a:extLst>
-          </p:cNvPr>
-          <p:cNvSpPr/>
-          <p:nvPr/>
-        </p:nvSpPr>
-        <p:spPr>
-          <a:xfrm rot="10800000">
-            <a:off x="11359065" y="5556894"/>
-            <a:ext cx="476249" cy="424971"/>
-          </a:xfrm>
-          <a:prstGeom prst="triangle">
-            <a:avLst>
-              <a:gd name="adj" fmla="val 100000"/>
-            </a:avLst>
-          </a:prstGeom>
-          <a:solidFill>
-            <a:schemeClr val="accent1"/>
-          </a:solidFill>
-          <a:ln w="3175">
-            <a:solidFill>
-              <a:schemeClr val="tx1">
-                <a:lumMod val="65000"/>
-                <a:lumOff val="35000"/>
-              </a:schemeClr>
-            </a:solidFill>
-          </a:ln>
-        </p:spPr>
-        <p:style>
-          <a:lnRef idx="2">
-            <a:schemeClr val="accent1">
-              <a:shade val="50000"/>
-            </a:schemeClr>
-          </a:lnRef>
-          <a:fillRef idx="1">
-            <a:schemeClr val="accent1"/>
-          </a:fillRef>
-          <a:effectRef idx="0">
-            <a:schemeClr val="accent1"/>
-          </a:effectRef>
-          <a:fontRef idx="minor">
-            <a:schemeClr val="lt1"/>
-          </a:fontRef>
-        </p:style>
-        <p:txBody>
-          <a:bodyPr rtlCol="0" anchor="ctr"/>
-          <a:lstStyle/>
-          <a:p>
-            <a:pPr algn="ctr"/>
-            <a:endParaRPr lang="en-US" dirty="0"/>
-          </a:p>
-        </p:txBody>
-      </p:sp>
-      <p:sp>
-        <p:nvSpPr>
-          <p:cNvPr id="32" name="Freeform 5">
-            <a:extLst>
-              <a:ext uri="{FF2B5EF4-FFF2-40B4-BE49-F238E27FC236}">
-                <a16:creationId xmlns:a16="http://schemas.microsoft.com/office/drawing/2014/main" xmlns="" id="{85E0D4E1-E389-4671-B0E7-165A10A05425}"/>
-              </a:ext>
-              <a:ext uri="{C183D7F6-B498-43B3-948B-1728B52AA6E4}">
-                <adec:decorative xmlns:adec="http://schemas.microsoft.com/office/drawing/2017/decorative" xmlns="" val="1"/>
-              </a:ext>
-            </a:extLst>
-          </p:cNvPr>
-          <p:cNvSpPr>
-            <a:spLocks noChangeAspect="1"/>
-          </p:cNvSpPr>
-          <p:nvPr/>
-        </p:nvSpPr>
-        <p:spPr bwMode="auto">
-          <a:xfrm>
-            <a:off x="4257349" y="2355010"/>
-            <a:ext cx="1838651" cy="1613506"/>
-          </a:xfrm>
-          <a:custGeom>
-            <a:avLst/>
-            <a:gdLst>
-              <a:gd name="T0" fmla="*/ 781 w 1099"/>
-              <a:gd name="T1" fmla="*/ 0 h 968"/>
-              <a:gd name="T2" fmla="*/ 318 w 1099"/>
-              <a:gd name="T3" fmla="*/ 0 h 968"/>
-              <a:gd name="T4" fmla="*/ 246 w 1099"/>
-              <a:gd name="T5" fmla="*/ 42 h 968"/>
-              <a:gd name="T6" fmla="*/ 15 w 1099"/>
-              <a:gd name="T7" fmla="*/ 443 h 968"/>
-              <a:gd name="T8" fmla="*/ 15 w 1099"/>
-              <a:gd name="T9" fmla="*/ 525 h 968"/>
-              <a:gd name="T10" fmla="*/ 246 w 1099"/>
-              <a:gd name="T11" fmla="*/ 926 h 968"/>
-              <a:gd name="T12" fmla="*/ 318 w 1099"/>
-              <a:gd name="T13" fmla="*/ 968 h 968"/>
-              <a:gd name="T14" fmla="*/ 781 w 1099"/>
-              <a:gd name="T15" fmla="*/ 968 h 968"/>
-              <a:gd name="T16" fmla="*/ 852 w 1099"/>
-              <a:gd name="T17" fmla="*/ 926 h 968"/>
-              <a:gd name="T18" fmla="*/ 1084 w 1099"/>
-              <a:gd name="T19" fmla="*/ 525 h 968"/>
-              <a:gd name="T20" fmla="*/ 1084 w 1099"/>
-              <a:gd name="T21" fmla="*/ 443 h 968"/>
-              <a:gd name="T22" fmla="*/ 852 w 1099"/>
-              <a:gd name="T23" fmla="*/ 42 h 968"/>
-              <a:gd name="T24" fmla="*/ 781 w 1099"/>
-              <a:gd name="T25" fmla="*/ 0 h 968"/>
-            </a:gdLst>
-            <a:ahLst/>
-            <a:cxnLst>
-              <a:cxn ang="0">
-                <a:pos x="T0" y="T1"/>
-              </a:cxn>
-              <a:cxn ang="0">
-                <a:pos x="T2" y="T3"/>
-              </a:cxn>
-              <a:cxn ang="0">
-                <a:pos x="T4" y="T5"/>
-              </a:cxn>
-              <a:cxn ang="0">
-                <a:pos x="T6" y="T7"/>
-              </a:cxn>
-              <a:cxn ang="0">
-                <a:pos x="T8" y="T9"/>
-              </a:cxn>
-              <a:cxn ang="0">
-                <a:pos x="T10" y="T11"/>
-              </a:cxn>
-              <a:cxn ang="0">
-                <a:pos x="T12" y="T13"/>
-              </a:cxn>
-              <a:cxn ang="0">
-                <a:pos x="T14" y="T15"/>
-              </a:cxn>
-              <a:cxn ang="0">
-                <a:pos x="T16" y="T17"/>
-              </a:cxn>
-              <a:cxn ang="0">
-                <a:pos x="T18" y="T19"/>
-              </a:cxn>
-              <a:cxn ang="0">
-                <a:pos x="T20" y="T21"/>
-              </a:cxn>
-              <a:cxn ang="0">
-                <a:pos x="T22" y="T23"/>
-              </a:cxn>
-              <a:cxn ang="0">
-                <a:pos x="T24" y="T25"/>
-              </a:cxn>
-            </a:cxnLst>
-            <a:rect l="0" t="0" r="r" b="b"/>
-            <a:pathLst>
-              <a:path w="1099" h="968">
-                <a:moveTo>
-                  <a:pt x="781" y="0"/>
-                </a:moveTo>
-                <a:cubicBezTo>
-                  <a:pt x="318" y="0"/>
-                  <a:pt x="318" y="0"/>
-                  <a:pt x="318" y="0"/>
-                </a:cubicBezTo>
-                <a:cubicBezTo>
-                  <a:pt x="288" y="0"/>
-                  <a:pt x="261" y="16"/>
-                  <a:pt x="246" y="42"/>
-                </a:cubicBezTo>
-                <a:cubicBezTo>
-                  <a:pt x="15" y="443"/>
-                  <a:pt x="15" y="443"/>
-                  <a:pt x="15" y="443"/>
-                </a:cubicBezTo>
-                <a:cubicBezTo>
-                  <a:pt x="0" y="468"/>
-                  <a:pt x="0" y="500"/>
-                  <a:pt x="15" y="525"/>
-                </a:cubicBezTo>
-                <a:cubicBezTo>
-                  <a:pt x="246" y="926"/>
-                  <a:pt x="246" y="926"/>
-                  <a:pt x="246" y="926"/>
-                </a:cubicBezTo>
-                <a:cubicBezTo>
-                  <a:pt x="261" y="952"/>
-                  <a:pt x="288" y="968"/>
-                  <a:pt x="318" y="968"/>
-                </a:cubicBezTo>
-                <a:cubicBezTo>
-                  <a:pt x="781" y="968"/>
-                  <a:pt x="781" y="968"/>
-                  <a:pt x="781" y="968"/>
-                </a:cubicBezTo>
-                <a:cubicBezTo>
-                  <a:pt x="810" y="968"/>
-                  <a:pt x="838" y="952"/>
-                  <a:pt x="852" y="926"/>
-                </a:cubicBezTo>
-                <a:cubicBezTo>
-                  <a:pt x="1084" y="525"/>
-                  <a:pt x="1084" y="525"/>
-                  <a:pt x="1084" y="525"/>
-                </a:cubicBezTo>
-                <a:cubicBezTo>
-                  <a:pt x="1099" y="500"/>
-                  <a:pt x="1099" y="468"/>
-                  <a:pt x="1084" y="443"/>
-                </a:cubicBezTo>
-                <a:cubicBezTo>
-                  <a:pt x="852" y="42"/>
-                  <a:pt x="852" y="42"/>
-                  <a:pt x="852" y="42"/>
-                </a:cubicBezTo>
-                <a:cubicBezTo>
-                  <a:pt x="838" y="16"/>
-                  <a:pt x="810" y="0"/>
-                  <a:pt x="781" y="0"/>
-                </a:cubicBezTo>
-                <a:close/>
-              </a:path>
-            </a:pathLst>
-          </a:custGeom>
-          <a:solidFill>
-            <a:schemeClr val="bg1">
-              <a:lumMod val="95000"/>
-            </a:schemeClr>
-          </a:solidFill>
-          <a:ln w="63500" cap="flat">
-            <a:noFill/>
-            <a:prstDash val="solid"/>
-            <a:miter lim="800000"/>
-            <a:headEnd/>
-            <a:tailEnd/>
-          </a:ln>
-        </p:spPr>
-        <p:txBody>
-          <a:bodyPr vert="horz" wrap="square" lIns="91440" tIns="45720" rIns="91440" bIns="45720" numCol="1" anchor="t" anchorCtr="0" compatLnSpc="1">
-            <a:prstTxWarp prst="textNoShape">
-              <a:avLst/>
-            </a:prstTxWarp>
-          </a:bodyPr>
-          <a:lstStyle/>
-          <a:p>
-            <a:endParaRPr lang="en-US" dirty="0"/>
-          </a:p>
-        </p:txBody>
-      </p:sp>
-      <p:sp>
-        <p:nvSpPr>
-          <p:cNvPr id="33" name="Freeform 5">
-            <a:extLst>
-              <a:ext uri="{FF2B5EF4-FFF2-40B4-BE49-F238E27FC236}">
-                <a16:creationId xmlns:a16="http://schemas.microsoft.com/office/drawing/2014/main" xmlns="" id="{8186FEAF-6E1E-4258-94C3-5C589D4B5ADE}"/>
-              </a:ext>
-              <a:ext uri="{C183D7F6-B498-43B3-948B-1728B52AA6E4}">
-                <adec:decorative xmlns:adec="http://schemas.microsoft.com/office/drawing/2017/decorative" xmlns="" val="1"/>
-              </a:ext>
-            </a:extLst>
-          </p:cNvPr>
-          <p:cNvSpPr>
-            <a:spLocks noChangeAspect="1"/>
-          </p:cNvSpPr>
-          <p:nvPr/>
-        </p:nvSpPr>
-        <p:spPr bwMode="auto">
-          <a:xfrm>
-            <a:off x="6490727" y="1236374"/>
-            <a:ext cx="1838651" cy="1613506"/>
-          </a:xfrm>
-          <a:custGeom>
-            <a:avLst/>
-            <a:gdLst>
-              <a:gd name="T0" fmla="*/ 781 w 1099"/>
-              <a:gd name="T1" fmla="*/ 0 h 968"/>
-              <a:gd name="T2" fmla="*/ 318 w 1099"/>
-              <a:gd name="T3" fmla="*/ 0 h 968"/>
-              <a:gd name="T4" fmla="*/ 246 w 1099"/>
-              <a:gd name="T5" fmla="*/ 42 h 968"/>
-              <a:gd name="T6" fmla="*/ 15 w 1099"/>
-              <a:gd name="T7" fmla="*/ 443 h 968"/>
-              <a:gd name="T8" fmla="*/ 15 w 1099"/>
-              <a:gd name="T9" fmla="*/ 525 h 968"/>
-              <a:gd name="T10" fmla="*/ 246 w 1099"/>
-              <a:gd name="T11" fmla="*/ 926 h 968"/>
-              <a:gd name="T12" fmla="*/ 318 w 1099"/>
-              <a:gd name="T13" fmla="*/ 968 h 968"/>
-              <a:gd name="T14" fmla="*/ 781 w 1099"/>
-              <a:gd name="T15" fmla="*/ 968 h 968"/>
-              <a:gd name="T16" fmla="*/ 852 w 1099"/>
-              <a:gd name="T17" fmla="*/ 926 h 968"/>
-              <a:gd name="T18" fmla="*/ 1084 w 1099"/>
-              <a:gd name="T19" fmla="*/ 525 h 968"/>
-              <a:gd name="T20" fmla="*/ 1084 w 1099"/>
-              <a:gd name="T21" fmla="*/ 443 h 968"/>
-              <a:gd name="T22" fmla="*/ 852 w 1099"/>
-              <a:gd name="T23" fmla="*/ 42 h 968"/>
-              <a:gd name="T24" fmla="*/ 781 w 1099"/>
-              <a:gd name="T25" fmla="*/ 0 h 968"/>
-            </a:gdLst>
-            <a:ahLst/>
-            <a:cxnLst>
-              <a:cxn ang="0">
-                <a:pos x="T0" y="T1"/>
-              </a:cxn>
-              <a:cxn ang="0">
-                <a:pos x="T2" y="T3"/>
-              </a:cxn>
-              <a:cxn ang="0">
-                <a:pos x="T4" y="T5"/>
-              </a:cxn>
-              <a:cxn ang="0">
-                <a:pos x="T6" y="T7"/>
-              </a:cxn>
-              <a:cxn ang="0">
-                <a:pos x="T8" y="T9"/>
-              </a:cxn>
-              <a:cxn ang="0">
-                <a:pos x="T10" y="T11"/>
-              </a:cxn>
-              <a:cxn ang="0">
-                <a:pos x="T12" y="T13"/>
-              </a:cxn>
-              <a:cxn ang="0">
-                <a:pos x="T14" y="T15"/>
-              </a:cxn>
-              <a:cxn ang="0">
-                <a:pos x="T16" y="T17"/>
-              </a:cxn>
-              <a:cxn ang="0">
-                <a:pos x="T18" y="T19"/>
-              </a:cxn>
-              <a:cxn ang="0">
-                <a:pos x="T20" y="T21"/>
-              </a:cxn>
-              <a:cxn ang="0">
-                <a:pos x="T22" y="T23"/>
-              </a:cxn>
-              <a:cxn ang="0">
-                <a:pos x="T24" y="T25"/>
-              </a:cxn>
-            </a:cxnLst>
-            <a:rect l="0" t="0" r="r" b="b"/>
-            <a:pathLst>
-              <a:path w="1099" h="968">
-                <a:moveTo>
-                  <a:pt x="781" y="0"/>
-                </a:moveTo>
-                <a:cubicBezTo>
-                  <a:pt x="318" y="0"/>
-                  <a:pt x="318" y="0"/>
-                  <a:pt x="318" y="0"/>
-                </a:cubicBezTo>
-                <a:cubicBezTo>
-                  <a:pt x="288" y="0"/>
-                  <a:pt x="261" y="16"/>
-                  <a:pt x="246" y="42"/>
-                </a:cubicBezTo>
-                <a:cubicBezTo>
-                  <a:pt x="15" y="443"/>
-                  <a:pt x="15" y="443"/>
-                  <a:pt x="15" y="443"/>
-                </a:cubicBezTo>
-                <a:cubicBezTo>
-                  <a:pt x="0" y="468"/>
-                  <a:pt x="0" y="500"/>
-                  <a:pt x="15" y="525"/>
-                </a:cubicBezTo>
-                <a:cubicBezTo>
-                  <a:pt x="246" y="926"/>
-                  <a:pt x="246" y="926"/>
-                  <a:pt x="246" y="926"/>
-                </a:cubicBezTo>
-                <a:cubicBezTo>
-                  <a:pt x="261" y="952"/>
-                  <a:pt x="288" y="968"/>
-                  <a:pt x="318" y="968"/>
-                </a:cubicBezTo>
-                <a:cubicBezTo>
-                  <a:pt x="781" y="968"/>
-                  <a:pt x="781" y="968"/>
-                  <a:pt x="781" y="968"/>
-                </a:cubicBezTo>
-                <a:cubicBezTo>
-                  <a:pt x="810" y="968"/>
-                  <a:pt x="838" y="952"/>
-                  <a:pt x="852" y="926"/>
-                </a:cubicBezTo>
-                <a:cubicBezTo>
-                  <a:pt x="1084" y="525"/>
-                  <a:pt x="1084" y="525"/>
-                  <a:pt x="1084" y="525"/>
-                </a:cubicBezTo>
-                <a:cubicBezTo>
-                  <a:pt x="1099" y="500"/>
-                  <a:pt x="1099" y="468"/>
-                  <a:pt x="1084" y="443"/>
-                </a:cubicBezTo>
-                <a:cubicBezTo>
-                  <a:pt x="852" y="42"/>
-                  <a:pt x="852" y="42"/>
-                  <a:pt x="852" y="42"/>
-                </a:cubicBezTo>
-                <a:cubicBezTo>
-                  <a:pt x="838" y="16"/>
-                  <a:pt x="810" y="0"/>
-                  <a:pt x="781" y="0"/>
-                </a:cubicBezTo>
-                <a:close/>
-              </a:path>
-            </a:pathLst>
-          </a:custGeom>
-          <a:noFill/>
-          <a:ln w="63500" cap="flat">
-            <a:solidFill>
-              <a:schemeClr val="bg1">
-                <a:lumMod val="95000"/>
-              </a:schemeClr>
-            </a:solidFill>
-            <a:prstDash val="solid"/>
-            <a:miter lim="800000"/>
-            <a:headEnd/>
-            <a:tailEnd/>
-          </a:ln>
-        </p:spPr>
-        <p:txBody>
-          <a:bodyPr vert="horz" wrap="square" lIns="91440" tIns="45720" rIns="91440" bIns="45720" numCol="1" anchor="t" anchorCtr="0" compatLnSpc="1">
-            <a:prstTxWarp prst="textNoShape">
-              <a:avLst/>
-            </a:prstTxWarp>
-          </a:bodyPr>
-          <a:lstStyle/>
-          <a:p>
-            <a:endParaRPr lang="en-US" dirty="0"/>
-          </a:p>
-        </p:txBody>
-      </p:sp>
-      <p:sp>
-        <p:nvSpPr>
-          <p:cNvPr id="20" name="Title 19">
-            <a:extLst>
-              <a:ext uri="{FF2B5EF4-FFF2-40B4-BE49-F238E27FC236}">
-                <a16:creationId xmlns:a16="http://schemas.microsoft.com/office/drawing/2014/main" xmlns="" id="{7C11A64B-7EA5-442C-8405-73273A5331D1}"/>
-              </a:ext>
-            </a:extLst>
-          </p:cNvPr>
-          <p:cNvSpPr>
-            <a:spLocks noGrp="1"/>
-          </p:cNvSpPr>
-          <p:nvPr>
-            <p:ph type="ctrTitle"/>
-          </p:nvPr>
-        </p:nvSpPr>
-        <p:spPr/>
-        <p:txBody>
-          <a:bodyPr/>
-          <a:lstStyle/>
-          <a:p>
-            <a:r>
-              <a:rPr lang="en-US" dirty="0"/>
-              <a:t>Thank You</a:t>
-            </a:r>
-          </a:p>
-        </p:txBody>
-      </p:sp>
-      <p:pic>
-        <p:nvPicPr>
-          <p:cNvPr id="8" name="Graphic 7" descr="User" title="Icon - Presenter Name">
-            <a:extLst>
-              <a:ext uri="{FF2B5EF4-FFF2-40B4-BE49-F238E27FC236}">
-                <a16:creationId xmlns:a16="http://schemas.microsoft.com/office/drawing/2014/main" xmlns="" id="{111541C4-DB03-4E53-994D-499C7D73C4DF}"/>
-              </a:ext>
-            </a:extLst>
-          </p:cNvPr>
-          <p:cNvPicPr>
-            <a:picLocks noChangeAspect="1"/>
-          </p:cNvPicPr>
-          <p:nvPr/>
-        </p:nvPicPr>
-        <p:blipFill>
-          <a:blip r:embed="rId3" cstate="screen">
-            <a:extLst>
-              <a:ext uri="{28A0092B-C50C-407E-A947-70E740481C1C}">
-                <a14:useLocalDpi xmlns:a14="http://schemas.microsoft.com/office/drawing/2010/main"/>
-              </a:ext>
-              <a:ext uri="{96DAC541-7B7A-43D3-8B79-37D633B846F1}">
-                <asvg:svgBlip xmlns:asvg="http://schemas.microsoft.com/office/drawing/2016/SVG/main" xmlns="" r:embed="rId4"/>
-              </a:ext>
-            </a:extLst>
-          </a:blip>
-          <a:stretch>
-            <a:fillRect/>
-          </a:stretch>
-        </p:blipFill>
-        <p:spPr>
-          <a:xfrm>
-            <a:off x="7678512" y="3859066"/>
-            <a:ext cx="218900" cy="218900"/>
-          </a:xfrm>
-          <a:prstGeom prst="rect">
-            <a:avLst/>
-          </a:prstGeom>
-        </p:spPr>
-      </p:pic>
-      <p:sp>
-        <p:nvSpPr>
-          <p:cNvPr id="4" name="Text Placeholder 3">
-            <a:extLst>
-              <a:ext uri="{FF2B5EF4-FFF2-40B4-BE49-F238E27FC236}">
-                <a16:creationId xmlns:a16="http://schemas.microsoft.com/office/drawing/2014/main" xmlns="" id="{60828E04-9C2A-4859-8050-C2DF67A249CB}"/>
-              </a:ext>
-            </a:extLst>
-          </p:cNvPr>
-          <p:cNvSpPr>
-            <a:spLocks noGrp="1"/>
-          </p:cNvSpPr>
-          <p:nvPr>
-            <p:ph type="body" sz="quarter" idx="15"/>
-          </p:nvPr>
-        </p:nvSpPr>
-        <p:spPr/>
-        <p:txBody>
-          <a:bodyPr/>
-          <a:lstStyle/>
-          <a:p>
-            <a:r>
-              <a:rPr lang="en-US" dirty="0"/>
-              <a:t>April Hansson</a:t>
-            </a:r>
-          </a:p>
-        </p:txBody>
-      </p:sp>
-      <p:pic>
-        <p:nvPicPr>
-          <p:cNvPr id="10" name="Graphic 9" descr="Smart Phone" title="Icon - Presenter Phone Number">
-            <a:extLst>
-              <a:ext uri="{FF2B5EF4-FFF2-40B4-BE49-F238E27FC236}">
-                <a16:creationId xmlns:a16="http://schemas.microsoft.com/office/drawing/2014/main" xmlns="" id="{A29DE31C-E099-4579-BB03-675E0A40C5F2}"/>
-              </a:ext>
-            </a:extLst>
-          </p:cNvPr>
-          <p:cNvPicPr>
-            <a:picLocks noChangeAspect="1"/>
-          </p:cNvPicPr>
-          <p:nvPr/>
-        </p:nvPicPr>
-        <p:blipFill>
-          <a:blip r:embed="rId5" cstate="screen">
-            <a:extLst>
-              <a:ext uri="{28A0092B-C50C-407E-A947-70E740481C1C}">
-                <a14:useLocalDpi xmlns:a14="http://schemas.microsoft.com/office/drawing/2010/main"/>
-              </a:ext>
-              <a:ext uri="{96DAC541-7B7A-43D3-8B79-37D633B846F1}">
-                <asvg:svgBlip xmlns:asvg="http://schemas.microsoft.com/office/drawing/2016/SVG/main" xmlns="" r:embed="rId6"/>
-              </a:ext>
-            </a:extLst>
-          </a:blip>
-          <a:stretch>
-            <a:fillRect/>
-          </a:stretch>
-        </p:blipFill>
-        <p:spPr>
-          <a:xfrm>
-            <a:off x="7678512" y="4223565"/>
-            <a:ext cx="218900" cy="218900"/>
-          </a:xfrm>
-          <a:prstGeom prst="rect">
-            <a:avLst/>
-          </a:prstGeom>
-        </p:spPr>
-      </p:pic>
-      <p:sp>
-        <p:nvSpPr>
-          <p:cNvPr id="5" name="Text Placeholder 4">
-            <a:extLst>
-              <a:ext uri="{FF2B5EF4-FFF2-40B4-BE49-F238E27FC236}">
-                <a16:creationId xmlns:a16="http://schemas.microsoft.com/office/drawing/2014/main" xmlns="" id="{11265965-2271-4C1C-BD0A-6F85F80FF9A6}"/>
-              </a:ext>
-            </a:extLst>
-          </p:cNvPr>
-          <p:cNvSpPr>
-            <a:spLocks noGrp="1"/>
-          </p:cNvSpPr>
-          <p:nvPr>
-            <p:ph type="body" sz="quarter" idx="16"/>
-          </p:nvPr>
-        </p:nvSpPr>
-        <p:spPr/>
-        <p:txBody>
-          <a:bodyPr/>
-          <a:lstStyle/>
-          <a:p>
-            <a:r>
-              <a:rPr lang="en-US" dirty="0"/>
-              <a:t>+1 23 987 6554</a:t>
-            </a:r>
-          </a:p>
-        </p:txBody>
-      </p:sp>
-      <p:pic>
-        <p:nvPicPr>
-          <p:cNvPr id="9" name="Graphic 8" descr="Envelope" title="Icon Presenter Email">
-            <a:extLst>
-              <a:ext uri="{FF2B5EF4-FFF2-40B4-BE49-F238E27FC236}">
-                <a16:creationId xmlns:a16="http://schemas.microsoft.com/office/drawing/2014/main" xmlns="" id="{773C1382-ACE1-460F-A1B6-AB761A7D2E6B}"/>
-              </a:ext>
-            </a:extLst>
-          </p:cNvPr>
-          <p:cNvPicPr>
-            <a:picLocks noChangeAspect="1"/>
-          </p:cNvPicPr>
-          <p:nvPr/>
-        </p:nvPicPr>
-        <p:blipFill>
-          <a:blip r:embed="rId7" cstate="screen">
-            <a:extLst>
-              <a:ext uri="{28A0092B-C50C-407E-A947-70E740481C1C}">
-                <a14:useLocalDpi xmlns:a14="http://schemas.microsoft.com/office/drawing/2010/main"/>
-              </a:ext>
-              <a:ext uri="{96DAC541-7B7A-43D3-8B79-37D633B846F1}">
-                <asvg:svgBlip xmlns:asvg="http://schemas.microsoft.com/office/drawing/2016/SVG/main" xmlns="" r:embed="rId8"/>
-              </a:ext>
-            </a:extLst>
-          </a:blip>
-          <a:stretch>
-            <a:fillRect/>
-          </a:stretch>
-        </p:blipFill>
-        <p:spPr>
-          <a:xfrm>
-            <a:off x="7678512" y="4615862"/>
-            <a:ext cx="218900" cy="218900"/>
-          </a:xfrm>
-          <a:prstGeom prst="rect">
-            <a:avLst/>
-          </a:prstGeom>
-        </p:spPr>
-      </p:pic>
-      <p:sp>
-        <p:nvSpPr>
-          <p:cNvPr id="6" name="Text Placeholder 5">
-            <a:extLst>
-              <a:ext uri="{FF2B5EF4-FFF2-40B4-BE49-F238E27FC236}">
-                <a16:creationId xmlns:a16="http://schemas.microsoft.com/office/drawing/2014/main" xmlns="" id="{50A3BCC3-A277-4C0B-9EBA-EB53990D8EBD}"/>
-              </a:ext>
-            </a:extLst>
-          </p:cNvPr>
-          <p:cNvSpPr>
-            <a:spLocks noGrp="1"/>
-          </p:cNvSpPr>
-          <p:nvPr>
-            <p:ph type="body" sz="quarter" idx="17"/>
-          </p:nvPr>
-        </p:nvSpPr>
-        <p:spPr/>
-        <p:txBody>
-          <a:bodyPr/>
-          <a:lstStyle/>
-          <a:p>
-            <a:r>
-              <a:rPr lang="en-US" dirty="0"/>
-              <a:t>april@www.proseware.com</a:t>
-            </a:r>
-          </a:p>
-        </p:txBody>
-      </p:sp>
-      <p:pic>
-        <p:nvPicPr>
-          <p:cNvPr id="11" name="Graphic 10" descr="Link">
-            <a:extLst>
-              <a:ext uri="{FF2B5EF4-FFF2-40B4-BE49-F238E27FC236}">
-                <a16:creationId xmlns:a16="http://schemas.microsoft.com/office/drawing/2014/main" xmlns="" id="{0718E6E0-05A2-479C-AEA8-1A385EB73474}"/>
-              </a:ext>
-            </a:extLst>
-          </p:cNvPr>
-          <p:cNvPicPr>
-            <a:picLocks noChangeAspect="1"/>
-          </p:cNvPicPr>
-          <p:nvPr/>
-        </p:nvPicPr>
-        <p:blipFill>
-          <a:blip r:embed="rId9" cstate="screen">
-            <a:extLst>
-              <a:ext uri="{28A0092B-C50C-407E-A947-70E740481C1C}">
-                <a14:useLocalDpi xmlns:a14="http://schemas.microsoft.com/office/drawing/2010/main"/>
-              </a:ext>
-              <a:ext uri="{96DAC541-7B7A-43D3-8B79-37D633B846F1}">
-                <asvg:svgBlip xmlns:asvg="http://schemas.microsoft.com/office/drawing/2016/SVG/main" xmlns="" r:embed="rId10"/>
-              </a:ext>
-            </a:extLst>
-          </a:blip>
-          <a:stretch>
-            <a:fillRect/>
-          </a:stretch>
-        </p:blipFill>
-        <p:spPr>
-          <a:xfrm>
-            <a:off x="7661653" y="4942435"/>
-            <a:ext cx="244786" cy="244786"/>
-          </a:xfrm>
-          <a:prstGeom prst="rect">
-            <a:avLst/>
-          </a:prstGeom>
-        </p:spPr>
-      </p:pic>
-      <p:sp>
-        <p:nvSpPr>
-          <p:cNvPr id="22" name="Text Placeholder 21">
-            <a:extLst>
-              <a:ext uri="{FF2B5EF4-FFF2-40B4-BE49-F238E27FC236}">
-                <a16:creationId xmlns:a16="http://schemas.microsoft.com/office/drawing/2014/main" xmlns="" id="{43DBE4D9-1044-49A3-ABD5-477041FF2B63}"/>
-              </a:ext>
-            </a:extLst>
-          </p:cNvPr>
-          <p:cNvSpPr>
-            <a:spLocks noGrp="1"/>
-          </p:cNvSpPr>
-          <p:nvPr>
-            <p:ph type="body" sz="quarter" idx="18"/>
-          </p:nvPr>
-        </p:nvSpPr>
-        <p:spPr/>
-        <p:txBody>
-          <a:bodyPr/>
-          <a:lstStyle/>
-          <a:p>
-            <a:r>
-              <a:rPr lang="en-US" dirty="0"/>
-              <a:t>www.proseware.com</a:t>
-            </a:r>
-          </a:p>
-        </p:txBody>
-      </p:sp>
-    </p:spTree>
-    <p:extLst>
-      <p:ext uri="{BB962C8B-B14F-4D97-AF65-F5344CB8AC3E}">
-        <p14:creationId xmlns:p14="http://schemas.microsoft.com/office/powerpoint/2010/main" val="4153678306"/>
-      </p:ext>
-    </p:extLst>
-  </p:cSld>
-  <p:clrMapOvr>
-    <a:masterClrMapping/>
-  </p:clrMapOvr>
-</p:sld>
-</file>
-
-<file path=ppt/slides/slide17.xml><?xml version="1.0" encoding="utf-8"?>
-<p:sld xmlns:a="http://schemas.openxmlformats.org/drawingml/2006/main" xmlns:r="http://schemas.openxmlformats.org/officeDocument/2006/relationships" xmlns:p="http://schemas.openxmlformats.org/presentationml/2006/main">
-  <p:cSld>
-    <p:spTree>
-      <p:nvGrpSpPr>
-        <p:cNvPr id="1" name=""/>
-        <p:cNvGrpSpPr/>
-        <p:nvPr/>
-      </p:nvGrpSpPr>
-      <p:grpSpPr>
-        <a:xfrm>
-          <a:off x="0" y="0"/>
-          <a:ext cx="0" cy="0"/>
-          <a:chOff x="0" y="0"/>
-          <a:chExt cx="0" cy="0"/>
-        </a:xfrm>
-      </p:grpSpPr>
-      <p:sp>
-        <p:nvSpPr>
-          <p:cNvPr id="4" name="Title 3">
-            <a:extLst>
-              <a:ext uri="{FF2B5EF4-FFF2-40B4-BE49-F238E27FC236}">
-                <a16:creationId xmlns:a16="http://schemas.microsoft.com/office/drawing/2014/main" xmlns="" id="{E98DCA46-603B-4178-8707-30E192CE6B8D}"/>
-              </a:ext>
-            </a:extLst>
-          </p:cNvPr>
-          <p:cNvSpPr>
-            <a:spLocks noGrp="1"/>
-          </p:cNvSpPr>
-          <p:nvPr>
-            <p:ph type="title"/>
-          </p:nvPr>
-        </p:nvSpPr>
-        <p:spPr/>
-        <p:txBody>
-          <a:bodyPr/>
-          <a:lstStyle/>
-          <a:p>
-            <a:r>
-              <a:rPr lang="en-US" dirty="0"/>
-              <a:t>Customize this Template</a:t>
-            </a:r>
-          </a:p>
-        </p:txBody>
-      </p:sp>
-      <p:sp>
-        <p:nvSpPr>
-          <p:cNvPr id="3" name="Text Placeholder 2">
-            <a:extLst>
-              <a:ext uri="{FF2B5EF4-FFF2-40B4-BE49-F238E27FC236}">
-                <a16:creationId xmlns:a16="http://schemas.microsoft.com/office/drawing/2014/main" xmlns="" id="{44C11960-E298-40D1-BBD6-3E621842A017}"/>
-              </a:ext>
-            </a:extLst>
-          </p:cNvPr>
-          <p:cNvSpPr>
-            <a:spLocks noGrp="1"/>
-          </p:cNvSpPr>
-          <p:nvPr>
-            <p:ph type="body" sz="quarter" idx="14"/>
-          </p:nvPr>
-        </p:nvSpPr>
-        <p:spPr/>
-        <p:txBody>
-          <a:bodyPr/>
-          <a:lstStyle/>
-          <a:p>
-            <a:pPr>
-              <a:lnSpc>
-                <a:spcPct val="100000"/>
-              </a:lnSpc>
-            </a:pPr>
-            <a:r>
-              <a:rPr lang="en-US" u="sng" dirty="0">
-                <a:solidFill>
-                  <a:srgbClr val="0070C0"/>
-                </a:solidFill>
-                <a:hlinkClick r:id="rId2">
-                  <a:extLst>
-                    <a:ext uri="{A12FA001-AC4F-418D-AE19-62706E023703}">
-                      <ahyp:hlinkClr xmlns:ahyp="http://schemas.microsoft.com/office/drawing/2018/hyperlinkcolor" xmlns="" val="tx"/>
-                    </a:ext>
-                  </a:extLst>
-                </a:hlinkClick>
-              </a:rPr>
-              <a:t>Template Editing Instructions and Feedback</a:t>
-            </a:r>
-            <a:endParaRPr lang="en-US" u="sng" dirty="0">
-              <a:solidFill>
-                <a:srgbClr val="0070C0"/>
-              </a:solidFill>
-            </a:endParaRPr>
-          </a:p>
-        </p:txBody>
-      </p:sp>
-      <p:sp>
-        <p:nvSpPr>
-          <p:cNvPr id="2" name="Slide Number Placeholder 1">
-            <a:extLst>
-              <a:ext uri="{FF2B5EF4-FFF2-40B4-BE49-F238E27FC236}">
-                <a16:creationId xmlns:a16="http://schemas.microsoft.com/office/drawing/2014/main" xmlns="" id="{5E0A2811-986E-4EBF-9612-8E79971C972D}"/>
-              </a:ext>
-            </a:extLst>
-          </p:cNvPr>
-          <p:cNvSpPr>
-            <a:spLocks noGrp="1"/>
-          </p:cNvSpPr>
-          <p:nvPr>
-            <p:ph type="sldNum" sz="quarter" idx="13"/>
-          </p:nvPr>
-        </p:nvSpPr>
-        <p:spPr/>
-        <p:txBody>
-          <a:bodyPr/>
-          <a:lstStyle/>
-          <a:p>
-            <a:fld id="{19B51A1E-902D-48AF-9020-955120F399B6}" type="slidenum">
-              <a:rPr lang="en-US" smtClean="0"/>
-              <a:pPr/>
-              <a:t>17</a:t>
-            </a:fld>
-            <a:endParaRPr lang="en-US" dirty="0"/>
-          </a:p>
-        </p:txBody>
-      </p:sp>
-    </p:spTree>
-    <p:extLst>
-      <p:ext uri="{BB962C8B-B14F-4D97-AF65-F5344CB8AC3E}">
-        <p14:creationId xmlns:p14="http://schemas.microsoft.com/office/powerpoint/2010/main" val="59582380"/>
       </p:ext>
     </p:extLst>
   </p:cSld>
@@ -32596,6 +33038,1089 @@
       </p:par>
     </p:tnLst>
   </p:timing>
+</p:sld>
+</file>
+
+<file path=ppt/slides/slide20.xml><?xml version="1.0" encoding="utf-8"?>
+<p:sld xmlns:a="http://schemas.openxmlformats.org/drawingml/2006/main" xmlns:r="http://schemas.openxmlformats.org/officeDocument/2006/relationships" xmlns:p="http://schemas.openxmlformats.org/presentationml/2006/main">
+  <p:cSld>
+    <p:spTree>
+      <p:nvGrpSpPr>
+        <p:cNvPr id="1" name=""/>
+        <p:cNvGrpSpPr/>
+        <p:nvPr/>
+      </p:nvGrpSpPr>
+      <p:grpSpPr>
+        <a:xfrm>
+          <a:off x="0" y="0"/>
+          <a:ext cx="0" cy="0"/>
+          <a:chOff x="0" y="0"/>
+          <a:chExt cx="0" cy="0"/>
+        </a:xfrm>
+      </p:grpSpPr>
+      <p:pic>
+        <p:nvPicPr>
+          <p:cNvPr id="12" name="Picture Placeholder 11" descr="Image placeholder">
+            <a:extLst>
+              <a:ext uri="{FF2B5EF4-FFF2-40B4-BE49-F238E27FC236}">
+                <a16:creationId xmlns:a16="http://schemas.microsoft.com/office/drawing/2014/main" xmlns="" id="{C4330FBA-FEA8-B941-8864-B3DEDDE80404}"/>
+              </a:ext>
+            </a:extLst>
+          </p:cNvPr>
+          <p:cNvPicPr>
+            <a:picLocks noGrp="1" noChangeAspect="1"/>
+          </p:cNvPicPr>
+          <p:nvPr>
+            <p:ph type="pic" sz="quarter" idx="10"/>
+          </p:nvPr>
+        </p:nvPicPr>
+        <p:blipFill>
+          <a:blip r:embed="rId2" cstate="screen">
+            <a:extLst>
+              <a:ext uri="{28A0092B-C50C-407E-A947-70E740481C1C}">
+                <a14:useLocalDpi xmlns:a14="http://schemas.microsoft.com/office/drawing/2010/main"/>
+              </a:ext>
+            </a:extLst>
+          </a:blip>
+          <a:srcRect/>
+          <a:stretch>
+            <a:fillRect/>
+          </a:stretch>
+        </p:blipFill>
+        <p:spPr/>
+      </p:pic>
+      <p:sp>
+        <p:nvSpPr>
+          <p:cNvPr id="38" name="TextBox 37">
+            <a:extLst>
+              <a:ext uri="{FF2B5EF4-FFF2-40B4-BE49-F238E27FC236}">
+                <a16:creationId xmlns:a16="http://schemas.microsoft.com/office/drawing/2014/main" xmlns="" id="{B231FB9C-F234-41D0-A4CE-8C29A5F2F553}"/>
+              </a:ext>
+              <a:ext uri="{C183D7F6-B498-43B3-948B-1728B52AA6E4}">
+                <adec:decorative xmlns:adec="http://schemas.microsoft.com/office/drawing/2017/decorative" xmlns="" val="1"/>
+              </a:ext>
+            </a:extLst>
+          </p:cNvPr>
+          <p:cNvSpPr txBox="1">
+            <a:spLocks/>
+          </p:cNvSpPr>
+          <p:nvPr/>
+        </p:nvSpPr>
+        <p:spPr>
+          <a:xfrm>
+            <a:off x="11354303" y="3842399"/>
+            <a:ext cx="846997" cy="2200275"/>
+          </a:xfrm>
+          <a:custGeom>
+            <a:avLst/>
+            <a:gdLst>
+              <a:gd name="connsiteX0" fmla="*/ 99480 w 846997"/>
+              <a:gd name="connsiteY0" fmla="*/ 0 h 2200275"/>
+              <a:gd name="connsiteX1" fmla="*/ 846997 w 846997"/>
+              <a:gd name="connsiteY1" fmla="*/ 0 h 2200275"/>
+              <a:gd name="connsiteX2" fmla="*/ 846997 w 846997"/>
+              <a:gd name="connsiteY2" fmla="*/ 2200275 h 2200275"/>
+              <a:gd name="connsiteX3" fmla="*/ 99480 w 846997"/>
+              <a:gd name="connsiteY3" fmla="*/ 2200275 h 2200275"/>
+              <a:gd name="connsiteX4" fmla="*/ 0 w 846997"/>
+              <a:gd name="connsiteY4" fmla="*/ 2099942 h 2200275"/>
+              <a:gd name="connsiteX5" fmla="*/ 0 w 846997"/>
+              <a:gd name="connsiteY5" fmla="*/ 100333 h 2200275"/>
+              <a:gd name="connsiteX6" fmla="*/ 99480 w 846997"/>
+              <a:gd name="connsiteY6" fmla="*/ 0 h 2200275"/>
+            </a:gdLst>
+            <a:ahLst/>
+            <a:cxnLst>
+              <a:cxn ang="0">
+                <a:pos x="connsiteX0" y="connsiteY0"/>
+              </a:cxn>
+              <a:cxn ang="0">
+                <a:pos x="connsiteX1" y="connsiteY1"/>
+              </a:cxn>
+              <a:cxn ang="0">
+                <a:pos x="connsiteX2" y="connsiteY2"/>
+              </a:cxn>
+              <a:cxn ang="0">
+                <a:pos x="connsiteX3" y="connsiteY3"/>
+              </a:cxn>
+              <a:cxn ang="0">
+                <a:pos x="connsiteX4" y="connsiteY4"/>
+              </a:cxn>
+              <a:cxn ang="0">
+                <a:pos x="connsiteX5" y="connsiteY5"/>
+              </a:cxn>
+              <a:cxn ang="0">
+                <a:pos x="connsiteX6" y="connsiteY6"/>
+              </a:cxn>
+            </a:cxnLst>
+            <a:rect l="l" t="t" r="r" b="b"/>
+            <a:pathLst>
+              <a:path w="846997" h="2200275">
+                <a:moveTo>
+                  <a:pt x="99480" y="0"/>
+                </a:moveTo>
+                <a:lnTo>
+                  <a:pt x="846997" y="0"/>
+                </a:lnTo>
+                <a:lnTo>
+                  <a:pt x="846997" y="2200275"/>
+                </a:lnTo>
+                <a:lnTo>
+                  <a:pt x="99480" y="2200275"/>
+                </a:lnTo>
+                <a:cubicBezTo>
+                  <a:pt x="44539" y="2200275"/>
+                  <a:pt x="0" y="2155354"/>
+                  <a:pt x="0" y="2099942"/>
+                </a:cubicBezTo>
+                <a:lnTo>
+                  <a:pt x="0" y="100333"/>
+                </a:lnTo>
+                <a:cubicBezTo>
+                  <a:pt x="0" y="44921"/>
+                  <a:pt x="44539" y="0"/>
+                  <a:pt x="99480" y="0"/>
+                </a:cubicBezTo>
+                <a:close/>
+              </a:path>
+            </a:pathLst>
+          </a:custGeom>
+          <a:gradFill>
+            <a:gsLst>
+              <a:gs pos="100000">
+                <a:schemeClr val="tx1">
+                  <a:lumMod val="75000"/>
+                  <a:lumOff val="25000"/>
+                </a:schemeClr>
+              </a:gs>
+              <a:gs pos="0">
+                <a:schemeClr val="tx1"/>
+              </a:gs>
+            </a:gsLst>
+            <a:lin ang="0" scaled="0"/>
+          </a:gradFill>
+          <a:ln w="3175">
+            <a:solidFill>
+              <a:schemeClr val="tx1">
+                <a:lumMod val="85000"/>
+                <a:lumOff val="15000"/>
+              </a:schemeClr>
+            </a:solidFill>
+          </a:ln>
+        </p:spPr>
+        <p:txBody>
+          <a:bodyPr vert="horz" wrap="square" lIns="180000" tIns="288000" rIns="180000" bIns="180000" rtlCol="0" anchor="t">
+            <a:noAutofit/>
+          </a:bodyPr>
+          <a:lstStyle>
+            <a:lvl1pPr algn="l" defTabSz="914400" rtl="0" eaLnBrk="1" latinLnBrk="0" hangingPunct="1">
+              <a:lnSpc>
+                <a:spcPts val="4000"/>
+              </a:lnSpc>
+              <a:spcBef>
+                <a:spcPct val="0"/>
+              </a:spcBef>
+              <a:buNone/>
+              <a:defRPr sz="5000" b="1" kern="1200" spc="-300">
+                <a:solidFill>
+                  <a:schemeClr val="bg1">
+                    <a:lumMod val="95000"/>
+                  </a:schemeClr>
+                </a:solidFill>
+                <a:latin typeface="+mj-lt"/>
+                <a:ea typeface="+mj-ea"/>
+                <a:cs typeface="+mj-cs"/>
+              </a:defRPr>
+            </a:lvl1pPr>
+          </a:lstStyle>
+          <a:p>
+            <a:endParaRPr lang="en-US" dirty="0"/>
+          </a:p>
+        </p:txBody>
+      </p:sp>
+      <p:sp>
+        <p:nvSpPr>
+          <p:cNvPr id="35" name="Isosceles Triangle 34">
+            <a:extLst>
+              <a:ext uri="{FF2B5EF4-FFF2-40B4-BE49-F238E27FC236}">
+                <a16:creationId xmlns:a16="http://schemas.microsoft.com/office/drawing/2014/main" xmlns="" id="{FE193317-B8BD-46CA-B0A6-8A7511B086D9}"/>
+              </a:ext>
+              <a:ext uri="{C183D7F6-B498-43B3-948B-1728B52AA6E4}">
+                <adec:decorative xmlns:adec="http://schemas.microsoft.com/office/drawing/2017/decorative" xmlns="" val="1"/>
+              </a:ext>
+            </a:extLst>
+          </p:cNvPr>
+          <p:cNvSpPr/>
+          <p:nvPr/>
+        </p:nvSpPr>
+        <p:spPr>
+          <a:xfrm rot="10800000">
+            <a:off x="11359065" y="5556894"/>
+            <a:ext cx="476249" cy="424971"/>
+          </a:xfrm>
+          <a:prstGeom prst="triangle">
+            <a:avLst>
+              <a:gd name="adj" fmla="val 100000"/>
+            </a:avLst>
+          </a:prstGeom>
+          <a:solidFill>
+            <a:schemeClr val="accent1"/>
+          </a:solidFill>
+          <a:ln w="3175">
+            <a:solidFill>
+              <a:schemeClr val="tx1">
+                <a:lumMod val="65000"/>
+                <a:lumOff val="35000"/>
+              </a:schemeClr>
+            </a:solidFill>
+          </a:ln>
+        </p:spPr>
+        <p:style>
+          <a:lnRef idx="2">
+            <a:schemeClr val="accent1">
+              <a:shade val="50000"/>
+            </a:schemeClr>
+          </a:lnRef>
+          <a:fillRef idx="1">
+            <a:schemeClr val="accent1"/>
+          </a:fillRef>
+          <a:effectRef idx="0">
+            <a:schemeClr val="accent1"/>
+          </a:effectRef>
+          <a:fontRef idx="minor">
+            <a:schemeClr val="lt1"/>
+          </a:fontRef>
+        </p:style>
+        <p:txBody>
+          <a:bodyPr rtlCol="0" anchor="ctr"/>
+          <a:lstStyle/>
+          <a:p>
+            <a:pPr algn="ctr"/>
+            <a:endParaRPr lang="en-US" dirty="0"/>
+          </a:p>
+        </p:txBody>
+      </p:sp>
+      <p:sp>
+        <p:nvSpPr>
+          <p:cNvPr id="32" name="Freeform 5">
+            <a:extLst>
+              <a:ext uri="{FF2B5EF4-FFF2-40B4-BE49-F238E27FC236}">
+                <a16:creationId xmlns:a16="http://schemas.microsoft.com/office/drawing/2014/main" xmlns="" id="{85E0D4E1-E389-4671-B0E7-165A10A05425}"/>
+              </a:ext>
+              <a:ext uri="{C183D7F6-B498-43B3-948B-1728B52AA6E4}">
+                <adec:decorative xmlns:adec="http://schemas.microsoft.com/office/drawing/2017/decorative" xmlns="" val="1"/>
+              </a:ext>
+            </a:extLst>
+          </p:cNvPr>
+          <p:cNvSpPr>
+            <a:spLocks noChangeAspect="1"/>
+          </p:cNvSpPr>
+          <p:nvPr/>
+        </p:nvSpPr>
+        <p:spPr bwMode="auto">
+          <a:xfrm>
+            <a:off x="4257349" y="2355010"/>
+            <a:ext cx="1838651" cy="1613506"/>
+          </a:xfrm>
+          <a:custGeom>
+            <a:avLst/>
+            <a:gdLst>
+              <a:gd name="T0" fmla="*/ 781 w 1099"/>
+              <a:gd name="T1" fmla="*/ 0 h 968"/>
+              <a:gd name="T2" fmla="*/ 318 w 1099"/>
+              <a:gd name="T3" fmla="*/ 0 h 968"/>
+              <a:gd name="T4" fmla="*/ 246 w 1099"/>
+              <a:gd name="T5" fmla="*/ 42 h 968"/>
+              <a:gd name="T6" fmla="*/ 15 w 1099"/>
+              <a:gd name="T7" fmla="*/ 443 h 968"/>
+              <a:gd name="T8" fmla="*/ 15 w 1099"/>
+              <a:gd name="T9" fmla="*/ 525 h 968"/>
+              <a:gd name="T10" fmla="*/ 246 w 1099"/>
+              <a:gd name="T11" fmla="*/ 926 h 968"/>
+              <a:gd name="T12" fmla="*/ 318 w 1099"/>
+              <a:gd name="T13" fmla="*/ 968 h 968"/>
+              <a:gd name="T14" fmla="*/ 781 w 1099"/>
+              <a:gd name="T15" fmla="*/ 968 h 968"/>
+              <a:gd name="T16" fmla="*/ 852 w 1099"/>
+              <a:gd name="T17" fmla="*/ 926 h 968"/>
+              <a:gd name="T18" fmla="*/ 1084 w 1099"/>
+              <a:gd name="T19" fmla="*/ 525 h 968"/>
+              <a:gd name="T20" fmla="*/ 1084 w 1099"/>
+              <a:gd name="T21" fmla="*/ 443 h 968"/>
+              <a:gd name="T22" fmla="*/ 852 w 1099"/>
+              <a:gd name="T23" fmla="*/ 42 h 968"/>
+              <a:gd name="T24" fmla="*/ 781 w 1099"/>
+              <a:gd name="T25" fmla="*/ 0 h 968"/>
+            </a:gdLst>
+            <a:ahLst/>
+            <a:cxnLst>
+              <a:cxn ang="0">
+                <a:pos x="T0" y="T1"/>
+              </a:cxn>
+              <a:cxn ang="0">
+                <a:pos x="T2" y="T3"/>
+              </a:cxn>
+              <a:cxn ang="0">
+                <a:pos x="T4" y="T5"/>
+              </a:cxn>
+              <a:cxn ang="0">
+                <a:pos x="T6" y="T7"/>
+              </a:cxn>
+              <a:cxn ang="0">
+                <a:pos x="T8" y="T9"/>
+              </a:cxn>
+              <a:cxn ang="0">
+                <a:pos x="T10" y="T11"/>
+              </a:cxn>
+              <a:cxn ang="0">
+                <a:pos x="T12" y="T13"/>
+              </a:cxn>
+              <a:cxn ang="0">
+                <a:pos x="T14" y="T15"/>
+              </a:cxn>
+              <a:cxn ang="0">
+                <a:pos x="T16" y="T17"/>
+              </a:cxn>
+              <a:cxn ang="0">
+                <a:pos x="T18" y="T19"/>
+              </a:cxn>
+              <a:cxn ang="0">
+                <a:pos x="T20" y="T21"/>
+              </a:cxn>
+              <a:cxn ang="0">
+                <a:pos x="T22" y="T23"/>
+              </a:cxn>
+              <a:cxn ang="0">
+                <a:pos x="T24" y="T25"/>
+              </a:cxn>
+            </a:cxnLst>
+            <a:rect l="0" t="0" r="r" b="b"/>
+            <a:pathLst>
+              <a:path w="1099" h="968">
+                <a:moveTo>
+                  <a:pt x="781" y="0"/>
+                </a:moveTo>
+                <a:cubicBezTo>
+                  <a:pt x="318" y="0"/>
+                  <a:pt x="318" y="0"/>
+                  <a:pt x="318" y="0"/>
+                </a:cubicBezTo>
+                <a:cubicBezTo>
+                  <a:pt x="288" y="0"/>
+                  <a:pt x="261" y="16"/>
+                  <a:pt x="246" y="42"/>
+                </a:cubicBezTo>
+                <a:cubicBezTo>
+                  <a:pt x="15" y="443"/>
+                  <a:pt x="15" y="443"/>
+                  <a:pt x="15" y="443"/>
+                </a:cubicBezTo>
+                <a:cubicBezTo>
+                  <a:pt x="0" y="468"/>
+                  <a:pt x="0" y="500"/>
+                  <a:pt x="15" y="525"/>
+                </a:cubicBezTo>
+                <a:cubicBezTo>
+                  <a:pt x="246" y="926"/>
+                  <a:pt x="246" y="926"/>
+                  <a:pt x="246" y="926"/>
+                </a:cubicBezTo>
+                <a:cubicBezTo>
+                  <a:pt x="261" y="952"/>
+                  <a:pt x="288" y="968"/>
+                  <a:pt x="318" y="968"/>
+                </a:cubicBezTo>
+                <a:cubicBezTo>
+                  <a:pt x="781" y="968"/>
+                  <a:pt x="781" y="968"/>
+                  <a:pt x="781" y="968"/>
+                </a:cubicBezTo>
+                <a:cubicBezTo>
+                  <a:pt x="810" y="968"/>
+                  <a:pt x="838" y="952"/>
+                  <a:pt x="852" y="926"/>
+                </a:cubicBezTo>
+                <a:cubicBezTo>
+                  <a:pt x="1084" y="525"/>
+                  <a:pt x="1084" y="525"/>
+                  <a:pt x="1084" y="525"/>
+                </a:cubicBezTo>
+                <a:cubicBezTo>
+                  <a:pt x="1099" y="500"/>
+                  <a:pt x="1099" y="468"/>
+                  <a:pt x="1084" y="443"/>
+                </a:cubicBezTo>
+                <a:cubicBezTo>
+                  <a:pt x="852" y="42"/>
+                  <a:pt x="852" y="42"/>
+                  <a:pt x="852" y="42"/>
+                </a:cubicBezTo>
+                <a:cubicBezTo>
+                  <a:pt x="838" y="16"/>
+                  <a:pt x="810" y="0"/>
+                  <a:pt x="781" y="0"/>
+                </a:cubicBezTo>
+                <a:close/>
+              </a:path>
+            </a:pathLst>
+          </a:custGeom>
+          <a:solidFill>
+            <a:schemeClr val="bg1">
+              <a:lumMod val="95000"/>
+            </a:schemeClr>
+          </a:solidFill>
+          <a:ln w="63500" cap="flat">
+            <a:noFill/>
+            <a:prstDash val="solid"/>
+            <a:miter lim="800000"/>
+            <a:headEnd/>
+            <a:tailEnd/>
+          </a:ln>
+        </p:spPr>
+        <p:txBody>
+          <a:bodyPr vert="horz" wrap="square" lIns="91440" tIns="45720" rIns="91440" bIns="45720" numCol="1" anchor="t" anchorCtr="0" compatLnSpc="1">
+            <a:prstTxWarp prst="textNoShape">
+              <a:avLst/>
+            </a:prstTxWarp>
+          </a:bodyPr>
+          <a:lstStyle/>
+          <a:p>
+            <a:endParaRPr lang="en-US" dirty="0"/>
+          </a:p>
+        </p:txBody>
+      </p:sp>
+      <p:sp>
+        <p:nvSpPr>
+          <p:cNvPr id="33" name="Freeform 5">
+            <a:extLst>
+              <a:ext uri="{FF2B5EF4-FFF2-40B4-BE49-F238E27FC236}">
+                <a16:creationId xmlns:a16="http://schemas.microsoft.com/office/drawing/2014/main" xmlns="" id="{8186FEAF-6E1E-4258-94C3-5C589D4B5ADE}"/>
+              </a:ext>
+              <a:ext uri="{C183D7F6-B498-43B3-948B-1728B52AA6E4}">
+                <adec:decorative xmlns:adec="http://schemas.microsoft.com/office/drawing/2017/decorative" xmlns="" val="1"/>
+              </a:ext>
+            </a:extLst>
+          </p:cNvPr>
+          <p:cNvSpPr>
+            <a:spLocks noChangeAspect="1"/>
+          </p:cNvSpPr>
+          <p:nvPr/>
+        </p:nvSpPr>
+        <p:spPr bwMode="auto">
+          <a:xfrm>
+            <a:off x="6490727" y="1236374"/>
+            <a:ext cx="1838651" cy="1613506"/>
+          </a:xfrm>
+          <a:custGeom>
+            <a:avLst/>
+            <a:gdLst>
+              <a:gd name="T0" fmla="*/ 781 w 1099"/>
+              <a:gd name="T1" fmla="*/ 0 h 968"/>
+              <a:gd name="T2" fmla="*/ 318 w 1099"/>
+              <a:gd name="T3" fmla="*/ 0 h 968"/>
+              <a:gd name="T4" fmla="*/ 246 w 1099"/>
+              <a:gd name="T5" fmla="*/ 42 h 968"/>
+              <a:gd name="T6" fmla="*/ 15 w 1099"/>
+              <a:gd name="T7" fmla="*/ 443 h 968"/>
+              <a:gd name="T8" fmla="*/ 15 w 1099"/>
+              <a:gd name="T9" fmla="*/ 525 h 968"/>
+              <a:gd name="T10" fmla="*/ 246 w 1099"/>
+              <a:gd name="T11" fmla="*/ 926 h 968"/>
+              <a:gd name="T12" fmla="*/ 318 w 1099"/>
+              <a:gd name="T13" fmla="*/ 968 h 968"/>
+              <a:gd name="T14" fmla="*/ 781 w 1099"/>
+              <a:gd name="T15" fmla="*/ 968 h 968"/>
+              <a:gd name="T16" fmla="*/ 852 w 1099"/>
+              <a:gd name="T17" fmla="*/ 926 h 968"/>
+              <a:gd name="T18" fmla="*/ 1084 w 1099"/>
+              <a:gd name="T19" fmla="*/ 525 h 968"/>
+              <a:gd name="T20" fmla="*/ 1084 w 1099"/>
+              <a:gd name="T21" fmla="*/ 443 h 968"/>
+              <a:gd name="T22" fmla="*/ 852 w 1099"/>
+              <a:gd name="T23" fmla="*/ 42 h 968"/>
+              <a:gd name="T24" fmla="*/ 781 w 1099"/>
+              <a:gd name="T25" fmla="*/ 0 h 968"/>
+            </a:gdLst>
+            <a:ahLst/>
+            <a:cxnLst>
+              <a:cxn ang="0">
+                <a:pos x="T0" y="T1"/>
+              </a:cxn>
+              <a:cxn ang="0">
+                <a:pos x="T2" y="T3"/>
+              </a:cxn>
+              <a:cxn ang="0">
+                <a:pos x="T4" y="T5"/>
+              </a:cxn>
+              <a:cxn ang="0">
+                <a:pos x="T6" y="T7"/>
+              </a:cxn>
+              <a:cxn ang="0">
+                <a:pos x="T8" y="T9"/>
+              </a:cxn>
+              <a:cxn ang="0">
+                <a:pos x="T10" y="T11"/>
+              </a:cxn>
+              <a:cxn ang="0">
+                <a:pos x="T12" y="T13"/>
+              </a:cxn>
+              <a:cxn ang="0">
+                <a:pos x="T14" y="T15"/>
+              </a:cxn>
+              <a:cxn ang="0">
+                <a:pos x="T16" y="T17"/>
+              </a:cxn>
+              <a:cxn ang="0">
+                <a:pos x="T18" y="T19"/>
+              </a:cxn>
+              <a:cxn ang="0">
+                <a:pos x="T20" y="T21"/>
+              </a:cxn>
+              <a:cxn ang="0">
+                <a:pos x="T22" y="T23"/>
+              </a:cxn>
+              <a:cxn ang="0">
+                <a:pos x="T24" y="T25"/>
+              </a:cxn>
+            </a:cxnLst>
+            <a:rect l="0" t="0" r="r" b="b"/>
+            <a:pathLst>
+              <a:path w="1099" h="968">
+                <a:moveTo>
+                  <a:pt x="781" y="0"/>
+                </a:moveTo>
+                <a:cubicBezTo>
+                  <a:pt x="318" y="0"/>
+                  <a:pt x="318" y="0"/>
+                  <a:pt x="318" y="0"/>
+                </a:cubicBezTo>
+                <a:cubicBezTo>
+                  <a:pt x="288" y="0"/>
+                  <a:pt x="261" y="16"/>
+                  <a:pt x="246" y="42"/>
+                </a:cubicBezTo>
+                <a:cubicBezTo>
+                  <a:pt x="15" y="443"/>
+                  <a:pt x="15" y="443"/>
+                  <a:pt x="15" y="443"/>
+                </a:cubicBezTo>
+                <a:cubicBezTo>
+                  <a:pt x="0" y="468"/>
+                  <a:pt x="0" y="500"/>
+                  <a:pt x="15" y="525"/>
+                </a:cubicBezTo>
+                <a:cubicBezTo>
+                  <a:pt x="246" y="926"/>
+                  <a:pt x="246" y="926"/>
+                  <a:pt x="246" y="926"/>
+                </a:cubicBezTo>
+                <a:cubicBezTo>
+                  <a:pt x="261" y="952"/>
+                  <a:pt x="288" y="968"/>
+                  <a:pt x="318" y="968"/>
+                </a:cubicBezTo>
+                <a:cubicBezTo>
+                  <a:pt x="781" y="968"/>
+                  <a:pt x="781" y="968"/>
+                  <a:pt x="781" y="968"/>
+                </a:cubicBezTo>
+                <a:cubicBezTo>
+                  <a:pt x="810" y="968"/>
+                  <a:pt x="838" y="952"/>
+                  <a:pt x="852" y="926"/>
+                </a:cubicBezTo>
+                <a:cubicBezTo>
+                  <a:pt x="1084" y="525"/>
+                  <a:pt x="1084" y="525"/>
+                  <a:pt x="1084" y="525"/>
+                </a:cubicBezTo>
+                <a:cubicBezTo>
+                  <a:pt x="1099" y="500"/>
+                  <a:pt x="1099" y="468"/>
+                  <a:pt x="1084" y="443"/>
+                </a:cubicBezTo>
+                <a:cubicBezTo>
+                  <a:pt x="852" y="42"/>
+                  <a:pt x="852" y="42"/>
+                  <a:pt x="852" y="42"/>
+                </a:cubicBezTo>
+                <a:cubicBezTo>
+                  <a:pt x="838" y="16"/>
+                  <a:pt x="810" y="0"/>
+                  <a:pt x="781" y="0"/>
+                </a:cubicBezTo>
+                <a:close/>
+              </a:path>
+            </a:pathLst>
+          </a:custGeom>
+          <a:noFill/>
+          <a:ln w="63500" cap="flat">
+            <a:solidFill>
+              <a:schemeClr val="bg1">
+                <a:lumMod val="95000"/>
+              </a:schemeClr>
+            </a:solidFill>
+            <a:prstDash val="solid"/>
+            <a:miter lim="800000"/>
+            <a:headEnd/>
+            <a:tailEnd/>
+          </a:ln>
+        </p:spPr>
+        <p:txBody>
+          <a:bodyPr vert="horz" wrap="square" lIns="91440" tIns="45720" rIns="91440" bIns="45720" numCol="1" anchor="t" anchorCtr="0" compatLnSpc="1">
+            <a:prstTxWarp prst="textNoShape">
+              <a:avLst/>
+            </a:prstTxWarp>
+          </a:bodyPr>
+          <a:lstStyle/>
+          <a:p>
+            <a:endParaRPr lang="en-US" dirty="0"/>
+          </a:p>
+        </p:txBody>
+      </p:sp>
+      <p:sp>
+        <p:nvSpPr>
+          <p:cNvPr id="20" name="Title 19">
+            <a:extLst>
+              <a:ext uri="{FF2B5EF4-FFF2-40B4-BE49-F238E27FC236}">
+                <a16:creationId xmlns:a16="http://schemas.microsoft.com/office/drawing/2014/main" xmlns="" id="{7C11A64B-7EA5-442C-8405-73273A5331D1}"/>
+              </a:ext>
+            </a:extLst>
+          </p:cNvPr>
+          <p:cNvSpPr>
+            <a:spLocks noGrp="1"/>
+          </p:cNvSpPr>
+          <p:nvPr>
+            <p:ph type="ctrTitle"/>
+          </p:nvPr>
+        </p:nvSpPr>
+        <p:spPr/>
+        <p:txBody>
+          <a:bodyPr/>
+          <a:lstStyle/>
+          <a:p>
+            <a:r>
+              <a:rPr lang="en-US" dirty="0"/>
+              <a:t>Thank You</a:t>
+            </a:r>
+          </a:p>
+        </p:txBody>
+      </p:sp>
+      <p:pic>
+        <p:nvPicPr>
+          <p:cNvPr id="8" name="Graphic 7" descr="User" title="Icon - Presenter Name">
+            <a:extLst>
+              <a:ext uri="{FF2B5EF4-FFF2-40B4-BE49-F238E27FC236}">
+                <a16:creationId xmlns:a16="http://schemas.microsoft.com/office/drawing/2014/main" xmlns="" id="{111541C4-DB03-4E53-994D-499C7D73C4DF}"/>
+              </a:ext>
+            </a:extLst>
+          </p:cNvPr>
+          <p:cNvPicPr>
+            <a:picLocks noChangeAspect="1"/>
+          </p:cNvPicPr>
+          <p:nvPr/>
+        </p:nvPicPr>
+        <p:blipFill>
+          <a:blip r:embed="rId3" cstate="screen">
+            <a:extLst>
+              <a:ext uri="{28A0092B-C50C-407E-A947-70E740481C1C}">
+                <a14:useLocalDpi xmlns:a14="http://schemas.microsoft.com/office/drawing/2010/main"/>
+              </a:ext>
+              <a:ext uri="{96DAC541-7B7A-43D3-8B79-37D633B846F1}">
+                <asvg:svgBlip xmlns:asvg="http://schemas.microsoft.com/office/drawing/2016/SVG/main" xmlns="" r:embed="rId4"/>
+              </a:ext>
+            </a:extLst>
+          </a:blip>
+          <a:stretch>
+            <a:fillRect/>
+          </a:stretch>
+        </p:blipFill>
+        <p:spPr>
+          <a:xfrm>
+            <a:off x="7678512" y="3859066"/>
+            <a:ext cx="218900" cy="218900"/>
+          </a:xfrm>
+          <a:prstGeom prst="rect">
+            <a:avLst/>
+          </a:prstGeom>
+        </p:spPr>
+      </p:pic>
+      <p:sp>
+        <p:nvSpPr>
+          <p:cNvPr id="4" name="Text Placeholder 3">
+            <a:extLst>
+              <a:ext uri="{FF2B5EF4-FFF2-40B4-BE49-F238E27FC236}">
+                <a16:creationId xmlns:a16="http://schemas.microsoft.com/office/drawing/2014/main" xmlns="" id="{60828E04-9C2A-4859-8050-C2DF67A249CB}"/>
+              </a:ext>
+            </a:extLst>
+          </p:cNvPr>
+          <p:cNvSpPr>
+            <a:spLocks noGrp="1"/>
+          </p:cNvSpPr>
+          <p:nvPr>
+            <p:ph type="body" sz="quarter" idx="15"/>
+          </p:nvPr>
+        </p:nvSpPr>
+        <p:spPr/>
+        <p:txBody>
+          <a:bodyPr/>
+          <a:lstStyle/>
+          <a:p>
+            <a:r>
+              <a:rPr lang="en-US" dirty="0"/>
+              <a:t>April Hansson</a:t>
+            </a:r>
+          </a:p>
+        </p:txBody>
+      </p:sp>
+      <p:pic>
+        <p:nvPicPr>
+          <p:cNvPr id="10" name="Graphic 9" descr="Smart Phone" title="Icon - Presenter Phone Number">
+            <a:extLst>
+              <a:ext uri="{FF2B5EF4-FFF2-40B4-BE49-F238E27FC236}">
+                <a16:creationId xmlns:a16="http://schemas.microsoft.com/office/drawing/2014/main" xmlns="" id="{A29DE31C-E099-4579-BB03-675E0A40C5F2}"/>
+              </a:ext>
+            </a:extLst>
+          </p:cNvPr>
+          <p:cNvPicPr>
+            <a:picLocks noChangeAspect="1"/>
+          </p:cNvPicPr>
+          <p:nvPr/>
+        </p:nvPicPr>
+        <p:blipFill>
+          <a:blip r:embed="rId5" cstate="screen">
+            <a:extLst>
+              <a:ext uri="{28A0092B-C50C-407E-A947-70E740481C1C}">
+                <a14:useLocalDpi xmlns:a14="http://schemas.microsoft.com/office/drawing/2010/main"/>
+              </a:ext>
+              <a:ext uri="{96DAC541-7B7A-43D3-8B79-37D633B846F1}">
+                <asvg:svgBlip xmlns:asvg="http://schemas.microsoft.com/office/drawing/2016/SVG/main" xmlns="" r:embed="rId6"/>
+              </a:ext>
+            </a:extLst>
+          </a:blip>
+          <a:stretch>
+            <a:fillRect/>
+          </a:stretch>
+        </p:blipFill>
+        <p:spPr>
+          <a:xfrm>
+            <a:off x="7678512" y="4223565"/>
+            <a:ext cx="218900" cy="218900"/>
+          </a:xfrm>
+          <a:prstGeom prst="rect">
+            <a:avLst/>
+          </a:prstGeom>
+        </p:spPr>
+      </p:pic>
+      <p:sp>
+        <p:nvSpPr>
+          <p:cNvPr id="5" name="Text Placeholder 4">
+            <a:extLst>
+              <a:ext uri="{FF2B5EF4-FFF2-40B4-BE49-F238E27FC236}">
+                <a16:creationId xmlns:a16="http://schemas.microsoft.com/office/drawing/2014/main" xmlns="" id="{11265965-2271-4C1C-BD0A-6F85F80FF9A6}"/>
+              </a:ext>
+            </a:extLst>
+          </p:cNvPr>
+          <p:cNvSpPr>
+            <a:spLocks noGrp="1"/>
+          </p:cNvSpPr>
+          <p:nvPr>
+            <p:ph type="body" sz="quarter" idx="16"/>
+          </p:nvPr>
+        </p:nvSpPr>
+        <p:spPr/>
+        <p:txBody>
+          <a:bodyPr/>
+          <a:lstStyle/>
+          <a:p>
+            <a:r>
+              <a:rPr lang="en-US" dirty="0"/>
+              <a:t>+1 23 987 6554</a:t>
+            </a:r>
+          </a:p>
+        </p:txBody>
+      </p:sp>
+      <p:pic>
+        <p:nvPicPr>
+          <p:cNvPr id="9" name="Graphic 8" descr="Envelope" title="Icon Presenter Email">
+            <a:extLst>
+              <a:ext uri="{FF2B5EF4-FFF2-40B4-BE49-F238E27FC236}">
+                <a16:creationId xmlns:a16="http://schemas.microsoft.com/office/drawing/2014/main" xmlns="" id="{773C1382-ACE1-460F-A1B6-AB761A7D2E6B}"/>
+              </a:ext>
+            </a:extLst>
+          </p:cNvPr>
+          <p:cNvPicPr>
+            <a:picLocks noChangeAspect="1"/>
+          </p:cNvPicPr>
+          <p:nvPr/>
+        </p:nvPicPr>
+        <p:blipFill>
+          <a:blip r:embed="rId7" cstate="screen">
+            <a:extLst>
+              <a:ext uri="{28A0092B-C50C-407E-A947-70E740481C1C}">
+                <a14:useLocalDpi xmlns:a14="http://schemas.microsoft.com/office/drawing/2010/main"/>
+              </a:ext>
+              <a:ext uri="{96DAC541-7B7A-43D3-8B79-37D633B846F1}">
+                <asvg:svgBlip xmlns:asvg="http://schemas.microsoft.com/office/drawing/2016/SVG/main" xmlns="" r:embed="rId8"/>
+              </a:ext>
+            </a:extLst>
+          </a:blip>
+          <a:stretch>
+            <a:fillRect/>
+          </a:stretch>
+        </p:blipFill>
+        <p:spPr>
+          <a:xfrm>
+            <a:off x="7678512" y="4615862"/>
+            <a:ext cx="218900" cy="218900"/>
+          </a:xfrm>
+          <a:prstGeom prst="rect">
+            <a:avLst/>
+          </a:prstGeom>
+        </p:spPr>
+      </p:pic>
+      <p:sp>
+        <p:nvSpPr>
+          <p:cNvPr id="6" name="Text Placeholder 5">
+            <a:extLst>
+              <a:ext uri="{FF2B5EF4-FFF2-40B4-BE49-F238E27FC236}">
+                <a16:creationId xmlns:a16="http://schemas.microsoft.com/office/drawing/2014/main" xmlns="" id="{50A3BCC3-A277-4C0B-9EBA-EB53990D8EBD}"/>
+              </a:ext>
+            </a:extLst>
+          </p:cNvPr>
+          <p:cNvSpPr>
+            <a:spLocks noGrp="1"/>
+          </p:cNvSpPr>
+          <p:nvPr>
+            <p:ph type="body" sz="quarter" idx="17"/>
+          </p:nvPr>
+        </p:nvSpPr>
+        <p:spPr/>
+        <p:txBody>
+          <a:bodyPr/>
+          <a:lstStyle/>
+          <a:p>
+            <a:r>
+              <a:rPr lang="en-US" dirty="0"/>
+              <a:t>april@www.proseware.com</a:t>
+            </a:r>
+          </a:p>
+        </p:txBody>
+      </p:sp>
+      <p:pic>
+        <p:nvPicPr>
+          <p:cNvPr id="11" name="Graphic 10" descr="Link">
+            <a:extLst>
+              <a:ext uri="{FF2B5EF4-FFF2-40B4-BE49-F238E27FC236}">
+                <a16:creationId xmlns:a16="http://schemas.microsoft.com/office/drawing/2014/main" xmlns="" id="{0718E6E0-05A2-479C-AEA8-1A385EB73474}"/>
+              </a:ext>
+            </a:extLst>
+          </p:cNvPr>
+          <p:cNvPicPr>
+            <a:picLocks noChangeAspect="1"/>
+          </p:cNvPicPr>
+          <p:nvPr/>
+        </p:nvPicPr>
+        <p:blipFill>
+          <a:blip r:embed="rId9" cstate="screen">
+            <a:extLst>
+              <a:ext uri="{28A0092B-C50C-407E-A947-70E740481C1C}">
+                <a14:useLocalDpi xmlns:a14="http://schemas.microsoft.com/office/drawing/2010/main"/>
+              </a:ext>
+              <a:ext uri="{96DAC541-7B7A-43D3-8B79-37D633B846F1}">
+                <asvg:svgBlip xmlns:asvg="http://schemas.microsoft.com/office/drawing/2016/SVG/main" xmlns="" r:embed="rId10"/>
+              </a:ext>
+            </a:extLst>
+          </a:blip>
+          <a:stretch>
+            <a:fillRect/>
+          </a:stretch>
+        </p:blipFill>
+        <p:spPr>
+          <a:xfrm>
+            <a:off x="7661653" y="4942435"/>
+            <a:ext cx="244786" cy="244786"/>
+          </a:xfrm>
+          <a:prstGeom prst="rect">
+            <a:avLst/>
+          </a:prstGeom>
+        </p:spPr>
+      </p:pic>
+      <p:sp>
+        <p:nvSpPr>
+          <p:cNvPr id="22" name="Text Placeholder 21">
+            <a:extLst>
+              <a:ext uri="{FF2B5EF4-FFF2-40B4-BE49-F238E27FC236}">
+                <a16:creationId xmlns:a16="http://schemas.microsoft.com/office/drawing/2014/main" xmlns="" id="{43DBE4D9-1044-49A3-ABD5-477041FF2B63}"/>
+              </a:ext>
+            </a:extLst>
+          </p:cNvPr>
+          <p:cNvSpPr>
+            <a:spLocks noGrp="1"/>
+          </p:cNvSpPr>
+          <p:nvPr>
+            <p:ph type="body" sz="quarter" idx="18"/>
+          </p:nvPr>
+        </p:nvSpPr>
+        <p:spPr/>
+        <p:txBody>
+          <a:bodyPr/>
+          <a:lstStyle/>
+          <a:p>
+            <a:r>
+              <a:rPr lang="en-US" dirty="0"/>
+              <a:t>www.proseware.com</a:t>
+            </a:r>
+          </a:p>
+        </p:txBody>
+      </p:sp>
+    </p:spTree>
+    <p:extLst>
+      <p:ext uri="{BB962C8B-B14F-4D97-AF65-F5344CB8AC3E}">
+        <p14:creationId xmlns:p14="http://schemas.microsoft.com/office/powerpoint/2010/main" val="4153678306"/>
+      </p:ext>
+    </p:extLst>
+  </p:cSld>
+  <p:clrMapOvr>
+    <a:masterClrMapping/>
+  </p:clrMapOvr>
+</p:sld>
+</file>
+
+<file path=ppt/slides/slide21.xml><?xml version="1.0" encoding="utf-8"?>
+<p:sld xmlns:a="http://schemas.openxmlformats.org/drawingml/2006/main" xmlns:r="http://schemas.openxmlformats.org/officeDocument/2006/relationships" xmlns:p="http://schemas.openxmlformats.org/presentationml/2006/main">
+  <p:cSld>
+    <p:spTree>
+      <p:nvGrpSpPr>
+        <p:cNvPr id="1" name=""/>
+        <p:cNvGrpSpPr/>
+        <p:nvPr/>
+      </p:nvGrpSpPr>
+      <p:grpSpPr>
+        <a:xfrm>
+          <a:off x="0" y="0"/>
+          <a:ext cx="0" cy="0"/>
+          <a:chOff x="0" y="0"/>
+          <a:chExt cx="0" cy="0"/>
+        </a:xfrm>
+      </p:grpSpPr>
+      <p:sp>
+        <p:nvSpPr>
+          <p:cNvPr id="4" name="Title 3">
+            <a:extLst>
+              <a:ext uri="{FF2B5EF4-FFF2-40B4-BE49-F238E27FC236}">
+                <a16:creationId xmlns:a16="http://schemas.microsoft.com/office/drawing/2014/main" xmlns="" id="{E98DCA46-603B-4178-8707-30E192CE6B8D}"/>
+              </a:ext>
+            </a:extLst>
+          </p:cNvPr>
+          <p:cNvSpPr>
+            <a:spLocks noGrp="1"/>
+          </p:cNvSpPr>
+          <p:nvPr>
+            <p:ph type="title"/>
+          </p:nvPr>
+        </p:nvSpPr>
+        <p:spPr/>
+        <p:txBody>
+          <a:bodyPr/>
+          <a:lstStyle/>
+          <a:p>
+            <a:r>
+              <a:rPr lang="en-US" dirty="0"/>
+              <a:t>Customize this Template</a:t>
+            </a:r>
+          </a:p>
+        </p:txBody>
+      </p:sp>
+      <p:sp>
+        <p:nvSpPr>
+          <p:cNvPr id="3" name="Text Placeholder 2">
+            <a:extLst>
+              <a:ext uri="{FF2B5EF4-FFF2-40B4-BE49-F238E27FC236}">
+                <a16:creationId xmlns:a16="http://schemas.microsoft.com/office/drawing/2014/main" xmlns="" id="{44C11960-E298-40D1-BBD6-3E621842A017}"/>
+              </a:ext>
+            </a:extLst>
+          </p:cNvPr>
+          <p:cNvSpPr>
+            <a:spLocks noGrp="1"/>
+          </p:cNvSpPr>
+          <p:nvPr>
+            <p:ph type="body" sz="quarter" idx="14"/>
+          </p:nvPr>
+        </p:nvSpPr>
+        <p:spPr/>
+        <p:txBody>
+          <a:bodyPr/>
+          <a:lstStyle/>
+          <a:p>
+            <a:pPr>
+              <a:lnSpc>
+                <a:spcPct val="100000"/>
+              </a:lnSpc>
+            </a:pPr>
+            <a:r>
+              <a:rPr lang="en-US" u="sng" dirty="0">
+                <a:solidFill>
+                  <a:srgbClr val="0070C0"/>
+                </a:solidFill>
+                <a:hlinkClick r:id="rId2">
+                  <a:extLst>
+                    <a:ext uri="{A12FA001-AC4F-418D-AE19-62706E023703}">
+                      <ahyp:hlinkClr xmlns:ahyp="http://schemas.microsoft.com/office/drawing/2018/hyperlinkcolor" xmlns="" val="tx"/>
+                    </a:ext>
+                  </a:extLst>
+                </a:hlinkClick>
+              </a:rPr>
+              <a:t>Template Editing Instructions and Feedback</a:t>
+            </a:r>
+            <a:endParaRPr lang="en-US" u="sng" dirty="0">
+              <a:solidFill>
+                <a:srgbClr val="0070C0"/>
+              </a:solidFill>
+            </a:endParaRPr>
+          </a:p>
+        </p:txBody>
+      </p:sp>
+      <p:sp>
+        <p:nvSpPr>
+          <p:cNvPr id="2" name="Slide Number Placeholder 1">
+            <a:extLst>
+              <a:ext uri="{FF2B5EF4-FFF2-40B4-BE49-F238E27FC236}">
+                <a16:creationId xmlns:a16="http://schemas.microsoft.com/office/drawing/2014/main" xmlns="" id="{5E0A2811-986E-4EBF-9612-8E79971C972D}"/>
+              </a:ext>
+            </a:extLst>
+          </p:cNvPr>
+          <p:cNvSpPr>
+            <a:spLocks noGrp="1"/>
+          </p:cNvSpPr>
+          <p:nvPr>
+            <p:ph type="sldNum" sz="quarter" idx="13"/>
+          </p:nvPr>
+        </p:nvSpPr>
+        <p:spPr/>
+        <p:txBody>
+          <a:bodyPr/>
+          <a:lstStyle/>
+          <a:p>
+            <a:fld id="{19B51A1E-902D-48AF-9020-955120F399B6}" type="slidenum">
+              <a:rPr lang="en-US" smtClean="0"/>
+              <a:pPr/>
+              <a:t>21</a:t>
+            </a:fld>
+            <a:endParaRPr lang="en-US" dirty="0"/>
+          </a:p>
+        </p:txBody>
+      </p:sp>
+    </p:spTree>
+    <p:extLst>
+      <p:ext uri="{BB962C8B-B14F-4D97-AF65-F5344CB8AC3E}">
+        <p14:creationId xmlns:p14="http://schemas.microsoft.com/office/powerpoint/2010/main" val="59582380"/>
+      </p:ext>
+    </p:extLst>
+  </p:cSld>
+  <p:clrMapOvr>
+    <a:masterClrMapping/>
+  </p:clrMapOvr>
 </p:sld>
 </file>
 

</xml_diff>